<commit_message>
Site updated: 2024-02-23 20:35:19
</commit_message>
<xml_diff>
--- a/attaches/PKHuang_Resume.pptx
+++ b/attaches/PKHuang_Resume.pptx
@@ -243,7 +243,7 @@
           <a:p>
             <a:fld id="{D9B27627-1ABF-4570-89B7-2F2CE923F251}" type="datetimeFigureOut">
               <a:rPr lang="zh-TW" altLang="en-US" smtClean="0"/>
-              <a:t>2024/1/15</a:t>
+              <a:t>2024/1/16</a:t>
             </a:fld>
             <a:endParaRPr lang="zh-TW" altLang="en-US"/>
           </a:p>
@@ -413,7 +413,7 @@
           <a:p>
             <a:fld id="{D9B27627-1ABF-4570-89B7-2F2CE923F251}" type="datetimeFigureOut">
               <a:rPr lang="zh-TW" altLang="en-US" smtClean="0"/>
-              <a:t>2024/1/15</a:t>
+              <a:t>2024/1/16</a:t>
             </a:fld>
             <a:endParaRPr lang="zh-TW" altLang="en-US"/>
           </a:p>
@@ -593,7 +593,7 @@
           <a:p>
             <a:fld id="{D9B27627-1ABF-4570-89B7-2F2CE923F251}" type="datetimeFigureOut">
               <a:rPr lang="zh-TW" altLang="en-US" smtClean="0"/>
-              <a:t>2024/1/15</a:t>
+              <a:t>2024/1/16</a:t>
             </a:fld>
             <a:endParaRPr lang="zh-TW" altLang="en-US"/>
           </a:p>
@@ -763,7 +763,7 @@
           <a:p>
             <a:fld id="{D9B27627-1ABF-4570-89B7-2F2CE923F251}" type="datetimeFigureOut">
               <a:rPr lang="zh-TW" altLang="en-US" smtClean="0"/>
-              <a:t>2024/1/15</a:t>
+              <a:t>2024/1/16</a:t>
             </a:fld>
             <a:endParaRPr lang="zh-TW" altLang="en-US"/>
           </a:p>
@@ -1007,7 +1007,7 @@
           <a:p>
             <a:fld id="{D9B27627-1ABF-4570-89B7-2F2CE923F251}" type="datetimeFigureOut">
               <a:rPr lang="zh-TW" altLang="en-US" smtClean="0"/>
-              <a:t>2024/1/15</a:t>
+              <a:t>2024/1/16</a:t>
             </a:fld>
             <a:endParaRPr lang="zh-TW" altLang="en-US"/>
           </a:p>
@@ -1239,7 +1239,7 @@
           <a:p>
             <a:fld id="{D9B27627-1ABF-4570-89B7-2F2CE923F251}" type="datetimeFigureOut">
               <a:rPr lang="zh-TW" altLang="en-US" smtClean="0"/>
-              <a:t>2024/1/15</a:t>
+              <a:t>2024/1/16</a:t>
             </a:fld>
             <a:endParaRPr lang="zh-TW" altLang="en-US"/>
           </a:p>
@@ -1606,7 +1606,7 @@
           <a:p>
             <a:fld id="{D9B27627-1ABF-4570-89B7-2F2CE923F251}" type="datetimeFigureOut">
               <a:rPr lang="zh-TW" altLang="en-US" smtClean="0"/>
-              <a:t>2024/1/15</a:t>
+              <a:t>2024/1/16</a:t>
             </a:fld>
             <a:endParaRPr lang="zh-TW" altLang="en-US"/>
           </a:p>
@@ -1724,7 +1724,7 @@
           <a:p>
             <a:fld id="{D9B27627-1ABF-4570-89B7-2F2CE923F251}" type="datetimeFigureOut">
               <a:rPr lang="zh-TW" altLang="en-US" smtClean="0"/>
-              <a:t>2024/1/15</a:t>
+              <a:t>2024/1/16</a:t>
             </a:fld>
             <a:endParaRPr lang="zh-TW" altLang="en-US"/>
           </a:p>
@@ -1819,7 +1819,7 @@
           <a:p>
             <a:fld id="{D9B27627-1ABF-4570-89B7-2F2CE923F251}" type="datetimeFigureOut">
               <a:rPr lang="zh-TW" altLang="en-US" smtClean="0"/>
-              <a:t>2024/1/15</a:t>
+              <a:t>2024/1/16</a:t>
             </a:fld>
             <a:endParaRPr lang="zh-TW" altLang="en-US"/>
           </a:p>
@@ -2096,7 +2096,7 @@
           <a:p>
             <a:fld id="{D9B27627-1ABF-4570-89B7-2F2CE923F251}" type="datetimeFigureOut">
               <a:rPr lang="zh-TW" altLang="en-US" smtClean="0"/>
-              <a:t>2024/1/15</a:t>
+              <a:t>2024/1/16</a:t>
             </a:fld>
             <a:endParaRPr lang="zh-TW" altLang="en-US"/>
           </a:p>
@@ -2353,7 +2353,7 @@
           <a:p>
             <a:fld id="{D9B27627-1ABF-4570-89B7-2F2CE923F251}" type="datetimeFigureOut">
               <a:rPr lang="zh-TW" altLang="en-US" smtClean="0"/>
-              <a:t>2024/1/15</a:t>
+              <a:t>2024/1/16</a:t>
             </a:fld>
             <a:endParaRPr lang="zh-TW" altLang="en-US"/>
           </a:p>
@@ -2566,7 +2566,7 @@
           <a:p>
             <a:fld id="{D9B27627-1ABF-4570-89B7-2F2CE923F251}" type="datetimeFigureOut">
               <a:rPr lang="zh-TW" altLang="en-US" smtClean="0"/>
-              <a:t>2024/1/15</a:t>
+              <a:t>2024/1/16</a:t>
             </a:fld>
             <a:endParaRPr lang="zh-TW" altLang="en-US"/>
           </a:p>
@@ -3821,13 +3821,7 @@
                 <a:rPr lang="en-US" altLang="zh-TW" sz="1200" dirty="0" smtClean="0">
                   <a:latin typeface="+mj-lt"/>
                 </a:rPr>
-                <a:t>issues </a:t>
-              </a:r>
-              <a:r>
-                <a:rPr lang="en-US" altLang="zh-TW" sz="1200" dirty="0" smtClean="0">
-                  <a:latin typeface="+mj-lt"/>
-                </a:rPr>
-                <a:t>more efficiently.</a:t>
+                <a:t>issues more efficiently.</a:t>
               </a:r>
               <a:endParaRPr lang="zh-TW" altLang="en-US" sz="1200" dirty="0">
                 <a:latin typeface="+mj-lt"/>
@@ -3972,19 +3966,8 @@
                   <a:latin typeface="+mj-lt"/>
                   <a:cs typeface="Arial" panose="020B0604020202020204" pitchFamily="34" charset="0"/>
                 </a:rPr>
-                <a:t>Jan 2021 – </a:t>
-              </a:r>
-              <a:r>
-                <a:rPr lang="en-US" altLang="zh-TW" sz="1200" dirty="0" smtClean="0">
-                  <a:latin typeface="+mj-lt"/>
-                  <a:cs typeface="Arial" panose="020B0604020202020204" pitchFamily="34" charset="0"/>
-                </a:rPr>
-                <a:t>Present</a:t>
-              </a:r>
-              <a:endParaRPr lang="en-US" altLang="zh-TW" sz="1200" dirty="0" smtClean="0">
-                <a:latin typeface="+mj-lt"/>
-                <a:cs typeface="Arial" panose="020B0604020202020204" pitchFamily="34" charset="0"/>
-              </a:endParaRPr>
+                <a:t>Jan 2021 – Present</a:t>
+              </a:r>
             </a:p>
             <a:p>
               <a:pPr marL="171450" indent="-171450">
@@ -4147,9 +4130,9 @@
         <p:grpSpPr>
           <a:xfrm>
             <a:off x="2979067" y="7209713"/>
-            <a:ext cx="3542048" cy="2591535"/>
+            <a:ext cx="3542048" cy="2565887"/>
             <a:chOff x="338138" y="2514600"/>
-            <a:chExt cx="3370262" cy="2591535"/>
+            <a:chExt cx="3370262" cy="2565887"/>
           </a:xfrm>
         </p:grpSpPr>
         <p:sp>
@@ -4233,7 +4216,7 @@
           <p:spPr>
             <a:xfrm>
               <a:off x="338138" y="3085069"/>
-              <a:ext cx="3370262" cy="2021066"/>
+              <a:ext cx="3370262" cy="1995418"/>
             </a:xfrm>
             <a:prstGeom prst="rect">
               <a:avLst/>
@@ -4256,38 +4239,85 @@
                   <a:latin typeface="+mj-lt"/>
                   <a:cs typeface="Arial" panose="020B0604020202020204" pitchFamily="34" charset="0"/>
                 </a:rPr>
-                <a:t>Master, National </a:t>
-              </a:r>
-              <a:r>
-                <a:rPr lang="en-US" altLang="zh-TW" sz="1200" b="1" dirty="0" err="1" smtClean="0">
-                  <a:latin typeface="+mj-lt"/>
-                  <a:cs typeface="Arial" panose="020B0604020202020204" pitchFamily="34" charset="0"/>
-                </a:rPr>
-                <a:t>Chiao</a:t>
+                <a:t>Master, </a:t>
+              </a:r>
+              <a:r>
+                <a:rPr lang="en-US" altLang="zh-TW" sz="1200" b="1" dirty="0">
+                  <a:latin typeface="+mj-lt"/>
+                </a:rPr>
+                <a:t>Computer </a:t>
               </a:r>
               <a:r>
                 <a:rPr lang="en-US" altLang="zh-TW" sz="1200" b="1" dirty="0" smtClean="0">
                   <a:latin typeface="+mj-lt"/>
-                  <a:cs typeface="Arial" panose="020B0604020202020204" pitchFamily="34" charset="0"/>
-                </a:rPr>
-                <a:t> Tung University</a:t>
-              </a:r>
+                </a:rPr>
+                <a:t>Science</a:t>
+              </a:r>
+              <a:endParaRPr lang="en-US" altLang="zh-TW" sz="1200" b="1" dirty="0">
+                <a:latin typeface="+mj-lt"/>
+              </a:endParaRPr>
             </a:p>
             <a:p>
               <a:pPr>
                 <a:spcBef>
                   <a:spcPts val="130"/>
                 </a:spcBef>
-                <a:spcAft>
-                  <a:spcPts val="150"/>
-                </a:spcAft>
               </a:pPr>
               <a:r>
+                <a:rPr lang="en-US" altLang="zh-TW" sz="1200" b="1" dirty="0" smtClean="0">
+                  <a:latin typeface="+mj-lt"/>
+                  <a:cs typeface="Arial" panose="020B0604020202020204" pitchFamily="34" charset="0"/>
+                </a:rPr>
+                <a:t>National </a:t>
+              </a:r>
+              <a:r>
+                <a:rPr lang="en-US" altLang="zh-TW" sz="1200" b="1" dirty="0" err="1" smtClean="0">
+                  <a:latin typeface="+mj-lt"/>
+                  <a:cs typeface="Arial" panose="020B0604020202020204" pitchFamily="34" charset="0"/>
+                </a:rPr>
+                <a:t>Chiao</a:t>
+              </a:r>
+              <a:r>
+                <a:rPr lang="en-US" altLang="zh-TW" sz="1200" b="1" dirty="0" smtClean="0">
+                  <a:latin typeface="+mj-lt"/>
+                  <a:cs typeface="Arial" panose="020B0604020202020204" pitchFamily="34" charset="0"/>
+                </a:rPr>
+                <a:t> Tung </a:t>
+              </a:r>
+              <a:r>
+                <a:rPr lang="en-US" altLang="zh-TW" sz="1200" b="1" dirty="0" smtClean="0">
+                  <a:latin typeface="+mj-lt"/>
+                  <a:cs typeface="Arial" panose="020B0604020202020204" pitchFamily="34" charset="0"/>
+                </a:rPr>
+                <a:t>University</a:t>
+              </a:r>
+              <a:r>
+                <a:rPr lang="zh-TW" altLang="en-US" sz="1200" dirty="0" smtClean="0">
+                  <a:latin typeface="+mj-lt"/>
+                  <a:cs typeface="Arial" panose="020B0604020202020204" pitchFamily="34" charset="0"/>
+                </a:rPr>
+                <a:t> </a:t>
+              </a:r>
+              <a:r>
                 <a:rPr lang="en-US" altLang="zh-TW" sz="1200" dirty="0" smtClean="0">
                   <a:latin typeface="+mj-lt"/>
                   <a:cs typeface="Arial" panose="020B0604020202020204" pitchFamily="34" charset="0"/>
                 </a:rPr>
-                <a:t>Sep 2018 – Aug 2020</a:t>
+                <a:t>(Sep </a:t>
+              </a:r>
+              <a:r>
+                <a:rPr lang="en-US" altLang="zh-TW" sz="1200" dirty="0" smtClean="0">
+                  <a:latin typeface="+mj-lt"/>
+                  <a:cs typeface="Arial" panose="020B0604020202020204" pitchFamily="34" charset="0"/>
+                </a:rPr>
+                <a:t>2018 – Aug </a:t>
+              </a:r>
+              <a:r>
+                <a:rPr lang="en-US" altLang="zh-TW" sz="1200" dirty="0" smtClean="0">
+                  <a:latin typeface="+mj-lt"/>
+                  <a:cs typeface="Arial" panose="020B0604020202020204" pitchFamily="34" charset="0"/>
+                </a:rPr>
+                <a:t>2020)</a:t>
               </a:r>
               <a:endParaRPr lang="en-US" altLang="zh-TW" sz="1200" dirty="0">
                 <a:latin typeface="+mj-lt"/>
@@ -4378,13 +4408,7 @@
                 <a:rPr lang="en-US" altLang="zh-TW" sz="1200" dirty="0">
                   <a:latin typeface="+mj-lt"/>
                 </a:rPr>
-                <a:t>User Center Interaction </a:t>
-              </a:r>
-              <a:r>
-                <a:rPr lang="en-US" altLang="zh-TW" sz="1200" dirty="0">
-                  <a:latin typeface="+mj-lt"/>
-                </a:rPr>
-                <a:t>Design</a:t>
+                <a:t>User Center Interaction Design</a:t>
               </a:r>
             </a:p>
             <a:p>
@@ -4408,42 +4432,49 @@
                   <a:latin typeface="+mj-lt"/>
                   <a:cs typeface="Arial" panose="020B0604020202020204" pitchFamily="34" charset="0"/>
                 </a:rPr>
-                <a:t>Bachelor, </a:t>
-              </a:r>
-              <a:r>
-                <a:rPr lang="en-US" altLang="zh-TW" sz="1200" b="1" dirty="0">
-                  <a:latin typeface="+mj-lt"/>
-                  <a:cs typeface="Arial" panose="020B0604020202020204" pitchFamily="34" charset="0"/>
-                </a:rPr>
-                <a:t>National </a:t>
-              </a:r>
-              <a:r>
-                <a:rPr lang="en-US" altLang="zh-TW" sz="1200" b="1" dirty="0" smtClean="0">
-                  <a:latin typeface="+mj-lt"/>
-                  <a:cs typeface="Arial" panose="020B0604020202020204" pitchFamily="34" charset="0"/>
-                </a:rPr>
-                <a:t>Central University</a:t>
-              </a:r>
-              <a:endParaRPr lang="en-US" altLang="zh-TW" sz="1200" b="1" dirty="0">
-                <a:latin typeface="+mj-lt"/>
-                <a:cs typeface="Arial" panose="020B0604020202020204" pitchFamily="34" charset="0"/>
-              </a:endParaRPr>
+                <a:t>Bachelor, Communication Engineering</a:t>
+              </a:r>
             </a:p>
             <a:p>
               <a:pPr>
                 <a:spcBef>
                   <a:spcPts val="130"/>
                 </a:spcBef>
-                <a:spcAft>
-                  <a:spcPts val="150"/>
-                </a:spcAft>
               </a:pPr>
               <a:r>
+                <a:rPr lang="en-US" altLang="zh-TW" sz="1200" b="1" dirty="0" smtClean="0">
+                  <a:latin typeface="+mj-lt"/>
+                  <a:cs typeface="Arial" panose="020B0604020202020204" pitchFamily="34" charset="0"/>
+                </a:rPr>
+                <a:t>National Central </a:t>
+              </a:r>
+              <a:r>
+                <a:rPr lang="en-US" altLang="zh-TW" sz="1200" b="1" smtClean="0">
+                  <a:latin typeface="+mj-lt"/>
+                  <a:cs typeface="Arial" panose="020B0604020202020204" pitchFamily="34" charset="0"/>
+                </a:rPr>
+                <a:t>University </a:t>
+              </a:r>
+              <a:r>
+                <a:rPr lang="en-US" altLang="zh-TW" sz="1200" smtClean="0">
+                  <a:latin typeface="+mj-lt"/>
+                  <a:cs typeface="Arial" panose="020B0604020202020204" pitchFamily="34" charset="0"/>
+                </a:rPr>
+                <a:t>(Sep </a:t>
+              </a:r>
+              <a:r>
                 <a:rPr lang="en-US" altLang="zh-TW" sz="1200" dirty="0" smtClean="0">
                   <a:latin typeface="+mj-lt"/>
                   <a:cs typeface="Arial" panose="020B0604020202020204" pitchFamily="34" charset="0"/>
                 </a:rPr>
-                <a:t>Sep 2013 – Jun 2017</a:t>
+                <a:t>2013 – </a:t>
+              </a:r>
+              <a:r>
+                <a:rPr lang="en-US" altLang="zh-TW" sz="1200" smtClean="0">
+                  <a:latin typeface="+mj-lt"/>
+                  <a:cs typeface="Arial" panose="020B0604020202020204" pitchFamily="34" charset="0"/>
+                </a:rPr>
+                <a:t>Jun 2017)</a:t>
               </a:r>
               <a:endParaRPr lang="en-US" altLang="zh-TW" sz="1200" dirty="0">
                 <a:latin typeface="+mj-lt"/>

</xml_diff>

<commit_message>
Site updated: 2024-02-24 01:59:46
</commit_message>
<xml_diff>
--- a/attaches/PKHuang_Resume.pptx
+++ b/attaches/PKHuang_Resume.pptx
@@ -243,7 +243,7 @@
           <a:p>
             <a:fld id="{D9B27627-1ABF-4570-89B7-2F2CE923F251}" type="datetimeFigureOut">
               <a:rPr lang="zh-TW" altLang="en-US" smtClean="0"/>
-              <a:t>2024/1/16</a:t>
+              <a:t>2024/2/24</a:t>
             </a:fld>
             <a:endParaRPr lang="zh-TW" altLang="en-US"/>
           </a:p>
@@ -413,7 +413,7 @@
           <a:p>
             <a:fld id="{D9B27627-1ABF-4570-89B7-2F2CE923F251}" type="datetimeFigureOut">
               <a:rPr lang="zh-TW" altLang="en-US" smtClean="0"/>
-              <a:t>2024/1/16</a:t>
+              <a:t>2024/2/24</a:t>
             </a:fld>
             <a:endParaRPr lang="zh-TW" altLang="en-US"/>
           </a:p>
@@ -593,7 +593,7 @@
           <a:p>
             <a:fld id="{D9B27627-1ABF-4570-89B7-2F2CE923F251}" type="datetimeFigureOut">
               <a:rPr lang="zh-TW" altLang="en-US" smtClean="0"/>
-              <a:t>2024/1/16</a:t>
+              <a:t>2024/2/24</a:t>
             </a:fld>
             <a:endParaRPr lang="zh-TW" altLang="en-US"/>
           </a:p>
@@ -763,7 +763,7 @@
           <a:p>
             <a:fld id="{D9B27627-1ABF-4570-89B7-2F2CE923F251}" type="datetimeFigureOut">
               <a:rPr lang="zh-TW" altLang="en-US" smtClean="0"/>
-              <a:t>2024/1/16</a:t>
+              <a:t>2024/2/24</a:t>
             </a:fld>
             <a:endParaRPr lang="zh-TW" altLang="en-US"/>
           </a:p>
@@ -1007,7 +1007,7 @@
           <a:p>
             <a:fld id="{D9B27627-1ABF-4570-89B7-2F2CE923F251}" type="datetimeFigureOut">
               <a:rPr lang="zh-TW" altLang="en-US" smtClean="0"/>
-              <a:t>2024/1/16</a:t>
+              <a:t>2024/2/24</a:t>
             </a:fld>
             <a:endParaRPr lang="zh-TW" altLang="en-US"/>
           </a:p>
@@ -1239,7 +1239,7 @@
           <a:p>
             <a:fld id="{D9B27627-1ABF-4570-89B7-2F2CE923F251}" type="datetimeFigureOut">
               <a:rPr lang="zh-TW" altLang="en-US" smtClean="0"/>
-              <a:t>2024/1/16</a:t>
+              <a:t>2024/2/24</a:t>
             </a:fld>
             <a:endParaRPr lang="zh-TW" altLang="en-US"/>
           </a:p>
@@ -1606,7 +1606,7 @@
           <a:p>
             <a:fld id="{D9B27627-1ABF-4570-89B7-2F2CE923F251}" type="datetimeFigureOut">
               <a:rPr lang="zh-TW" altLang="en-US" smtClean="0"/>
-              <a:t>2024/1/16</a:t>
+              <a:t>2024/2/24</a:t>
             </a:fld>
             <a:endParaRPr lang="zh-TW" altLang="en-US"/>
           </a:p>
@@ -1724,7 +1724,7 @@
           <a:p>
             <a:fld id="{D9B27627-1ABF-4570-89B7-2F2CE923F251}" type="datetimeFigureOut">
               <a:rPr lang="zh-TW" altLang="en-US" smtClean="0"/>
-              <a:t>2024/1/16</a:t>
+              <a:t>2024/2/24</a:t>
             </a:fld>
             <a:endParaRPr lang="zh-TW" altLang="en-US"/>
           </a:p>
@@ -1819,7 +1819,7 @@
           <a:p>
             <a:fld id="{D9B27627-1ABF-4570-89B7-2F2CE923F251}" type="datetimeFigureOut">
               <a:rPr lang="zh-TW" altLang="en-US" smtClean="0"/>
-              <a:t>2024/1/16</a:t>
+              <a:t>2024/2/24</a:t>
             </a:fld>
             <a:endParaRPr lang="zh-TW" altLang="en-US"/>
           </a:p>
@@ -2096,7 +2096,7 @@
           <a:p>
             <a:fld id="{D9B27627-1ABF-4570-89B7-2F2CE923F251}" type="datetimeFigureOut">
               <a:rPr lang="zh-TW" altLang="en-US" smtClean="0"/>
-              <a:t>2024/1/16</a:t>
+              <a:t>2024/2/24</a:t>
             </a:fld>
             <a:endParaRPr lang="zh-TW" altLang="en-US"/>
           </a:p>
@@ -2353,7 +2353,7 @@
           <a:p>
             <a:fld id="{D9B27627-1ABF-4570-89B7-2F2CE923F251}" type="datetimeFigureOut">
               <a:rPr lang="zh-TW" altLang="en-US" smtClean="0"/>
-              <a:t>2024/1/16</a:t>
+              <a:t>2024/2/24</a:t>
             </a:fld>
             <a:endParaRPr lang="zh-TW" altLang="en-US"/>
           </a:p>
@@ -2566,7 +2566,7 @@
           <a:p>
             <a:fld id="{D9B27627-1ABF-4570-89B7-2F2CE923F251}" type="datetimeFigureOut">
               <a:rPr lang="zh-TW" altLang="en-US" smtClean="0"/>
-              <a:t>2024/1/16</a:t>
+              <a:t>2024/2/24</a:t>
             </a:fld>
             <a:endParaRPr lang="zh-TW" altLang="en-US"/>
           </a:p>
@@ -3115,7 +3115,7 @@
         </p:blipFill>
         <p:spPr>
           <a:xfrm>
-            <a:off x="738187" y="285750"/>
+            <a:off x="595762" y="270733"/>
             <a:ext cx="1152525" cy="1536700"/>
           </a:xfrm>
           <a:prstGeom prst="ellipse">
@@ -3456,9 +3456,9 @@
         <p:grpSpPr>
           <a:xfrm>
             <a:off x="287338" y="7124700"/>
-            <a:ext cx="2925762" cy="1955464"/>
+            <a:ext cx="2925762" cy="2694127"/>
             <a:chOff x="338138" y="2514600"/>
-            <a:chExt cx="2620962" cy="1955464"/>
+            <a:chExt cx="2620962" cy="2694127"/>
           </a:xfrm>
         </p:grpSpPr>
         <p:sp>
@@ -3542,7 +3542,7 @@
           <p:spPr>
             <a:xfrm>
               <a:off x="338138" y="3085069"/>
-              <a:ext cx="2620962" cy="1384995"/>
+              <a:ext cx="2620962" cy="2123658"/>
             </a:xfrm>
             <a:prstGeom prst="rect">
               <a:avLst/>
@@ -3560,8 +3560,42 @@
                   <a:latin typeface="+mj-lt"/>
                   <a:cs typeface="Arial" panose="020B0604020202020204" pitchFamily="34" charset="0"/>
                 </a:rPr>
+                <a:t>System Verilog</a:t>
+              </a:r>
+            </a:p>
+            <a:p>
+              <a:endParaRPr lang="en-US" altLang="zh-TW" sz="1200" dirty="0">
+                <a:latin typeface="+mj-lt"/>
+                <a:cs typeface="Arial" panose="020B0604020202020204" pitchFamily="34" charset="0"/>
+              </a:endParaRPr>
+            </a:p>
+            <a:p>
+              <a:r>
+                <a:rPr lang="en-US" altLang="zh-TW" sz="1200" dirty="0" smtClean="0">
+                  <a:latin typeface="+mj-lt"/>
+                  <a:cs typeface="Arial" panose="020B0604020202020204" pitchFamily="34" charset="0"/>
+                </a:rPr>
+                <a:t>UVM</a:t>
+              </a:r>
+            </a:p>
+            <a:p>
+              <a:endParaRPr lang="en-US" altLang="zh-TW" sz="1200" dirty="0">
+                <a:latin typeface="+mj-lt"/>
+                <a:cs typeface="Arial" panose="020B0604020202020204" pitchFamily="34" charset="0"/>
+              </a:endParaRPr>
+            </a:p>
+            <a:p>
+              <a:r>
+                <a:rPr lang="en-US" altLang="zh-TW" sz="1200" dirty="0" smtClean="0">
+                  <a:latin typeface="+mj-lt"/>
+                  <a:cs typeface="Arial" panose="020B0604020202020204" pitchFamily="34" charset="0"/>
+                </a:rPr>
                 <a:t>C</a:t>
               </a:r>
+              <a:endParaRPr lang="en-US" altLang="zh-TW" sz="1200" dirty="0" smtClean="0">
+                <a:latin typeface="+mj-lt"/>
+                <a:cs typeface="Arial" panose="020B0604020202020204" pitchFamily="34" charset="0"/>
+              </a:endParaRPr>
             </a:p>
             <a:p>
               <a:endParaRPr lang="en-US" altLang="zh-TW" sz="1200" dirty="0" smtClean="0">
@@ -3616,7 +3650,7 @@
         </p:nvGrpSpPr>
         <p:grpSpPr>
           <a:xfrm>
-            <a:off x="2979067" y="2117086"/>
+            <a:off x="2950492" y="1985898"/>
             <a:ext cx="3542048" cy="1888779"/>
             <a:chOff x="338138" y="2514600"/>
             <a:chExt cx="3370262" cy="1888779"/>
@@ -3839,10 +3873,10 @@
         </p:nvGrpSpPr>
         <p:grpSpPr>
           <a:xfrm>
-            <a:off x="2979067" y="4241489"/>
-            <a:ext cx="3586833" cy="2732599"/>
+            <a:off x="2950307" y="4025525"/>
+            <a:ext cx="3812443" cy="3286597"/>
             <a:chOff x="338138" y="2514600"/>
-            <a:chExt cx="3370262" cy="2732599"/>
+            <a:chExt cx="3370262" cy="3286597"/>
           </a:xfrm>
         </p:grpSpPr>
         <p:sp>
@@ -3926,7 +3960,7 @@
           <p:spPr>
             <a:xfrm>
               <a:off x="338138" y="3085069"/>
-              <a:ext cx="3370262" cy="2162130"/>
+              <a:ext cx="3370262" cy="2716128"/>
             </a:xfrm>
             <a:prstGeom prst="rect">
               <a:avLst/>
@@ -3985,19 +4019,46 @@
                 <a:t>Develop </a:t>
               </a:r>
               <a:r>
-                <a:rPr lang="en-US" altLang="zh-TW" sz="1200" dirty="0">
+                <a:rPr lang="en-US" altLang="zh-TW" sz="1200" dirty="0" smtClean="0">
                   <a:latin typeface="+mj-lt"/>
                   <a:cs typeface="Arial" panose="020B0604020202020204" pitchFamily="34" charset="0"/>
                 </a:rPr>
-                <a:t>&amp; Verify </a:t>
+                <a:t>TCG </a:t>
               </a:r>
               <a:r>
                 <a:rPr lang="en-US" altLang="zh-TW" sz="1200" dirty="0" smtClean="0">
                   <a:latin typeface="+mj-lt"/>
                   <a:cs typeface="Arial" panose="020B0604020202020204" pitchFamily="34" charset="0"/>
                 </a:rPr>
-                <a:t>TCG Security features</a:t>
-              </a:r>
+                <a:t>Security </a:t>
+              </a:r>
+              <a:r>
+                <a:rPr lang="en-US" altLang="zh-TW" sz="1200" dirty="0" smtClean="0">
+                  <a:latin typeface="+mj-lt"/>
+                  <a:cs typeface="Arial" panose="020B0604020202020204" pitchFamily="34" charset="0"/>
+                </a:rPr>
+                <a:t>features</a:t>
+              </a:r>
+            </a:p>
+            <a:p>
+              <a:pPr marL="171450" indent="-171450">
+                <a:lnSpc>
+                  <a:spcPct val="150000"/>
+                </a:lnSpc>
+                <a:buFontTx/>
+                <a:buChar char="-"/>
+              </a:pPr>
+              <a:r>
+                <a:rPr lang="en-US" altLang="zh-TW" sz="1200" dirty="0" smtClean="0">
+                  <a:latin typeface="+mj-lt"/>
+                  <a:cs typeface="Arial" panose="020B0604020202020204" pitchFamily="34" charset="0"/>
+                </a:rPr>
+                <a:t>Design verification flow and develop verification scripts</a:t>
+              </a:r>
+              <a:endParaRPr lang="en-US" altLang="zh-TW" sz="1200" dirty="0" smtClean="0">
+                <a:latin typeface="+mj-lt"/>
+                <a:cs typeface="Arial" panose="020B0604020202020204" pitchFamily="34" charset="0"/>
+              </a:endParaRPr>
             </a:p>
             <a:p>
               <a:pPr marL="171450" indent="-171450">
@@ -4129,7 +4190,7 @@
         </p:nvGrpSpPr>
         <p:grpSpPr>
           <a:xfrm>
-            <a:off x="2979067" y="7209713"/>
+            <a:off x="2950492" y="7209713"/>
             <a:ext cx="3542048" cy="2565887"/>
             <a:chOff x="338138" y="2514600"/>
             <a:chExt cx="3370262" cy="2565887"/>
@@ -4282,42 +4343,21 @@
                   <a:latin typeface="+mj-lt"/>
                   <a:cs typeface="Arial" panose="020B0604020202020204" pitchFamily="34" charset="0"/>
                 </a:rPr>
-                <a:t> Tung </a:t>
-              </a:r>
-              <a:r>
-                <a:rPr lang="en-US" altLang="zh-TW" sz="1200" b="1" dirty="0" smtClean="0">
+                <a:t> Tung University</a:t>
+              </a:r>
+              <a:r>
+                <a:rPr lang="zh-TW" altLang="en-US" sz="1200" dirty="0" smtClean="0">
                   <a:latin typeface="+mj-lt"/>
                   <a:cs typeface="Arial" panose="020B0604020202020204" pitchFamily="34" charset="0"/>
                 </a:rPr>
-                <a:t>University</a:t>
-              </a:r>
-              <a:r>
-                <a:rPr lang="zh-TW" altLang="en-US" sz="1200" dirty="0" smtClean="0">
+                <a:t> </a:t>
+              </a:r>
+              <a:r>
+                <a:rPr lang="en-US" altLang="zh-TW" sz="1200" dirty="0" smtClean="0">
                   <a:latin typeface="+mj-lt"/>
                   <a:cs typeface="Arial" panose="020B0604020202020204" pitchFamily="34" charset="0"/>
                 </a:rPr>
-                <a:t> </a:t>
-              </a:r>
-              <a:r>
-                <a:rPr lang="en-US" altLang="zh-TW" sz="1200" dirty="0" smtClean="0">
-                  <a:latin typeface="+mj-lt"/>
-                  <a:cs typeface="Arial" panose="020B0604020202020204" pitchFamily="34" charset="0"/>
-                </a:rPr>
-                <a:t>(Sep </a:t>
-              </a:r>
-              <a:r>
-                <a:rPr lang="en-US" altLang="zh-TW" sz="1200" dirty="0" smtClean="0">
-                  <a:latin typeface="+mj-lt"/>
-                  <a:cs typeface="Arial" panose="020B0604020202020204" pitchFamily="34" charset="0"/>
-                </a:rPr>
-                <a:t>2018 – Aug </a:t>
-              </a:r>
-              <a:r>
-                <a:rPr lang="en-US" altLang="zh-TW" sz="1200" dirty="0" smtClean="0">
-                  <a:latin typeface="+mj-lt"/>
-                  <a:cs typeface="Arial" panose="020B0604020202020204" pitchFamily="34" charset="0"/>
-                </a:rPr>
-                <a:t>2020)</a:t>
+                <a:t>(Sep 2018 – Aug 2020)</a:t>
               </a:r>
               <a:endParaRPr lang="en-US" altLang="zh-TW" sz="1200" dirty="0">
                 <a:latin typeface="+mj-lt"/>

</xml_diff>

<commit_message>
Site updated: 2024-02-24 02:10:26
</commit_message>
<xml_diff>
--- a/attaches/PKHuang_Resume.pptx
+++ b/attaches/PKHuang_Resume.pptx
@@ -3592,10 +3592,6 @@
                 </a:rPr>
                 <a:t>C</a:t>
               </a:r>
-              <a:endParaRPr lang="en-US" altLang="zh-TW" sz="1200" dirty="0" smtClean="0">
-                <a:latin typeface="+mj-lt"/>
-                <a:cs typeface="Arial" panose="020B0604020202020204" pitchFamily="34" charset="0"/>
-              </a:endParaRPr>
             </a:p>
             <a:p>
               <a:endParaRPr lang="en-US" altLang="zh-TW" sz="1200" dirty="0" smtClean="0">
@@ -3650,10 +3646,10 @@
         </p:nvGrpSpPr>
         <p:grpSpPr>
           <a:xfrm>
-            <a:off x="2950492" y="1985898"/>
-            <a:ext cx="3542048" cy="1888779"/>
+            <a:off x="2950492" y="2129919"/>
+            <a:ext cx="3542048" cy="1704113"/>
             <a:chOff x="338138" y="2514600"/>
-            <a:chExt cx="3370262" cy="1888779"/>
+            <a:chExt cx="3370262" cy="1704113"/>
           </a:xfrm>
         </p:grpSpPr>
         <p:sp>
@@ -3737,7 +3733,7 @@
           <p:spPr>
             <a:xfrm>
               <a:off x="338138" y="3085069"/>
-              <a:ext cx="3370262" cy="1318310"/>
+              <a:ext cx="3370262" cy="1133644"/>
             </a:xfrm>
             <a:prstGeom prst="rect">
               <a:avLst/>
@@ -3810,52 +3806,10 @@
                 </a:spcBef>
               </a:pPr>
               <a:r>
-                <a:rPr lang="en-US" altLang="zh-TW" sz="1200" dirty="0">
-                  <a:latin typeface="+mj-lt"/>
-                </a:rPr>
-                <a:t>I have been working as a </a:t>
-              </a:r>
-              <a:r>
-                <a:rPr lang="en-US" altLang="zh-TW" sz="1200" b="1" dirty="0">
-                  <a:latin typeface="+mj-lt"/>
-                </a:rPr>
-                <a:t>firmware engineer</a:t>
-              </a:r>
-              <a:r>
-                <a:rPr lang="en-US" altLang="zh-TW" sz="1200" dirty="0">
-                  <a:latin typeface="+mj-lt"/>
-                </a:rPr>
-                <a:t> </a:t>
-              </a:r>
-              <a:r>
                 <a:rPr lang="en-US" altLang="zh-TW" sz="1200" dirty="0" smtClean="0">
                   <a:latin typeface="+mj-lt"/>
                 </a:rPr>
-                <a:t>since </a:t>
-              </a:r>
-              <a:r>
-                <a:rPr lang="en-US" altLang="zh-TW" sz="1200" dirty="0">
-                  <a:latin typeface="+mj-lt"/>
-                </a:rPr>
-                <a:t>2021. I am a fast learner with strong logical reasoning </a:t>
-              </a:r>
-              <a:r>
-                <a:rPr lang="en-US" altLang="zh-TW" sz="1200" dirty="0" smtClean="0">
-                  <a:latin typeface="+mj-lt"/>
-                </a:rPr>
-                <a:t>skills, which makes me </a:t>
-              </a:r>
-              <a:r>
-                <a:rPr lang="en-US" altLang="zh-TW" sz="1200" dirty="0">
-                  <a:latin typeface="+mj-lt"/>
-                </a:rPr>
-                <a:t>identify </a:t>
-              </a:r>
-              <a:r>
-                <a:rPr lang="en-US" altLang="zh-TW" sz="1200" dirty="0" smtClean="0">
-                  <a:latin typeface="+mj-lt"/>
-                </a:rPr>
-                <a:t>issues more efficiently.</a:t>
+                <a:t>I have learned System Verilog and UVM from online resources, and hope to be part of the DV team.</a:t>
               </a:r>
               <a:endParaRPr lang="zh-TW" altLang="en-US" sz="1200" dirty="0">
                 <a:latin typeface="+mj-lt"/>
@@ -3873,7 +3827,7 @@
         </p:nvGrpSpPr>
         <p:grpSpPr>
           <a:xfrm>
-            <a:off x="2950307" y="4025525"/>
+            <a:off x="2950492" y="4032795"/>
             <a:ext cx="3812443" cy="3286597"/>
             <a:chOff x="338138" y="2514600"/>
             <a:chExt cx="3370262" cy="3286597"/>
@@ -4016,28 +3970,7 @@
                   <a:latin typeface="+mj-lt"/>
                   <a:cs typeface="Arial" panose="020B0604020202020204" pitchFamily="34" charset="0"/>
                 </a:rPr>
-                <a:t>Develop </a:t>
-              </a:r>
-              <a:r>
-                <a:rPr lang="en-US" altLang="zh-TW" sz="1200" dirty="0" smtClean="0">
-                  <a:latin typeface="+mj-lt"/>
-                  <a:cs typeface="Arial" panose="020B0604020202020204" pitchFamily="34" charset="0"/>
-                </a:rPr>
-                <a:t>TCG </a:t>
-              </a:r>
-              <a:r>
-                <a:rPr lang="en-US" altLang="zh-TW" sz="1200" dirty="0" smtClean="0">
-                  <a:latin typeface="+mj-lt"/>
-                  <a:cs typeface="Arial" panose="020B0604020202020204" pitchFamily="34" charset="0"/>
-                </a:rPr>
-                <a:t>Security </a:t>
-              </a:r>
-              <a:r>
-                <a:rPr lang="en-US" altLang="zh-TW" sz="1200" dirty="0" smtClean="0">
-                  <a:latin typeface="+mj-lt"/>
-                  <a:cs typeface="Arial" panose="020B0604020202020204" pitchFamily="34" charset="0"/>
-                </a:rPr>
-                <a:t>features</a:t>
+                <a:t>Develop TCG Security features</a:t>
               </a:r>
             </a:p>
             <a:p>
@@ -4055,10 +3988,6 @@
                 </a:rPr>
                 <a:t>Design verification flow and develop verification scripts</a:t>
               </a:r>
-              <a:endParaRPr lang="en-US" altLang="zh-TW" sz="1200" dirty="0" smtClean="0">
-                <a:latin typeface="+mj-lt"/>
-                <a:cs typeface="Arial" panose="020B0604020202020204" pitchFamily="34" charset="0"/>
-              </a:endParaRPr>
             </a:p>
             <a:p>
               <a:pPr marL="171450" indent="-171450">
@@ -4486,35 +4415,14 @@
                   <a:latin typeface="+mj-lt"/>
                   <a:cs typeface="Arial" panose="020B0604020202020204" pitchFamily="34" charset="0"/>
                 </a:rPr>
-                <a:t>National Central </a:t>
-              </a:r>
-              <a:r>
-                <a:rPr lang="en-US" altLang="zh-TW" sz="1200" b="1" smtClean="0">
+                <a:t>National Central University </a:t>
+              </a:r>
+              <a:r>
+                <a:rPr lang="en-US" altLang="zh-TW" sz="1200" dirty="0" smtClean="0">
                   <a:latin typeface="+mj-lt"/>
                   <a:cs typeface="Arial" panose="020B0604020202020204" pitchFamily="34" charset="0"/>
                 </a:rPr>
-                <a:t>University </a:t>
-              </a:r>
-              <a:r>
-                <a:rPr lang="en-US" altLang="zh-TW" sz="1200" smtClean="0">
-                  <a:latin typeface="+mj-lt"/>
-                  <a:cs typeface="Arial" panose="020B0604020202020204" pitchFamily="34" charset="0"/>
-                </a:rPr>
-                <a:t>(Sep </a:t>
-              </a:r>
-              <a:r>
-                <a:rPr lang="en-US" altLang="zh-TW" sz="1200" dirty="0" smtClean="0">
-                  <a:latin typeface="+mj-lt"/>
-                  <a:cs typeface="Arial" panose="020B0604020202020204" pitchFamily="34" charset="0"/>
-                </a:rPr>
-                <a:t>2013 – </a:t>
-              </a:r>
-              <a:r>
-                <a:rPr lang="en-US" altLang="zh-TW" sz="1200" smtClean="0">
-                  <a:latin typeface="+mj-lt"/>
-                  <a:cs typeface="Arial" panose="020B0604020202020204" pitchFamily="34" charset="0"/>
-                </a:rPr>
-                <a:t>Jun 2017)</a:t>
+                <a:t>(Sep 2013 – Jun 2017)</a:t>
               </a:r>
               <a:endParaRPr lang="en-US" altLang="zh-TW" sz="1200" dirty="0">
                 <a:latin typeface="+mj-lt"/>

</xml_diff>

<commit_message>
Site updated: 2025-06-14 23:03:13
</commit_message>
<xml_diff>
--- a/attaches/PKHuang_Resume.pptx
+++ b/attaches/PKHuang_Resume.pptx
@@ -2,10 +2,10 @@
 <file path=ppt/presentation.xml><?xml version="1.0" encoding="utf-8"?>
 <p:presentation xmlns:a="http://schemas.openxmlformats.org/drawingml/2006/main" xmlns:r="http://schemas.openxmlformats.org/officeDocument/2006/relationships" xmlns:p="http://schemas.openxmlformats.org/presentationml/2006/main" saveSubsetFonts="1">
   <p:sldMasterIdLst>
-    <p:sldMasterId id="2147483660" r:id="rId1"/>
+    <p:sldMasterId id="2147483672" r:id="rId1"/>
   </p:sldMasterIdLst>
   <p:sldIdLst>
-    <p:sldId id="256" r:id="rId2"/>
+    <p:sldId id="257" r:id="rId2"/>
   </p:sldIdLst>
   <p:sldSz cx="6858000" cy="9906000" type="A4"/>
   <p:notesSz cx="6858000" cy="9144000"/>
@@ -241,9 +241,9 @@
           <a:bodyPr/>
           <a:lstStyle/>
           <a:p>
-            <a:fld id="{D9B27627-1ABF-4570-89B7-2F2CE923F251}" type="datetimeFigureOut">
-              <a:rPr lang="zh-TW" altLang="en-US" smtClean="0"/>
-              <a:t>2024/2/24</a:t>
+            <a:fld id="{090B76F5-00DB-4EFF-A778-474511B35808}" type="datetimeFigureOut">
+              <a:rPr lang="zh-TW" altLang="en-US" smtClean="0"/>
+              <a:t>2025/6/14</a:t>
             </a:fld>
             <a:endParaRPr lang="zh-TW" altLang="en-US"/>
           </a:p>
@@ -283,7 +283,7 @@
           <a:bodyPr/>
           <a:lstStyle/>
           <a:p>
-            <a:fld id="{D941FF32-E1CF-4B72-818D-6E09D290434D}" type="slidenum">
+            <a:fld id="{73FB31EC-6808-440A-B686-8BAE0DF0B705}" type="slidenum">
               <a:rPr lang="zh-TW" altLang="en-US" smtClean="0"/>
               <a:t>‹#›</a:t>
             </a:fld>
@@ -294,7 +294,7 @@
     </p:spTree>
     <p:extLst>
       <p:ext uri="{BB962C8B-B14F-4D97-AF65-F5344CB8AC3E}">
-        <p14:creationId xmlns:p14="http://schemas.microsoft.com/office/powerpoint/2010/main" val="3014977900"/>
+        <p14:creationId xmlns:p14="http://schemas.microsoft.com/office/powerpoint/2010/main" val="4079377015"/>
       </p:ext>
     </p:extLst>
   </p:cSld>
@@ -411,9 +411,9 @@
           <a:bodyPr/>
           <a:lstStyle/>
           <a:p>
-            <a:fld id="{D9B27627-1ABF-4570-89B7-2F2CE923F251}" type="datetimeFigureOut">
-              <a:rPr lang="zh-TW" altLang="en-US" smtClean="0"/>
-              <a:t>2024/2/24</a:t>
+            <a:fld id="{090B76F5-00DB-4EFF-A778-474511B35808}" type="datetimeFigureOut">
+              <a:rPr lang="zh-TW" altLang="en-US" smtClean="0"/>
+              <a:t>2025/6/14</a:t>
             </a:fld>
             <a:endParaRPr lang="zh-TW" altLang="en-US"/>
           </a:p>
@@ -453,7 +453,7 @@
           <a:bodyPr/>
           <a:lstStyle/>
           <a:p>
-            <a:fld id="{D941FF32-E1CF-4B72-818D-6E09D290434D}" type="slidenum">
+            <a:fld id="{73FB31EC-6808-440A-B686-8BAE0DF0B705}" type="slidenum">
               <a:rPr lang="zh-TW" altLang="en-US" smtClean="0"/>
               <a:t>‹#›</a:t>
             </a:fld>
@@ -464,7 +464,7 @@
     </p:spTree>
     <p:extLst>
       <p:ext uri="{BB962C8B-B14F-4D97-AF65-F5344CB8AC3E}">
-        <p14:creationId xmlns:p14="http://schemas.microsoft.com/office/powerpoint/2010/main" val="3875976187"/>
+        <p14:creationId xmlns:p14="http://schemas.microsoft.com/office/powerpoint/2010/main" val="1007097745"/>
       </p:ext>
     </p:extLst>
   </p:cSld>
@@ -591,9 +591,9 @@
           <a:bodyPr/>
           <a:lstStyle/>
           <a:p>
-            <a:fld id="{D9B27627-1ABF-4570-89B7-2F2CE923F251}" type="datetimeFigureOut">
-              <a:rPr lang="zh-TW" altLang="en-US" smtClean="0"/>
-              <a:t>2024/2/24</a:t>
+            <a:fld id="{090B76F5-00DB-4EFF-A778-474511B35808}" type="datetimeFigureOut">
+              <a:rPr lang="zh-TW" altLang="en-US" smtClean="0"/>
+              <a:t>2025/6/14</a:t>
             </a:fld>
             <a:endParaRPr lang="zh-TW" altLang="en-US"/>
           </a:p>
@@ -633,7 +633,7 @@
           <a:bodyPr/>
           <a:lstStyle/>
           <a:p>
-            <a:fld id="{D941FF32-E1CF-4B72-818D-6E09D290434D}" type="slidenum">
+            <a:fld id="{73FB31EC-6808-440A-B686-8BAE0DF0B705}" type="slidenum">
               <a:rPr lang="zh-TW" altLang="en-US" smtClean="0"/>
               <a:t>‹#›</a:t>
             </a:fld>
@@ -644,7 +644,7 @@
     </p:spTree>
     <p:extLst>
       <p:ext uri="{BB962C8B-B14F-4D97-AF65-F5344CB8AC3E}">
-        <p14:creationId xmlns:p14="http://schemas.microsoft.com/office/powerpoint/2010/main" val="2558790726"/>
+        <p14:creationId xmlns:p14="http://schemas.microsoft.com/office/powerpoint/2010/main" val="568661888"/>
       </p:ext>
     </p:extLst>
   </p:cSld>
@@ -761,9 +761,9 @@
           <a:bodyPr/>
           <a:lstStyle/>
           <a:p>
-            <a:fld id="{D9B27627-1ABF-4570-89B7-2F2CE923F251}" type="datetimeFigureOut">
-              <a:rPr lang="zh-TW" altLang="en-US" smtClean="0"/>
-              <a:t>2024/2/24</a:t>
+            <a:fld id="{090B76F5-00DB-4EFF-A778-474511B35808}" type="datetimeFigureOut">
+              <a:rPr lang="zh-TW" altLang="en-US" smtClean="0"/>
+              <a:t>2025/6/14</a:t>
             </a:fld>
             <a:endParaRPr lang="zh-TW" altLang="en-US"/>
           </a:p>
@@ -803,7 +803,7 @@
           <a:bodyPr/>
           <a:lstStyle/>
           <a:p>
-            <a:fld id="{D941FF32-E1CF-4B72-818D-6E09D290434D}" type="slidenum">
+            <a:fld id="{73FB31EC-6808-440A-B686-8BAE0DF0B705}" type="slidenum">
               <a:rPr lang="zh-TW" altLang="en-US" smtClean="0"/>
               <a:t>‹#›</a:t>
             </a:fld>
@@ -814,7 +814,7 @@
     </p:spTree>
     <p:extLst>
       <p:ext uri="{BB962C8B-B14F-4D97-AF65-F5344CB8AC3E}">
-        <p14:creationId xmlns:p14="http://schemas.microsoft.com/office/powerpoint/2010/main" val="1165339088"/>
+        <p14:creationId xmlns:p14="http://schemas.microsoft.com/office/powerpoint/2010/main" val="393405012"/>
       </p:ext>
     </p:extLst>
   </p:cSld>
@@ -1005,9 +1005,9 @@
           <a:bodyPr/>
           <a:lstStyle/>
           <a:p>
-            <a:fld id="{D9B27627-1ABF-4570-89B7-2F2CE923F251}" type="datetimeFigureOut">
-              <a:rPr lang="zh-TW" altLang="en-US" smtClean="0"/>
-              <a:t>2024/2/24</a:t>
+            <a:fld id="{090B76F5-00DB-4EFF-A778-474511B35808}" type="datetimeFigureOut">
+              <a:rPr lang="zh-TW" altLang="en-US" smtClean="0"/>
+              <a:t>2025/6/14</a:t>
             </a:fld>
             <a:endParaRPr lang="zh-TW" altLang="en-US"/>
           </a:p>
@@ -1047,7 +1047,7 @@
           <a:bodyPr/>
           <a:lstStyle/>
           <a:p>
-            <a:fld id="{D941FF32-E1CF-4B72-818D-6E09D290434D}" type="slidenum">
+            <a:fld id="{73FB31EC-6808-440A-B686-8BAE0DF0B705}" type="slidenum">
               <a:rPr lang="zh-TW" altLang="en-US" smtClean="0"/>
               <a:t>‹#›</a:t>
             </a:fld>
@@ -1058,7 +1058,7 @@
     </p:spTree>
     <p:extLst>
       <p:ext uri="{BB962C8B-B14F-4D97-AF65-F5344CB8AC3E}">
-        <p14:creationId xmlns:p14="http://schemas.microsoft.com/office/powerpoint/2010/main" val="4161440879"/>
+        <p14:creationId xmlns:p14="http://schemas.microsoft.com/office/powerpoint/2010/main" val="212603943"/>
       </p:ext>
     </p:extLst>
   </p:cSld>
@@ -1237,9 +1237,9 @@
           <a:bodyPr/>
           <a:lstStyle/>
           <a:p>
-            <a:fld id="{D9B27627-1ABF-4570-89B7-2F2CE923F251}" type="datetimeFigureOut">
-              <a:rPr lang="zh-TW" altLang="en-US" smtClean="0"/>
-              <a:t>2024/2/24</a:t>
+            <a:fld id="{090B76F5-00DB-4EFF-A778-474511B35808}" type="datetimeFigureOut">
+              <a:rPr lang="zh-TW" altLang="en-US" smtClean="0"/>
+              <a:t>2025/6/14</a:t>
             </a:fld>
             <a:endParaRPr lang="zh-TW" altLang="en-US"/>
           </a:p>
@@ -1279,7 +1279,7 @@
           <a:bodyPr/>
           <a:lstStyle/>
           <a:p>
-            <a:fld id="{D941FF32-E1CF-4B72-818D-6E09D290434D}" type="slidenum">
+            <a:fld id="{73FB31EC-6808-440A-B686-8BAE0DF0B705}" type="slidenum">
               <a:rPr lang="zh-TW" altLang="en-US" smtClean="0"/>
               <a:t>‹#›</a:t>
             </a:fld>
@@ -1290,7 +1290,7 @@
     </p:spTree>
     <p:extLst>
       <p:ext uri="{BB962C8B-B14F-4D97-AF65-F5344CB8AC3E}">
-        <p14:creationId xmlns:p14="http://schemas.microsoft.com/office/powerpoint/2010/main" val="1061337704"/>
+        <p14:creationId xmlns:p14="http://schemas.microsoft.com/office/powerpoint/2010/main" val="633762519"/>
       </p:ext>
     </p:extLst>
   </p:cSld>
@@ -1604,9 +1604,9 @@
           <a:bodyPr/>
           <a:lstStyle/>
           <a:p>
-            <a:fld id="{D9B27627-1ABF-4570-89B7-2F2CE923F251}" type="datetimeFigureOut">
-              <a:rPr lang="zh-TW" altLang="en-US" smtClean="0"/>
-              <a:t>2024/2/24</a:t>
+            <a:fld id="{090B76F5-00DB-4EFF-A778-474511B35808}" type="datetimeFigureOut">
+              <a:rPr lang="zh-TW" altLang="en-US" smtClean="0"/>
+              <a:t>2025/6/14</a:t>
             </a:fld>
             <a:endParaRPr lang="zh-TW" altLang="en-US"/>
           </a:p>
@@ -1646,7 +1646,7 @@
           <a:bodyPr/>
           <a:lstStyle/>
           <a:p>
-            <a:fld id="{D941FF32-E1CF-4B72-818D-6E09D290434D}" type="slidenum">
+            <a:fld id="{73FB31EC-6808-440A-B686-8BAE0DF0B705}" type="slidenum">
               <a:rPr lang="zh-TW" altLang="en-US" smtClean="0"/>
               <a:t>‹#›</a:t>
             </a:fld>
@@ -1657,7 +1657,7 @@
     </p:spTree>
     <p:extLst>
       <p:ext uri="{BB962C8B-B14F-4D97-AF65-F5344CB8AC3E}">
-        <p14:creationId xmlns:p14="http://schemas.microsoft.com/office/powerpoint/2010/main" val="1645065338"/>
+        <p14:creationId xmlns:p14="http://schemas.microsoft.com/office/powerpoint/2010/main" val="2497822574"/>
       </p:ext>
     </p:extLst>
   </p:cSld>
@@ -1722,9 +1722,9 @@
           <a:bodyPr/>
           <a:lstStyle/>
           <a:p>
-            <a:fld id="{D9B27627-1ABF-4570-89B7-2F2CE923F251}" type="datetimeFigureOut">
-              <a:rPr lang="zh-TW" altLang="en-US" smtClean="0"/>
-              <a:t>2024/2/24</a:t>
+            <a:fld id="{090B76F5-00DB-4EFF-A778-474511B35808}" type="datetimeFigureOut">
+              <a:rPr lang="zh-TW" altLang="en-US" smtClean="0"/>
+              <a:t>2025/6/14</a:t>
             </a:fld>
             <a:endParaRPr lang="zh-TW" altLang="en-US"/>
           </a:p>
@@ -1764,7 +1764,7 @@
           <a:bodyPr/>
           <a:lstStyle/>
           <a:p>
-            <a:fld id="{D941FF32-E1CF-4B72-818D-6E09D290434D}" type="slidenum">
+            <a:fld id="{73FB31EC-6808-440A-B686-8BAE0DF0B705}" type="slidenum">
               <a:rPr lang="zh-TW" altLang="en-US" smtClean="0"/>
               <a:t>‹#›</a:t>
             </a:fld>
@@ -1775,7 +1775,7 @@
     </p:spTree>
     <p:extLst>
       <p:ext uri="{BB962C8B-B14F-4D97-AF65-F5344CB8AC3E}">
-        <p14:creationId xmlns:p14="http://schemas.microsoft.com/office/powerpoint/2010/main" val="3015898163"/>
+        <p14:creationId xmlns:p14="http://schemas.microsoft.com/office/powerpoint/2010/main" val="258010727"/>
       </p:ext>
     </p:extLst>
   </p:cSld>
@@ -1817,9 +1817,9 @@
           <a:bodyPr/>
           <a:lstStyle/>
           <a:p>
-            <a:fld id="{D9B27627-1ABF-4570-89B7-2F2CE923F251}" type="datetimeFigureOut">
-              <a:rPr lang="zh-TW" altLang="en-US" smtClean="0"/>
-              <a:t>2024/2/24</a:t>
+            <a:fld id="{090B76F5-00DB-4EFF-A778-474511B35808}" type="datetimeFigureOut">
+              <a:rPr lang="zh-TW" altLang="en-US" smtClean="0"/>
+              <a:t>2025/6/14</a:t>
             </a:fld>
             <a:endParaRPr lang="zh-TW" altLang="en-US"/>
           </a:p>
@@ -1859,7 +1859,7 @@
           <a:bodyPr/>
           <a:lstStyle/>
           <a:p>
-            <a:fld id="{D941FF32-E1CF-4B72-818D-6E09D290434D}" type="slidenum">
+            <a:fld id="{73FB31EC-6808-440A-B686-8BAE0DF0B705}" type="slidenum">
               <a:rPr lang="zh-TW" altLang="en-US" smtClean="0"/>
               <a:t>‹#›</a:t>
             </a:fld>
@@ -1870,7 +1870,7 @@
     </p:spTree>
     <p:extLst>
       <p:ext uri="{BB962C8B-B14F-4D97-AF65-F5344CB8AC3E}">
-        <p14:creationId xmlns:p14="http://schemas.microsoft.com/office/powerpoint/2010/main" val="1965527697"/>
+        <p14:creationId xmlns:p14="http://schemas.microsoft.com/office/powerpoint/2010/main" val="2069066299"/>
       </p:ext>
     </p:extLst>
   </p:cSld>
@@ -2094,9 +2094,9 @@
           <a:bodyPr/>
           <a:lstStyle/>
           <a:p>
-            <a:fld id="{D9B27627-1ABF-4570-89B7-2F2CE923F251}" type="datetimeFigureOut">
-              <a:rPr lang="zh-TW" altLang="en-US" smtClean="0"/>
-              <a:t>2024/2/24</a:t>
+            <a:fld id="{090B76F5-00DB-4EFF-A778-474511B35808}" type="datetimeFigureOut">
+              <a:rPr lang="zh-TW" altLang="en-US" smtClean="0"/>
+              <a:t>2025/6/14</a:t>
             </a:fld>
             <a:endParaRPr lang="zh-TW" altLang="en-US"/>
           </a:p>
@@ -2136,7 +2136,7 @@
           <a:bodyPr/>
           <a:lstStyle/>
           <a:p>
-            <a:fld id="{D941FF32-E1CF-4B72-818D-6E09D290434D}" type="slidenum">
+            <a:fld id="{73FB31EC-6808-440A-B686-8BAE0DF0B705}" type="slidenum">
               <a:rPr lang="zh-TW" altLang="en-US" smtClean="0"/>
               <a:t>‹#›</a:t>
             </a:fld>
@@ -2147,7 +2147,7 @@
     </p:spTree>
     <p:extLst>
       <p:ext uri="{BB962C8B-B14F-4D97-AF65-F5344CB8AC3E}">
-        <p14:creationId xmlns:p14="http://schemas.microsoft.com/office/powerpoint/2010/main" val="463999470"/>
+        <p14:creationId xmlns:p14="http://schemas.microsoft.com/office/powerpoint/2010/main" val="2262880646"/>
       </p:ext>
     </p:extLst>
   </p:cSld>
@@ -2351,9 +2351,9 @@
           <a:bodyPr/>
           <a:lstStyle/>
           <a:p>
-            <a:fld id="{D9B27627-1ABF-4570-89B7-2F2CE923F251}" type="datetimeFigureOut">
-              <a:rPr lang="zh-TW" altLang="en-US" smtClean="0"/>
-              <a:t>2024/2/24</a:t>
+            <a:fld id="{090B76F5-00DB-4EFF-A778-474511B35808}" type="datetimeFigureOut">
+              <a:rPr lang="zh-TW" altLang="en-US" smtClean="0"/>
+              <a:t>2025/6/14</a:t>
             </a:fld>
             <a:endParaRPr lang="zh-TW" altLang="en-US"/>
           </a:p>
@@ -2393,7 +2393,7 @@
           <a:bodyPr/>
           <a:lstStyle/>
           <a:p>
-            <a:fld id="{D941FF32-E1CF-4B72-818D-6E09D290434D}" type="slidenum">
+            <a:fld id="{73FB31EC-6808-440A-B686-8BAE0DF0B705}" type="slidenum">
               <a:rPr lang="zh-TW" altLang="en-US" smtClean="0"/>
               <a:t>‹#›</a:t>
             </a:fld>
@@ -2404,7 +2404,7 @@
     </p:spTree>
     <p:extLst>
       <p:ext uri="{BB962C8B-B14F-4D97-AF65-F5344CB8AC3E}">
-        <p14:creationId xmlns:p14="http://schemas.microsoft.com/office/powerpoint/2010/main" val="925240570"/>
+        <p14:creationId xmlns:p14="http://schemas.microsoft.com/office/powerpoint/2010/main" val="882831657"/>
       </p:ext>
     </p:extLst>
   </p:cSld>
@@ -2564,9 +2564,9 @@
             </a:lvl1pPr>
           </a:lstStyle>
           <a:p>
-            <a:fld id="{D9B27627-1ABF-4570-89B7-2F2CE923F251}" type="datetimeFigureOut">
-              <a:rPr lang="zh-TW" altLang="en-US" smtClean="0"/>
-              <a:t>2024/2/24</a:t>
+            <a:fld id="{090B76F5-00DB-4EFF-A778-474511B35808}" type="datetimeFigureOut">
+              <a:rPr lang="zh-TW" altLang="en-US" smtClean="0"/>
+              <a:t>2025/6/14</a:t>
             </a:fld>
             <a:endParaRPr lang="zh-TW" altLang="en-US"/>
           </a:p>
@@ -2642,7 +2642,7 @@
             </a:lvl1pPr>
           </a:lstStyle>
           <a:p>
-            <a:fld id="{D941FF32-E1CF-4B72-818D-6E09D290434D}" type="slidenum">
+            <a:fld id="{73FB31EC-6808-440A-B686-8BAE0DF0B705}" type="slidenum">
               <a:rPr lang="zh-TW" altLang="en-US" smtClean="0"/>
               <a:t>‹#›</a:t>
             </a:fld>
@@ -2653,23 +2653,23 @@
     </p:spTree>
     <p:extLst>
       <p:ext uri="{BB962C8B-B14F-4D97-AF65-F5344CB8AC3E}">
-        <p14:creationId xmlns:p14="http://schemas.microsoft.com/office/powerpoint/2010/main" val="1084545910"/>
+        <p14:creationId xmlns:p14="http://schemas.microsoft.com/office/powerpoint/2010/main" val="2143883365"/>
       </p:ext>
     </p:extLst>
   </p:cSld>
   <p:clrMap bg1="lt1" tx1="dk1" bg2="lt2" tx2="dk2" accent1="accent1" accent2="accent2" accent3="accent3" accent4="accent4" accent5="accent5" accent6="accent6" hlink="hlink" folHlink="folHlink"/>
   <p:sldLayoutIdLst>
-    <p:sldLayoutId id="2147483661" r:id="rId1"/>
-    <p:sldLayoutId id="2147483662" r:id="rId2"/>
-    <p:sldLayoutId id="2147483663" r:id="rId3"/>
-    <p:sldLayoutId id="2147483664" r:id="rId4"/>
-    <p:sldLayoutId id="2147483665" r:id="rId5"/>
-    <p:sldLayoutId id="2147483666" r:id="rId6"/>
-    <p:sldLayoutId id="2147483667" r:id="rId7"/>
-    <p:sldLayoutId id="2147483668" r:id="rId8"/>
-    <p:sldLayoutId id="2147483669" r:id="rId9"/>
-    <p:sldLayoutId id="2147483670" r:id="rId10"/>
-    <p:sldLayoutId id="2147483671" r:id="rId11"/>
+    <p:sldLayoutId id="2147483673" r:id="rId1"/>
+    <p:sldLayoutId id="2147483674" r:id="rId2"/>
+    <p:sldLayoutId id="2147483675" r:id="rId3"/>
+    <p:sldLayoutId id="2147483676" r:id="rId4"/>
+    <p:sldLayoutId id="2147483677" r:id="rId5"/>
+    <p:sldLayoutId id="2147483678" r:id="rId6"/>
+    <p:sldLayoutId id="2147483679" r:id="rId7"/>
+    <p:sldLayoutId id="2147483680" r:id="rId8"/>
+    <p:sldLayoutId id="2147483681" r:id="rId9"/>
+    <p:sldLayoutId id="2147483682" r:id="rId10"/>
+    <p:sldLayoutId id="2147483683" r:id="rId11"/>
   </p:sldLayoutIdLst>
   <p:txStyles>
     <p:titleStyle>
@@ -2971,66 +2971,1093 @@
           <a:chExt cx="0" cy="0"/>
         </a:xfrm>
       </p:grpSpPr>
-      <p:sp>
-        <p:nvSpPr>
-          <p:cNvPr id="4" name="矩形 3"/>
-          <p:cNvSpPr/>
+      <p:cxnSp>
+        <p:nvCxnSpPr>
+          <p:cNvPr id="23" name="直線接點 22"/>
+          <p:cNvCxnSpPr/>
           <p:nvPr/>
-        </p:nvSpPr>
+        </p:nvCxnSpPr>
         <p:spPr>
           <a:xfrm>
-            <a:off x="0" y="0"/>
-            <a:ext cx="2667000" cy="9906000"/>
+            <a:off x="391081" y="2360528"/>
+            <a:ext cx="0" cy="7117990"/>
           </a:xfrm>
-          <a:prstGeom prst="rect">
+          <a:prstGeom prst="line">
             <a:avLst/>
           </a:prstGeom>
-          <a:solidFill>
-            <a:schemeClr val="bg1">
-              <a:lumMod val="95000"/>
-            </a:schemeClr>
-          </a:solidFill>
-          <a:ln>
-            <a:noFill/>
+          <a:ln w="25400">
+            <a:solidFill>
+              <a:schemeClr val="tx1">
+                <a:lumMod val="85000"/>
+                <a:lumOff val="15000"/>
+              </a:schemeClr>
+            </a:solidFill>
           </a:ln>
         </p:spPr>
         <p:style>
-          <a:lnRef idx="2">
-            <a:schemeClr val="accent1">
-              <a:shade val="50000"/>
-            </a:schemeClr>
+          <a:lnRef idx="1">
+            <a:schemeClr val="accent1"/>
           </a:lnRef>
-          <a:fillRef idx="1">
+          <a:fillRef idx="0">
             <a:schemeClr val="accent1"/>
           </a:fillRef>
           <a:effectRef idx="0">
             <a:schemeClr val="accent1"/>
           </a:effectRef>
           <a:fontRef idx="minor">
-            <a:schemeClr val="lt1"/>
+            <a:schemeClr val="tx1"/>
           </a:fontRef>
         </p:style>
-        <p:txBody>
-          <a:bodyPr rtlCol="0" anchor="ctr"/>
-          <a:lstStyle/>
-          <a:p>
-            <a:pPr algn="ctr"/>
-            <a:endParaRPr lang="zh-TW" altLang="en-US"/>
-          </a:p>
-        </p:txBody>
-      </p:sp>
-      <p:sp>
-        <p:nvSpPr>
-          <p:cNvPr id="5" name="矩形 4"/>
+      </p:cxnSp>
+      <p:sp>
+        <p:nvSpPr>
+          <p:cNvPr id="19" name="文字方塊 18"/>
+          <p:cNvSpPr txBox="1"/>
+          <p:nvPr/>
+        </p:nvSpPr>
+        <p:spPr>
+          <a:xfrm>
+            <a:off x="730644" y="2191251"/>
+            <a:ext cx="3265638" cy="338554"/>
+          </a:xfrm>
+          <a:prstGeom prst="rect">
+            <a:avLst/>
+          </a:prstGeom>
+          <a:noFill/>
+        </p:spPr>
+        <p:txBody>
+          <a:bodyPr wrap="square" rtlCol="0">
+            <a:spAutoFit/>
+          </a:bodyPr>
+          <a:lstStyle/>
+          <a:p>
+            <a:pPr algn="dist"/>
+            <a:r>
+              <a:rPr lang="en-US" altLang="zh-TW" sz="1600" dirty="0" smtClean="0">
+                <a:solidFill>
+                  <a:schemeClr val="tx1">
+                    <a:lumMod val="85000"/>
+                    <a:lumOff val="15000"/>
+                  </a:schemeClr>
+                </a:solidFill>
+                <a:latin typeface="Arial Black" panose="020B0A04020102020204" pitchFamily="34" charset="0"/>
+              </a:rPr>
+              <a:t>PROFESSIONAL SUMMARY</a:t>
+            </a:r>
+            <a:endParaRPr lang="zh-TW" altLang="en-US" sz="1600" dirty="0">
+              <a:solidFill>
+                <a:schemeClr val="tx1">
+                  <a:lumMod val="85000"/>
+                  <a:lumOff val="15000"/>
+                </a:schemeClr>
+              </a:solidFill>
+              <a:latin typeface="Arial Black" panose="020B0A04020102020204" pitchFamily="34" charset="0"/>
+            </a:endParaRPr>
+          </a:p>
+        </p:txBody>
+      </p:sp>
+      <p:sp>
+        <p:nvSpPr>
+          <p:cNvPr id="21" name="文字方塊 20"/>
+          <p:cNvSpPr txBox="1"/>
+          <p:nvPr/>
+        </p:nvSpPr>
+        <p:spPr>
+          <a:xfrm>
+            <a:off x="730644" y="2557423"/>
+            <a:ext cx="5802504" cy="1600438"/>
+          </a:xfrm>
+          <a:prstGeom prst="rect">
+            <a:avLst/>
+          </a:prstGeom>
+          <a:noFill/>
+        </p:spPr>
+        <p:txBody>
+          <a:bodyPr wrap="square" rtlCol="0">
+            <a:spAutoFit/>
+          </a:bodyPr>
+          <a:lstStyle/>
+          <a:p>
+            <a:pPr algn="just"/>
+            <a:r>
+              <a:rPr lang="en-US" altLang="zh-TW" sz="1400" dirty="0">
+                <a:solidFill>
+                  <a:schemeClr val="tx1">
+                    <a:lumMod val="85000"/>
+                    <a:lumOff val="15000"/>
+                  </a:schemeClr>
+                </a:solidFill>
+              </a:rPr>
+              <a:t>Experienced engineer with 1 year in design verification and 3.5 years in firmware development. Skilled in collaborating with clients to define test plans and design test vectors, and experienced in working closely with in-house designers for efficient debugging. Proficient in FPV and using SVA to verify submodule behaviors. Highly self-motivated, dedicating personal time to mastering UVM library internals and building UVM VIPs to strengthen practical and theoretical understanding</a:t>
+            </a:r>
+            <a:r>
+              <a:rPr lang="en-US" altLang="zh-TW" sz="1400" dirty="0" smtClean="0">
+                <a:solidFill>
+                  <a:schemeClr val="tx1">
+                    <a:lumMod val="85000"/>
+                    <a:lumOff val="15000"/>
+                  </a:schemeClr>
+                </a:solidFill>
+              </a:rPr>
+              <a:t>. </a:t>
+            </a:r>
+            <a:endParaRPr lang="zh-TW" altLang="en-US" sz="1100" dirty="0">
+              <a:solidFill>
+                <a:schemeClr val="tx1">
+                  <a:lumMod val="85000"/>
+                  <a:lumOff val="15000"/>
+                </a:schemeClr>
+              </a:solidFill>
+            </a:endParaRPr>
+          </a:p>
+        </p:txBody>
+      </p:sp>
+      <p:sp>
+        <p:nvSpPr>
+          <p:cNvPr id="17" name="文字方塊 16"/>
+          <p:cNvSpPr txBox="1"/>
+          <p:nvPr/>
+        </p:nvSpPr>
+        <p:spPr>
+          <a:xfrm>
+            <a:off x="541820" y="1584047"/>
+            <a:ext cx="3237168" cy="369332"/>
+          </a:xfrm>
+          <a:prstGeom prst="rect">
+            <a:avLst/>
+          </a:prstGeom>
+          <a:noFill/>
+        </p:spPr>
+        <p:txBody>
+          <a:bodyPr wrap="none" rtlCol="0">
+            <a:spAutoFit/>
+          </a:bodyPr>
+          <a:lstStyle/>
+          <a:p>
+            <a:r>
+              <a:rPr lang="en-US" altLang="zh-TW" dirty="0" smtClean="0">
+                <a:solidFill>
+                  <a:schemeClr val="tx1">
+                    <a:lumMod val="85000"/>
+                    <a:lumOff val="15000"/>
+                  </a:schemeClr>
+                </a:solidFill>
+                <a:latin typeface="微軟正黑體" panose="020B0604030504040204" pitchFamily="34" charset="-120"/>
+                <a:ea typeface="微軟正黑體" panose="020B0604030504040204" pitchFamily="34" charset="-120"/>
+              </a:rPr>
+              <a:t>Design Verification Engineer</a:t>
+            </a:r>
+            <a:endParaRPr lang="zh-TW" altLang="en-US" dirty="0">
+              <a:solidFill>
+                <a:schemeClr val="tx1">
+                  <a:lumMod val="85000"/>
+                  <a:lumOff val="15000"/>
+                </a:schemeClr>
+              </a:solidFill>
+              <a:latin typeface="微軟正黑體" panose="020B0604030504040204" pitchFamily="34" charset="-120"/>
+              <a:ea typeface="微軟正黑體" panose="020B0604030504040204" pitchFamily="34" charset="-120"/>
+            </a:endParaRPr>
+          </a:p>
+        </p:txBody>
+      </p:sp>
+      <p:sp>
+        <p:nvSpPr>
+          <p:cNvPr id="22" name="文字方塊 21"/>
+          <p:cNvSpPr txBox="1"/>
+          <p:nvPr/>
+        </p:nvSpPr>
+        <p:spPr>
+          <a:xfrm>
+            <a:off x="730643" y="4327138"/>
+            <a:ext cx="1844114" cy="338554"/>
+          </a:xfrm>
+          <a:prstGeom prst="rect">
+            <a:avLst/>
+          </a:prstGeom>
+          <a:noFill/>
+        </p:spPr>
+        <p:txBody>
+          <a:bodyPr wrap="square" rtlCol="0">
+            <a:spAutoFit/>
+          </a:bodyPr>
+          <a:lstStyle/>
+          <a:p>
+            <a:pPr algn="dist"/>
+            <a:r>
+              <a:rPr lang="en-US" altLang="zh-TW" sz="1600" dirty="0" smtClean="0">
+                <a:solidFill>
+                  <a:schemeClr val="tx1">
+                    <a:lumMod val="85000"/>
+                    <a:lumOff val="15000"/>
+                  </a:schemeClr>
+                </a:solidFill>
+                <a:latin typeface="Arial Black" panose="020B0A04020102020204" pitchFamily="34" charset="0"/>
+              </a:rPr>
+              <a:t>EXPERIENCE</a:t>
+            </a:r>
+            <a:endParaRPr lang="zh-TW" altLang="en-US" sz="1600" dirty="0">
+              <a:solidFill>
+                <a:schemeClr val="tx1">
+                  <a:lumMod val="85000"/>
+                  <a:lumOff val="15000"/>
+                </a:schemeClr>
+              </a:solidFill>
+              <a:latin typeface="Arial Black" panose="020B0A04020102020204" pitchFamily="34" charset="0"/>
+            </a:endParaRPr>
+          </a:p>
+        </p:txBody>
+      </p:sp>
+      <p:sp>
+        <p:nvSpPr>
+          <p:cNvPr id="24" name="文字方塊 23"/>
+          <p:cNvSpPr txBox="1"/>
+          <p:nvPr/>
+        </p:nvSpPr>
+        <p:spPr>
+          <a:xfrm>
+            <a:off x="730643" y="4665692"/>
+            <a:ext cx="4081988" cy="338554"/>
+          </a:xfrm>
+          <a:prstGeom prst="rect">
+            <a:avLst/>
+          </a:prstGeom>
+          <a:noFill/>
+        </p:spPr>
+        <p:txBody>
+          <a:bodyPr wrap="square" rtlCol="0">
+            <a:spAutoFit/>
+          </a:bodyPr>
+          <a:lstStyle/>
+          <a:p>
+            <a:r>
+              <a:rPr lang="en-US" altLang="zh-TW" sz="1600" b="1" dirty="0" smtClean="0">
+                <a:solidFill>
+                  <a:schemeClr val="tx1">
+                    <a:lumMod val="85000"/>
+                    <a:lumOff val="15000"/>
+                  </a:schemeClr>
+                </a:solidFill>
+              </a:rPr>
+              <a:t>Design Verification Engineer</a:t>
+            </a:r>
+            <a:r>
+              <a:rPr lang="en-US" altLang="zh-TW" sz="1400" b="1" dirty="0" smtClean="0">
+                <a:solidFill>
+                  <a:schemeClr val="tx1">
+                    <a:lumMod val="85000"/>
+                    <a:lumOff val="15000"/>
+                  </a:schemeClr>
+                </a:solidFill>
+              </a:rPr>
+              <a:t>  </a:t>
+            </a:r>
+            <a:r>
+              <a:rPr lang="en-US" altLang="zh-TW" sz="1400" dirty="0" smtClean="0">
+                <a:solidFill>
+                  <a:schemeClr val="tx1">
+                    <a:lumMod val="85000"/>
+                    <a:lumOff val="15000"/>
+                  </a:schemeClr>
+                </a:solidFill>
+              </a:rPr>
+              <a:t>|  </a:t>
+            </a:r>
+            <a:r>
+              <a:rPr lang="en-US" altLang="zh-TW" sz="1400" dirty="0" err="1" smtClean="0">
+                <a:solidFill>
+                  <a:schemeClr val="tx1">
+                    <a:lumMod val="85000"/>
+                    <a:lumOff val="15000"/>
+                  </a:schemeClr>
+                </a:solidFill>
+              </a:rPr>
+              <a:t>Phison</a:t>
+            </a:r>
+            <a:r>
+              <a:rPr lang="en-US" altLang="zh-TW" sz="1400" dirty="0" smtClean="0">
+                <a:solidFill>
+                  <a:schemeClr val="tx1">
+                    <a:lumMod val="85000"/>
+                    <a:lumOff val="15000"/>
+                  </a:schemeClr>
+                </a:solidFill>
+              </a:rPr>
+              <a:t> Electronic</a:t>
+            </a:r>
+            <a:endParaRPr lang="en-US" altLang="zh-TW" sz="1400" dirty="0">
+              <a:solidFill>
+                <a:schemeClr val="tx1">
+                  <a:lumMod val="85000"/>
+                  <a:lumOff val="15000"/>
+                </a:schemeClr>
+              </a:solidFill>
+            </a:endParaRPr>
+          </a:p>
+        </p:txBody>
+      </p:sp>
+      <p:sp>
+        <p:nvSpPr>
+          <p:cNvPr id="25" name="文字方塊 24"/>
+          <p:cNvSpPr txBox="1"/>
+          <p:nvPr/>
+        </p:nvSpPr>
+        <p:spPr>
+          <a:xfrm>
+            <a:off x="745744" y="4973469"/>
+            <a:ext cx="5802504" cy="1384995"/>
+          </a:xfrm>
+          <a:prstGeom prst="rect">
+            <a:avLst/>
+          </a:prstGeom>
+          <a:noFill/>
+        </p:spPr>
+        <p:txBody>
+          <a:bodyPr wrap="square" rtlCol="0">
+            <a:spAutoFit/>
+          </a:bodyPr>
+          <a:lstStyle/>
+          <a:p>
+            <a:pPr marL="285750" indent="-285750" algn="just">
+              <a:buFont typeface="Arial" panose="020B0604020202020204" pitchFamily="34" charset="0"/>
+              <a:buChar char="•"/>
+            </a:pPr>
+            <a:r>
+              <a:rPr lang="en-US" altLang="zh-TW" sz="1400" dirty="0">
+                <a:solidFill>
+                  <a:schemeClr val="tx1">
+                    <a:lumMod val="85000"/>
+                    <a:lumOff val="15000"/>
+                  </a:schemeClr>
+                </a:solidFill>
+              </a:rPr>
+              <a:t>UFS underlying IP (</a:t>
+            </a:r>
+            <a:r>
+              <a:rPr lang="en-US" altLang="zh-TW" sz="1400" b="1" dirty="0" err="1">
+                <a:solidFill>
+                  <a:schemeClr val="tx1">
+                    <a:lumMod val="85000"/>
+                    <a:lumOff val="15000"/>
+                  </a:schemeClr>
+                </a:solidFill>
+                <a:hlinkClick r:id="rId2"/>
+              </a:rPr>
+              <a:t>Unipro</a:t>
+            </a:r>
+            <a:r>
+              <a:rPr lang="en-US" altLang="zh-TW" sz="1400" dirty="0">
+                <a:solidFill>
+                  <a:schemeClr val="tx1">
+                    <a:lumMod val="85000"/>
+                    <a:lumOff val="15000"/>
+                  </a:schemeClr>
+                </a:solidFill>
+              </a:rPr>
+              <a:t>) design verification</a:t>
+            </a:r>
+          </a:p>
+          <a:p>
+            <a:pPr marL="285750" indent="-285750" algn="just">
+              <a:buFont typeface="Arial" panose="020B0604020202020204" pitchFamily="34" charset="0"/>
+              <a:buChar char="•"/>
+            </a:pPr>
+            <a:r>
+              <a:rPr lang="en-US" altLang="zh-TW" sz="1400" dirty="0">
+                <a:solidFill>
+                  <a:schemeClr val="tx1">
+                    <a:lumMod val="85000"/>
+                    <a:lumOff val="15000"/>
+                  </a:schemeClr>
+                </a:solidFill>
+              </a:rPr>
+              <a:t>Develop UVM environment for DUT</a:t>
+            </a:r>
+          </a:p>
+          <a:p>
+            <a:pPr marL="285750" indent="-285750" algn="just">
+              <a:buFont typeface="Arial" panose="020B0604020202020204" pitchFamily="34" charset="0"/>
+              <a:buChar char="•"/>
+            </a:pPr>
+            <a:r>
+              <a:rPr lang="en-US" altLang="zh-TW" sz="1400" dirty="0">
+                <a:solidFill>
+                  <a:schemeClr val="tx1">
+                    <a:lumMod val="85000"/>
+                    <a:lumOff val="15000"/>
+                  </a:schemeClr>
+                </a:solidFill>
+              </a:rPr>
+              <a:t>Formal Property Verification (</a:t>
+            </a:r>
+            <a:r>
+              <a:rPr lang="en-US" altLang="zh-TW" sz="1400" b="1" dirty="0">
+                <a:solidFill>
+                  <a:schemeClr val="tx1">
+                    <a:lumMod val="85000"/>
+                    <a:lumOff val="15000"/>
+                  </a:schemeClr>
+                </a:solidFill>
+              </a:rPr>
+              <a:t>FPV</a:t>
+            </a:r>
+            <a:r>
+              <a:rPr lang="en-US" altLang="zh-TW" sz="1400" dirty="0">
+                <a:solidFill>
+                  <a:schemeClr val="tx1">
+                    <a:lumMod val="85000"/>
+                    <a:lumOff val="15000"/>
+                  </a:schemeClr>
+                </a:solidFill>
+              </a:rPr>
+              <a:t>)</a:t>
+            </a:r>
+          </a:p>
+          <a:p>
+            <a:pPr marL="285750" indent="-285750" algn="just">
+              <a:buFont typeface="Arial" panose="020B0604020202020204" pitchFamily="34" charset="0"/>
+              <a:buChar char="•"/>
+            </a:pPr>
+            <a:r>
+              <a:rPr lang="en-US" altLang="zh-TW" sz="1400" dirty="0">
+                <a:solidFill>
+                  <a:schemeClr val="tx1">
+                    <a:lumMod val="85000"/>
+                    <a:lumOff val="15000"/>
+                  </a:schemeClr>
+                </a:solidFill>
+              </a:rPr>
+              <a:t>Design test plans and </a:t>
+            </a:r>
+            <a:r>
+              <a:rPr lang="en-US" altLang="zh-TW" sz="1400" dirty="0" err="1" smtClean="0">
+                <a:solidFill>
+                  <a:schemeClr val="tx1">
+                    <a:lumMod val="85000"/>
+                    <a:lumOff val="15000"/>
+                  </a:schemeClr>
+                </a:solidFill>
+              </a:rPr>
+              <a:t>testvectors</a:t>
+            </a:r>
+            <a:endParaRPr lang="en-US" altLang="zh-TW" sz="1400" dirty="0" smtClean="0">
+              <a:solidFill>
+                <a:schemeClr val="tx1">
+                  <a:lumMod val="85000"/>
+                  <a:lumOff val="15000"/>
+                </a:schemeClr>
+              </a:solidFill>
+            </a:endParaRPr>
+          </a:p>
+          <a:p>
+            <a:pPr marL="285750" indent="-285750" algn="just">
+              <a:buFont typeface="Arial" panose="020B0604020202020204" pitchFamily="34" charset="0"/>
+              <a:buChar char="•"/>
+            </a:pPr>
+            <a:r>
+              <a:rPr lang="en-US" altLang="zh-TW" sz="1400" dirty="0" smtClean="0">
+                <a:solidFill>
+                  <a:schemeClr val="tx1">
+                    <a:lumMod val="85000"/>
+                    <a:lumOff val="15000"/>
+                  </a:schemeClr>
+                </a:solidFill>
+              </a:rPr>
+              <a:t>Discuss </a:t>
+            </a:r>
+            <a:r>
+              <a:rPr lang="en-US" altLang="zh-TW" sz="1400" dirty="0">
+                <a:solidFill>
+                  <a:schemeClr val="tx1">
+                    <a:lumMod val="85000"/>
+                    <a:lumOff val="15000"/>
+                  </a:schemeClr>
+                </a:solidFill>
+              </a:rPr>
+              <a:t>and modify test plans with international clients</a:t>
+            </a:r>
+          </a:p>
+          <a:p>
+            <a:pPr marL="285750" indent="-285750" algn="just">
+              <a:buFont typeface="Arial" panose="020B0604020202020204" pitchFamily="34" charset="0"/>
+              <a:buChar char="•"/>
+            </a:pPr>
+            <a:r>
+              <a:rPr lang="en-US" altLang="zh-TW" sz="1400" dirty="0">
+                <a:solidFill>
+                  <a:schemeClr val="tx1">
+                    <a:lumMod val="85000"/>
+                    <a:lumOff val="15000"/>
+                  </a:schemeClr>
+                </a:solidFill>
+              </a:rPr>
+              <a:t>Verifying in-house DUTs and collaborating with designers on debugging</a:t>
+            </a:r>
+          </a:p>
+        </p:txBody>
+      </p:sp>
+      <p:sp>
+        <p:nvSpPr>
+          <p:cNvPr id="26" name="文字方塊 25"/>
+          <p:cNvSpPr txBox="1"/>
+          <p:nvPr/>
+        </p:nvSpPr>
+        <p:spPr>
+          <a:xfrm>
+            <a:off x="745744" y="6442671"/>
+            <a:ext cx="3222066" cy="338554"/>
+          </a:xfrm>
+          <a:prstGeom prst="rect">
+            <a:avLst/>
+          </a:prstGeom>
+          <a:noFill/>
+        </p:spPr>
+        <p:txBody>
+          <a:bodyPr wrap="square" rtlCol="0">
+            <a:spAutoFit/>
+          </a:bodyPr>
+          <a:lstStyle/>
+          <a:p>
+            <a:r>
+              <a:rPr lang="en-US" altLang="zh-TW" sz="1600" b="1" dirty="0" smtClean="0">
+                <a:solidFill>
+                  <a:schemeClr val="tx1">
+                    <a:lumMod val="85000"/>
+                    <a:lumOff val="15000"/>
+                  </a:schemeClr>
+                </a:solidFill>
+              </a:rPr>
+              <a:t>Firmware Engineer</a:t>
+            </a:r>
+            <a:r>
+              <a:rPr lang="en-US" altLang="zh-TW" sz="1400" b="1" dirty="0" smtClean="0">
+                <a:solidFill>
+                  <a:schemeClr val="tx1">
+                    <a:lumMod val="85000"/>
+                    <a:lumOff val="15000"/>
+                  </a:schemeClr>
+                </a:solidFill>
+              </a:rPr>
+              <a:t>  </a:t>
+            </a:r>
+            <a:r>
+              <a:rPr lang="en-US" altLang="zh-TW" sz="1400" dirty="0" smtClean="0">
+                <a:solidFill>
+                  <a:schemeClr val="tx1">
+                    <a:lumMod val="85000"/>
+                    <a:lumOff val="15000"/>
+                  </a:schemeClr>
+                </a:solidFill>
+              </a:rPr>
+              <a:t>|  Silicon Motion</a:t>
+            </a:r>
+            <a:endParaRPr lang="en-US" altLang="zh-TW" sz="1400" dirty="0">
+              <a:solidFill>
+                <a:schemeClr val="tx1">
+                  <a:lumMod val="85000"/>
+                  <a:lumOff val="15000"/>
+                </a:schemeClr>
+              </a:solidFill>
+            </a:endParaRPr>
+          </a:p>
+        </p:txBody>
+      </p:sp>
+      <p:sp>
+        <p:nvSpPr>
+          <p:cNvPr id="28" name="文字方塊 27"/>
+          <p:cNvSpPr txBox="1"/>
+          <p:nvPr/>
+        </p:nvSpPr>
+        <p:spPr>
+          <a:xfrm>
+            <a:off x="760845" y="6750448"/>
+            <a:ext cx="5802504" cy="1169551"/>
+          </a:xfrm>
+          <a:prstGeom prst="rect">
+            <a:avLst/>
+          </a:prstGeom>
+          <a:noFill/>
+        </p:spPr>
+        <p:txBody>
+          <a:bodyPr wrap="square" rtlCol="0">
+            <a:spAutoFit/>
+          </a:bodyPr>
+          <a:lstStyle/>
+          <a:p>
+            <a:pPr marL="285750" indent="-285750" algn="just">
+              <a:buFont typeface="Arial" panose="020B0604020202020204" pitchFamily="34" charset="0"/>
+              <a:buChar char="•"/>
+            </a:pPr>
+            <a:r>
+              <a:rPr lang="en-US" altLang="zh-TW" sz="1400" dirty="0">
+                <a:solidFill>
+                  <a:schemeClr val="tx1">
+                    <a:lumMod val="85000"/>
+                    <a:lumOff val="15000"/>
+                  </a:schemeClr>
+                </a:solidFill>
+              </a:rPr>
+              <a:t>Develop Security features according to TCG specification</a:t>
+            </a:r>
+          </a:p>
+          <a:p>
+            <a:pPr marL="285750" indent="-285750" algn="just">
+              <a:buFont typeface="Arial" panose="020B0604020202020204" pitchFamily="34" charset="0"/>
+              <a:buChar char="•"/>
+            </a:pPr>
+            <a:r>
+              <a:rPr lang="en-US" altLang="zh-TW" sz="1400" dirty="0">
+                <a:solidFill>
+                  <a:schemeClr val="tx1">
+                    <a:lumMod val="85000"/>
+                    <a:lumOff val="15000"/>
+                  </a:schemeClr>
+                </a:solidFill>
+              </a:rPr>
+              <a:t>Design Security features Test Plan &amp; verify</a:t>
+            </a:r>
+          </a:p>
+          <a:p>
+            <a:pPr marL="285750" indent="-285750" algn="just">
+              <a:buFont typeface="Arial" panose="020B0604020202020204" pitchFamily="34" charset="0"/>
+              <a:buChar char="•"/>
+            </a:pPr>
+            <a:r>
+              <a:rPr lang="en-US" altLang="zh-TW" sz="1400" dirty="0">
+                <a:solidFill>
+                  <a:schemeClr val="tx1">
+                    <a:lumMod val="85000"/>
+                    <a:lumOff val="15000"/>
+                  </a:schemeClr>
+                </a:solidFill>
+              </a:rPr>
+              <a:t>Customize requirements &amp; Firmware debug</a:t>
+            </a:r>
+          </a:p>
+          <a:p>
+            <a:pPr marL="285750" indent="-285750" algn="just">
+              <a:buFont typeface="Arial" panose="020B0604020202020204" pitchFamily="34" charset="0"/>
+              <a:buChar char="•"/>
+            </a:pPr>
+            <a:r>
+              <a:rPr lang="en-US" altLang="zh-TW" sz="1400" dirty="0">
+                <a:solidFill>
+                  <a:schemeClr val="tx1">
+                    <a:lumMod val="85000"/>
+                    <a:lumOff val="15000"/>
+                  </a:schemeClr>
+                </a:solidFill>
+              </a:rPr>
+              <a:t>Modularize features into Libraries for easier project management</a:t>
+            </a:r>
+          </a:p>
+          <a:p>
+            <a:pPr marL="285750" indent="-285750" algn="just">
+              <a:buFont typeface="Arial" panose="020B0604020202020204" pitchFamily="34" charset="0"/>
+              <a:buChar char="•"/>
+            </a:pPr>
+            <a:r>
+              <a:rPr lang="en-US" altLang="zh-TW" sz="1400" dirty="0">
+                <a:solidFill>
+                  <a:schemeClr val="tx1">
+                    <a:lumMod val="85000"/>
+                    <a:lumOff val="15000"/>
+                  </a:schemeClr>
+                </a:solidFill>
+              </a:rPr>
+              <a:t>Develop automation scripts to improve working efficiency</a:t>
+            </a:r>
+          </a:p>
+        </p:txBody>
+      </p:sp>
+      <p:sp>
+        <p:nvSpPr>
+          <p:cNvPr id="29" name="文字方塊 28"/>
+          <p:cNvSpPr txBox="1"/>
+          <p:nvPr/>
+        </p:nvSpPr>
+        <p:spPr>
+          <a:xfrm>
+            <a:off x="730643" y="8048651"/>
+            <a:ext cx="1844114" cy="338554"/>
+          </a:xfrm>
+          <a:prstGeom prst="rect">
+            <a:avLst/>
+          </a:prstGeom>
+          <a:noFill/>
+        </p:spPr>
+        <p:txBody>
+          <a:bodyPr wrap="square" rtlCol="0">
+            <a:spAutoFit/>
+          </a:bodyPr>
+          <a:lstStyle/>
+          <a:p>
+            <a:pPr algn="dist"/>
+            <a:r>
+              <a:rPr lang="en-US" altLang="zh-TW" sz="1600" dirty="0" smtClean="0">
+                <a:solidFill>
+                  <a:schemeClr val="tx1">
+                    <a:lumMod val="85000"/>
+                    <a:lumOff val="15000"/>
+                  </a:schemeClr>
+                </a:solidFill>
+                <a:latin typeface="Arial Black" panose="020B0A04020102020204" pitchFamily="34" charset="0"/>
+              </a:rPr>
+              <a:t>EDUCATION</a:t>
+            </a:r>
+            <a:endParaRPr lang="zh-TW" altLang="en-US" sz="1600" dirty="0">
+              <a:solidFill>
+                <a:schemeClr val="tx1">
+                  <a:lumMod val="85000"/>
+                  <a:lumOff val="15000"/>
+                </a:schemeClr>
+              </a:solidFill>
+              <a:latin typeface="Arial Black" panose="020B0A04020102020204" pitchFamily="34" charset="0"/>
+            </a:endParaRPr>
+          </a:p>
+        </p:txBody>
+      </p:sp>
+      <p:sp>
+        <p:nvSpPr>
+          <p:cNvPr id="30" name="文字方塊 29"/>
+          <p:cNvSpPr txBox="1"/>
+          <p:nvPr/>
+        </p:nvSpPr>
+        <p:spPr>
+          <a:xfrm>
+            <a:off x="760846" y="8387205"/>
+            <a:ext cx="5802504" cy="338554"/>
+          </a:xfrm>
+          <a:prstGeom prst="rect">
+            <a:avLst/>
+          </a:prstGeom>
+          <a:noFill/>
+        </p:spPr>
+        <p:txBody>
+          <a:bodyPr wrap="square" rtlCol="0">
+            <a:spAutoFit/>
+          </a:bodyPr>
+          <a:lstStyle/>
+          <a:p>
+            <a:r>
+              <a:rPr lang="en-US" altLang="zh-TW" sz="1600" b="1" dirty="0" smtClean="0">
+                <a:solidFill>
+                  <a:schemeClr val="tx1">
+                    <a:lumMod val="85000"/>
+                    <a:lumOff val="15000"/>
+                  </a:schemeClr>
+                </a:solidFill>
+              </a:rPr>
+              <a:t>National </a:t>
+            </a:r>
+            <a:r>
+              <a:rPr lang="en-US" altLang="zh-TW" sz="1600" b="1" dirty="0" err="1" smtClean="0">
+                <a:solidFill>
+                  <a:schemeClr val="tx1">
+                    <a:lumMod val="85000"/>
+                    <a:lumOff val="15000"/>
+                  </a:schemeClr>
+                </a:solidFill>
+              </a:rPr>
+              <a:t>Chiao</a:t>
+            </a:r>
+            <a:r>
+              <a:rPr lang="en-US" altLang="zh-TW" sz="1600" b="1" dirty="0" smtClean="0">
+                <a:solidFill>
+                  <a:schemeClr val="tx1">
+                    <a:lumMod val="85000"/>
+                    <a:lumOff val="15000"/>
+                  </a:schemeClr>
+                </a:solidFill>
+              </a:rPr>
+              <a:t> Tung University</a:t>
+            </a:r>
+            <a:r>
+              <a:rPr lang="en-US" altLang="zh-TW" sz="1600" dirty="0" smtClean="0">
+                <a:solidFill>
+                  <a:schemeClr val="tx1">
+                    <a:lumMod val="85000"/>
+                    <a:lumOff val="15000"/>
+                  </a:schemeClr>
+                </a:solidFill>
+              </a:rPr>
+              <a:t> - Hsinchu</a:t>
+            </a:r>
+            <a:endParaRPr lang="en-US" altLang="zh-TW" sz="1400" dirty="0">
+              <a:solidFill>
+                <a:schemeClr val="tx1">
+                  <a:lumMod val="85000"/>
+                  <a:lumOff val="15000"/>
+                </a:schemeClr>
+              </a:solidFill>
+            </a:endParaRPr>
+          </a:p>
+        </p:txBody>
+      </p:sp>
+      <p:sp>
+        <p:nvSpPr>
+          <p:cNvPr id="31" name="文字方塊 30"/>
+          <p:cNvSpPr txBox="1"/>
+          <p:nvPr/>
+        </p:nvSpPr>
+        <p:spPr>
+          <a:xfrm>
+            <a:off x="760846" y="8609696"/>
+            <a:ext cx="5802504" cy="307777"/>
+          </a:xfrm>
+          <a:prstGeom prst="rect">
+            <a:avLst/>
+          </a:prstGeom>
+          <a:noFill/>
+        </p:spPr>
+        <p:txBody>
+          <a:bodyPr wrap="square" rtlCol="0">
+            <a:spAutoFit/>
+          </a:bodyPr>
+          <a:lstStyle/>
+          <a:p>
+            <a:r>
+              <a:rPr lang="en-US" altLang="zh-TW" sz="1400" b="1" dirty="0" smtClean="0">
+                <a:solidFill>
+                  <a:schemeClr val="tx1">
+                    <a:lumMod val="85000"/>
+                    <a:lumOff val="15000"/>
+                  </a:schemeClr>
+                </a:solidFill>
+              </a:rPr>
+              <a:t>Master </a:t>
+            </a:r>
+            <a:r>
+              <a:rPr lang="en-US" altLang="zh-TW" sz="1400" dirty="0" smtClean="0">
+                <a:solidFill>
+                  <a:schemeClr val="tx1">
+                    <a:lumMod val="85000"/>
+                    <a:lumOff val="15000"/>
+                  </a:schemeClr>
+                </a:solidFill>
+              </a:rPr>
+              <a:t>- Institute of Computer Science And Engineering</a:t>
+            </a:r>
+            <a:endParaRPr lang="en-US" altLang="zh-TW" sz="1200" dirty="0">
+              <a:solidFill>
+                <a:schemeClr val="tx1">
+                  <a:lumMod val="85000"/>
+                  <a:lumOff val="15000"/>
+                </a:schemeClr>
+              </a:solidFill>
+            </a:endParaRPr>
+          </a:p>
+        </p:txBody>
+      </p:sp>
+      <p:sp>
+        <p:nvSpPr>
+          <p:cNvPr id="34" name="文字方塊 33"/>
+          <p:cNvSpPr txBox="1"/>
+          <p:nvPr/>
+        </p:nvSpPr>
+        <p:spPr>
+          <a:xfrm>
+            <a:off x="760846" y="8948250"/>
+            <a:ext cx="5802504" cy="338554"/>
+          </a:xfrm>
+          <a:prstGeom prst="rect">
+            <a:avLst/>
+          </a:prstGeom>
+          <a:noFill/>
+        </p:spPr>
+        <p:txBody>
+          <a:bodyPr wrap="square" rtlCol="0">
+            <a:spAutoFit/>
+          </a:bodyPr>
+          <a:lstStyle/>
+          <a:p>
+            <a:r>
+              <a:rPr lang="en-US" altLang="zh-TW" sz="1600" b="1" dirty="0" smtClean="0">
+                <a:solidFill>
+                  <a:schemeClr val="tx1">
+                    <a:lumMod val="85000"/>
+                    <a:lumOff val="15000"/>
+                  </a:schemeClr>
+                </a:solidFill>
+              </a:rPr>
+              <a:t>National Central University</a:t>
+            </a:r>
+            <a:r>
+              <a:rPr lang="en-US" altLang="zh-TW" sz="1600" dirty="0" smtClean="0">
+                <a:solidFill>
+                  <a:schemeClr val="tx1">
+                    <a:lumMod val="85000"/>
+                    <a:lumOff val="15000"/>
+                  </a:schemeClr>
+                </a:solidFill>
+              </a:rPr>
+              <a:t> - Taoyuan</a:t>
+            </a:r>
+            <a:endParaRPr lang="en-US" altLang="zh-TW" sz="1400" dirty="0">
+              <a:solidFill>
+                <a:schemeClr val="tx1">
+                  <a:lumMod val="85000"/>
+                  <a:lumOff val="15000"/>
+                </a:schemeClr>
+              </a:solidFill>
+            </a:endParaRPr>
+          </a:p>
+        </p:txBody>
+      </p:sp>
+      <p:sp>
+        <p:nvSpPr>
+          <p:cNvPr id="35" name="文字方塊 34"/>
+          <p:cNvSpPr txBox="1"/>
+          <p:nvPr/>
+        </p:nvSpPr>
+        <p:spPr>
+          <a:xfrm>
+            <a:off x="760846" y="9170741"/>
+            <a:ext cx="5802504" cy="307777"/>
+          </a:xfrm>
+          <a:prstGeom prst="rect">
+            <a:avLst/>
+          </a:prstGeom>
+          <a:noFill/>
+        </p:spPr>
+        <p:txBody>
+          <a:bodyPr wrap="square" rtlCol="0">
+            <a:spAutoFit/>
+          </a:bodyPr>
+          <a:lstStyle/>
+          <a:p>
+            <a:r>
+              <a:rPr lang="en-US" altLang="zh-TW" sz="1400" b="1" dirty="0" smtClean="0">
+                <a:solidFill>
+                  <a:schemeClr val="tx1">
+                    <a:lumMod val="85000"/>
+                    <a:lumOff val="15000"/>
+                  </a:schemeClr>
+                </a:solidFill>
+              </a:rPr>
+              <a:t>Bachelor </a:t>
+            </a:r>
+            <a:r>
+              <a:rPr lang="en-US" altLang="zh-TW" sz="1400" dirty="0" smtClean="0">
+                <a:solidFill>
+                  <a:schemeClr val="tx1">
+                    <a:lumMod val="85000"/>
+                    <a:lumOff val="15000"/>
+                  </a:schemeClr>
+                </a:solidFill>
+              </a:rPr>
+              <a:t>– Department of Communication Engineering</a:t>
+            </a:r>
+            <a:endParaRPr lang="en-US" altLang="zh-TW" sz="1200" dirty="0">
+              <a:solidFill>
+                <a:schemeClr val="tx1">
+                  <a:lumMod val="85000"/>
+                  <a:lumOff val="15000"/>
+                </a:schemeClr>
+              </a:solidFill>
+            </a:endParaRPr>
+          </a:p>
+        </p:txBody>
+      </p:sp>
+      <p:sp>
+        <p:nvSpPr>
+          <p:cNvPr id="36" name="文字方塊 35"/>
+          <p:cNvSpPr txBox="1"/>
+          <p:nvPr/>
+        </p:nvSpPr>
+        <p:spPr>
+          <a:xfrm>
+            <a:off x="5158265" y="8351109"/>
+            <a:ext cx="1591451" cy="307777"/>
+          </a:xfrm>
+          <a:prstGeom prst="rect">
+            <a:avLst/>
+          </a:prstGeom>
+          <a:noFill/>
+        </p:spPr>
+        <p:txBody>
+          <a:bodyPr wrap="square" rtlCol="0">
+            <a:spAutoFit/>
+          </a:bodyPr>
+          <a:lstStyle/>
+          <a:p>
+            <a:r>
+              <a:rPr lang="en-US" altLang="zh-TW" sz="1400" dirty="0" smtClean="0">
+                <a:solidFill>
+                  <a:schemeClr val="tx1">
+                    <a:lumMod val="85000"/>
+                    <a:lumOff val="15000"/>
+                  </a:schemeClr>
+                </a:solidFill>
+              </a:rPr>
+              <a:t>09/2018 – 11/2020</a:t>
+            </a:r>
+            <a:endParaRPr lang="zh-TW" altLang="en-US" sz="1100" dirty="0">
+              <a:solidFill>
+                <a:schemeClr val="tx1">
+                  <a:lumMod val="85000"/>
+                  <a:lumOff val="15000"/>
+                </a:schemeClr>
+              </a:solidFill>
+            </a:endParaRPr>
+          </a:p>
+        </p:txBody>
+      </p:sp>
+      <p:sp>
+        <p:nvSpPr>
+          <p:cNvPr id="37" name="文字方塊 36"/>
+          <p:cNvSpPr txBox="1"/>
+          <p:nvPr/>
+        </p:nvSpPr>
+        <p:spPr>
+          <a:xfrm>
+            <a:off x="5158265" y="8942931"/>
+            <a:ext cx="1591451" cy="307777"/>
+          </a:xfrm>
+          <a:prstGeom prst="rect">
+            <a:avLst/>
+          </a:prstGeom>
+          <a:noFill/>
+        </p:spPr>
+        <p:txBody>
+          <a:bodyPr wrap="square" rtlCol="0">
+            <a:spAutoFit/>
+          </a:bodyPr>
+          <a:lstStyle/>
+          <a:p>
+            <a:r>
+              <a:rPr lang="en-US" altLang="zh-TW" sz="1400" dirty="0" smtClean="0">
+                <a:solidFill>
+                  <a:schemeClr val="tx1">
+                    <a:lumMod val="85000"/>
+                    <a:lumOff val="15000"/>
+                  </a:schemeClr>
+                </a:solidFill>
+              </a:rPr>
+              <a:t>09/2013 – 06/2017</a:t>
+            </a:r>
+            <a:endParaRPr lang="zh-TW" altLang="en-US" sz="1100" dirty="0">
+              <a:solidFill>
+                <a:schemeClr val="tx1">
+                  <a:lumMod val="85000"/>
+                  <a:lumOff val="15000"/>
+                </a:schemeClr>
+              </a:solidFill>
+            </a:endParaRPr>
+          </a:p>
+        </p:txBody>
+      </p:sp>
+      <p:sp>
+        <p:nvSpPr>
+          <p:cNvPr id="4" name="橢圓 3"/>
           <p:cNvSpPr/>
           <p:nvPr/>
         </p:nvSpPr>
         <p:spPr>
           <a:xfrm>
-            <a:off x="2355515" y="527232"/>
-            <a:ext cx="4165600" cy="901700"/>
+            <a:off x="338718" y="2308165"/>
+            <a:ext cx="104726" cy="104726"/>
           </a:xfrm>
-          <a:prstGeom prst="rect">
+          <a:prstGeom prst="ellipse">
             <a:avLst/>
           </a:prstGeom>
           <a:solidFill>
@@ -3063,70 +4090,401 @@
           <a:lstStyle/>
           <a:p>
             <a:pPr algn="ctr"/>
-            <a:r>
-              <a:rPr lang="en-US" altLang="zh-TW" sz="3600" b="1" dirty="0" err="1" smtClean="0">
-                <a:solidFill>
-                  <a:schemeClr val="tx1"/>
-                </a:solidFill>
-                <a:latin typeface="Arial" panose="020B0604020202020204" pitchFamily="34" charset="0"/>
-                <a:cs typeface="Arial" panose="020B0604020202020204" pitchFamily="34" charset="0"/>
-              </a:rPr>
-              <a:t>PoKai</a:t>
-            </a:r>
-            <a:r>
-              <a:rPr lang="en-US" altLang="zh-TW" sz="3600" b="1" dirty="0" smtClean="0">
-                <a:solidFill>
-                  <a:schemeClr val="tx1"/>
-                </a:solidFill>
-                <a:latin typeface="Arial" panose="020B0604020202020204" pitchFamily="34" charset="0"/>
-                <a:cs typeface="Arial" panose="020B0604020202020204" pitchFamily="34" charset="0"/>
-              </a:rPr>
-              <a:t> Huang</a:t>
-            </a:r>
-            <a:endParaRPr lang="zh-TW" altLang="en-US" sz="3600" b="1" dirty="0">
+            <a:endParaRPr lang="zh-TW" altLang="en-US">
               <a:solidFill>
-                <a:schemeClr val="tx1"/>
+                <a:schemeClr val="tx1">
+                  <a:lumMod val="85000"/>
+                  <a:lumOff val="15000"/>
+                </a:schemeClr>
               </a:solidFill>
-              <a:latin typeface="Arial" panose="020B0604020202020204" pitchFamily="34" charset="0"/>
-              <a:cs typeface="Arial" panose="020B0604020202020204" pitchFamily="34" charset="0"/>
             </a:endParaRPr>
           </a:p>
         </p:txBody>
       </p:sp>
-      <p:pic>
-        <p:nvPicPr>
-          <p:cNvPr id="6" name="圖片 5"/>
-          <p:cNvPicPr>
-            <a:picLocks noChangeAspect="1"/>
-          </p:cNvPicPr>
+      <p:sp>
+        <p:nvSpPr>
+          <p:cNvPr id="38" name="橢圓 37"/>
+          <p:cNvSpPr/>
           <p:nvPr/>
-        </p:nvPicPr>
-        <p:blipFill>
-          <a:blip r:embed="rId2" cstate="print">
-            <a:extLst>
-              <a:ext uri="{28A0092B-C50C-407E-A947-70E740481C1C}">
-                <a14:useLocalDpi xmlns:a14="http://schemas.microsoft.com/office/drawing/2010/main" val="0"/>
-              </a:ext>
-            </a:extLst>
-          </a:blip>
-          <a:stretch>
-            <a:fillRect/>
-          </a:stretch>
-        </p:blipFill>
+        </p:nvSpPr>
         <p:spPr>
           <a:xfrm>
-            <a:off x="595762" y="270733"/>
-            <a:ext cx="1152525" cy="1536700"/>
+            <a:off x="338718" y="4497912"/>
+            <a:ext cx="104726" cy="104726"/>
           </a:xfrm>
           <a:prstGeom prst="ellipse">
             <a:avLst/>
           </a:prstGeom>
-          <a:ln w="12700" cap="rnd">
+          <a:solidFill>
+            <a:schemeClr val="bg1"/>
+          </a:solidFill>
+          <a:ln>
+            <a:solidFill>
+              <a:schemeClr val="tx1"/>
+            </a:solidFill>
+          </a:ln>
+        </p:spPr>
+        <p:style>
+          <a:lnRef idx="2">
+            <a:schemeClr val="accent1">
+              <a:shade val="50000"/>
+            </a:schemeClr>
+          </a:lnRef>
+          <a:fillRef idx="1">
+            <a:schemeClr val="accent1"/>
+          </a:fillRef>
+          <a:effectRef idx="0">
+            <a:schemeClr val="accent1"/>
+          </a:effectRef>
+          <a:fontRef idx="minor">
+            <a:schemeClr val="lt1"/>
+          </a:fontRef>
+        </p:style>
+        <p:txBody>
+          <a:bodyPr rtlCol="0" anchor="ctr"/>
+          <a:lstStyle/>
+          <a:p>
+            <a:pPr algn="ctr"/>
+            <a:endParaRPr lang="zh-TW" altLang="en-US">
+              <a:solidFill>
+                <a:schemeClr val="tx1">
+                  <a:lumMod val="85000"/>
+                  <a:lumOff val="15000"/>
+                </a:schemeClr>
+              </a:solidFill>
+            </a:endParaRPr>
+          </a:p>
+        </p:txBody>
+      </p:sp>
+      <p:sp>
+        <p:nvSpPr>
+          <p:cNvPr id="39" name="橢圓 38"/>
+          <p:cNvSpPr/>
+          <p:nvPr/>
+        </p:nvSpPr>
+        <p:spPr>
+          <a:xfrm>
+            <a:off x="338718" y="8005644"/>
+            <a:ext cx="104726" cy="104726"/>
+          </a:xfrm>
+          <a:prstGeom prst="ellipse">
+            <a:avLst/>
+          </a:prstGeom>
+          <a:solidFill>
+            <a:schemeClr val="bg1"/>
+          </a:solidFill>
+          <a:ln>
+            <a:solidFill>
+              <a:schemeClr val="tx1"/>
+            </a:solidFill>
+          </a:ln>
+        </p:spPr>
+        <p:style>
+          <a:lnRef idx="2">
+            <a:schemeClr val="accent1">
+              <a:shade val="50000"/>
+            </a:schemeClr>
+          </a:lnRef>
+          <a:fillRef idx="1">
+            <a:schemeClr val="accent1"/>
+          </a:fillRef>
+          <a:effectRef idx="0">
+            <a:schemeClr val="accent1"/>
+          </a:effectRef>
+          <a:fontRef idx="minor">
+            <a:schemeClr val="lt1"/>
+          </a:fontRef>
+        </p:style>
+        <p:txBody>
+          <a:bodyPr rtlCol="0" anchor="ctr"/>
+          <a:lstStyle/>
+          <a:p>
+            <a:pPr algn="ctr"/>
+            <a:endParaRPr lang="zh-TW" altLang="en-US">
+              <a:solidFill>
+                <a:schemeClr val="tx1">
+                  <a:lumMod val="85000"/>
+                  <a:lumOff val="15000"/>
+                </a:schemeClr>
+              </a:solidFill>
+            </a:endParaRPr>
+          </a:p>
+        </p:txBody>
+      </p:sp>
+      <p:sp>
+        <p:nvSpPr>
+          <p:cNvPr id="40" name="文字方塊 39"/>
+          <p:cNvSpPr txBox="1"/>
+          <p:nvPr/>
+        </p:nvSpPr>
+        <p:spPr>
+          <a:xfrm>
+            <a:off x="5158263" y="6458935"/>
+            <a:ext cx="1591451" cy="307777"/>
+          </a:xfrm>
+          <a:prstGeom prst="rect">
+            <a:avLst/>
+          </a:prstGeom>
+          <a:noFill/>
+        </p:spPr>
+        <p:txBody>
+          <a:bodyPr wrap="square" rtlCol="0">
+            <a:spAutoFit/>
+          </a:bodyPr>
+          <a:lstStyle/>
+          <a:p>
+            <a:r>
+              <a:rPr lang="en-US" altLang="zh-TW" sz="1400" dirty="0">
+                <a:solidFill>
+                  <a:schemeClr val="tx1">
+                    <a:lumMod val="85000"/>
+                    <a:lumOff val="15000"/>
+                  </a:schemeClr>
+                </a:solidFill>
+              </a:rPr>
+              <a:t>01/2021 – 05/2024</a:t>
+            </a:r>
+          </a:p>
+        </p:txBody>
+      </p:sp>
+      <p:sp>
+        <p:nvSpPr>
+          <p:cNvPr id="41" name="文字方塊 40"/>
+          <p:cNvSpPr txBox="1"/>
+          <p:nvPr/>
+        </p:nvSpPr>
+        <p:spPr>
+          <a:xfrm>
+            <a:off x="5152193" y="4681080"/>
+            <a:ext cx="1591451" cy="307777"/>
+          </a:xfrm>
+          <a:prstGeom prst="rect">
+            <a:avLst/>
+          </a:prstGeom>
+          <a:noFill/>
+        </p:spPr>
+        <p:txBody>
+          <a:bodyPr wrap="square" rtlCol="0">
+            <a:spAutoFit/>
+          </a:bodyPr>
+          <a:lstStyle/>
+          <a:p>
+            <a:r>
+              <a:rPr lang="en-US" altLang="zh-TW" sz="1400" dirty="0">
+                <a:solidFill>
+                  <a:schemeClr val="tx1">
+                    <a:lumMod val="85000"/>
+                    <a:lumOff val="15000"/>
+                  </a:schemeClr>
+                </a:solidFill>
+              </a:rPr>
+              <a:t>06/2024 - Present</a:t>
+            </a:r>
+          </a:p>
+        </p:txBody>
+      </p:sp>
+      <p:grpSp>
+        <p:nvGrpSpPr>
+          <p:cNvPr id="46" name="群組 45"/>
+          <p:cNvGrpSpPr/>
+          <p:nvPr/>
+        </p:nvGrpSpPr>
+        <p:grpSpPr>
+          <a:xfrm>
+            <a:off x="4143054" y="1278164"/>
+            <a:ext cx="2292209" cy="253916"/>
+            <a:chOff x="4260677" y="532806"/>
+            <a:chExt cx="2292209" cy="253916"/>
+          </a:xfrm>
+        </p:grpSpPr>
+        <p:sp>
+          <p:nvSpPr>
+            <p:cNvPr id="32" name="文字方塊 31"/>
+            <p:cNvSpPr txBox="1"/>
+            <p:nvPr/>
+          </p:nvSpPr>
+          <p:spPr>
+            <a:xfrm>
+              <a:off x="4476677" y="532806"/>
+              <a:ext cx="2076209" cy="253916"/>
+            </a:xfrm>
+            <a:prstGeom prst="rect">
+              <a:avLst/>
+            </a:prstGeom>
             <a:noFill/>
-          </a:ln>
-          <a:effectLst/>
-        </p:spPr>
-      </p:pic>
+          </p:spPr>
+          <p:txBody>
+            <a:bodyPr wrap="none" rtlCol="0">
+              <a:spAutoFit/>
+            </a:bodyPr>
+            <a:lstStyle/>
+            <a:p>
+              <a:r>
+                <a:rPr lang="en-US" altLang="zh-TW" sz="1050" dirty="0">
+                  <a:solidFill>
+                    <a:schemeClr val="tx1">
+                      <a:lumMod val="85000"/>
+                      <a:lumOff val="15000"/>
+                    </a:schemeClr>
+                  </a:solidFill>
+                  <a:latin typeface="微軟正黑體" panose="020B0604030504040204" pitchFamily="34" charset="-120"/>
+                  <a:ea typeface="微軟正黑體" panose="020B0604030504040204" pitchFamily="34" charset="-120"/>
+                  <a:hlinkClick r:id="rId3"/>
+                </a:rPr>
+                <a:t>https://pkhuang-tw.github.io</a:t>
+              </a:r>
+              <a:r>
+                <a:rPr lang="en-US" altLang="zh-TW" sz="1050" dirty="0" smtClean="0">
+                  <a:solidFill>
+                    <a:schemeClr val="tx1">
+                      <a:lumMod val="85000"/>
+                      <a:lumOff val="15000"/>
+                    </a:schemeClr>
+                  </a:solidFill>
+                  <a:latin typeface="微軟正黑體" panose="020B0604030504040204" pitchFamily="34" charset="-120"/>
+                  <a:ea typeface="微軟正黑體" panose="020B0604030504040204" pitchFamily="34" charset="-120"/>
+                  <a:hlinkClick r:id="rId3"/>
+                </a:rPr>
+                <a:t>/</a:t>
+              </a:r>
+              <a:endParaRPr lang="en-US" altLang="zh-TW" sz="1050" dirty="0" smtClean="0">
+                <a:solidFill>
+                  <a:schemeClr val="tx1">
+                    <a:lumMod val="85000"/>
+                    <a:lumOff val="15000"/>
+                  </a:schemeClr>
+                </a:solidFill>
+                <a:latin typeface="微軟正黑體" panose="020B0604030504040204" pitchFamily="34" charset="-120"/>
+                <a:ea typeface="微軟正黑體" panose="020B0604030504040204" pitchFamily="34" charset="-120"/>
+              </a:endParaRPr>
+            </a:p>
+          </p:txBody>
+        </p:sp>
+        <p:pic>
+          <p:nvPicPr>
+            <p:cNvPr id="6" name="圖片 5"/>
+            <p:cNvPicPr>
+              <a:picLocks noChangeAspect="1"/>
+            </p:cNvPicPr>
+            <p:nvPr/>
+          </p:nvPicPr>
+          <p:blipFill>
+            <a:blip r:embed="rId4" cstate="print">
+              <a:extLst>
+                <a:ext uri="{28A0092B-C50C-407E-A947-70E740481C1C}">
+                  <a14:useLocalDpi xmlns:a14="http://schemas.microsoft.com/office/drawing/2010/main" val="0"/>
+                </a:ext>
+              </a:extLst>
+            </a:blip>
+            <a:stretch>
+              <a:fillRect/>
+            </a:stretch>
+          </p:blipFill>
+          <p:spPr>
+            <a:xfrm>
+              <a:off x="4260677" y="551764"/>
+              <a:ext cx="216000" cy="216000"/>
+            </a:xfrm>
+            <a:prstGeom prst="rect">
+              <a:avLst/>
+            </a:prstGeom>
+          </p:spPr>
+        </p:pic>
+      </p:grpSp>
+      <p:grpSp>
+        <p:nvGrpSpPr>
+          <p:cNvPr id="45" name="群組 44"/>
+          <p:cNvGrpSpPr/>
+          <p:nvPr/>
+        </p:nvGrpSpPr>
+        <p:grpSpPr>
+          <a:xfrm>
+            <a:off x="4143054" y="1642313"/>
+            <a:ext cx="2482967" cy="253916"/>
+            <a:chOff x="4260677" y="865082"/>
+            <a:chExt cx="2482967" cy="253916"/>
+          </a:xfrm>
+        </p:grpSpPr>
+        <p:sp>
+          <p:nvSpPr>
+            <p:cNvPr id="33" name="文字方塊 32"/>
+            <p:cNvSpPr txBox="1"/>
+            <p:nvPr/>
+          </p:nvSpPr>
+          <p:spPr>
+            <a:xfrm>
+              <a:off x="4476677" y="865082"/>
+              <a:ext cx="2266967" cy="253916"/>
+            </a:xfrm>
+            <a:prstGeom prst="rect">
+              <a:avLst/>
+            </a:prstGeom>
+            <a:noFill/>
+          </p:spPr>
+          <p:txBody>
+            <a:bodyPr wrap="none" rtlCol="0">
+              <a:spAutoFit/>
+            </a:bodyPr>
+            <a:lstStyle/>
+            <a:p>
+              <a:r>
+                <a:rPr lang="en-US" altLang="zh-TW" sz="1050" dirty="0">
+                  <a:solidFill>
+                    <a:schemeClr val="tx1">
+                      <a:lumMod val="85000"/>
+                      <a:lumOff val="15000"/>
+                    </a:schemeClr>
+                  </a:solidFill>
+                  <a:latin typeface="微軟正黑體" panose="020B0604030504040204" pitchFamily="34" charset="-120"/>
+                  <a:ea typeface="微軟正黑體" panose="020B0604030504040204" pitchFamily="34" charset="-120"/>
+                  <a:hlinkClick r:id="rId5"/>
+                </a:rPr>
+                <a:t>https://github.com/PKhuang-TW</a:t>
+              </a:r>
+              <a:endParaRPr lang="en-US" altLang="zh-TW" sz="1050" dirty="0">
+                <a:solidFill>
+                  <a:schemeClr val="tx1">
+                    <a:lumMod val="85000"/>
+                    <a:lumOff val="15000"/>
+                  </a:schemeClr>
+                </a:solidFill>
+                <a:latin typeface="微軟正黑體" panose="020B0604030504040204" pitchFamily="34" charset="-120"/>
+                <a:ea typeface="微軟正黑體" panose="020B0604030504040204" pitchFamily="34" charset="-120"/>
+              </a:endParaRPr>
+            </a:p>
+          </p:txBody>
+        </p:sp>
+        <p:pic>
+          <p:nvPicPr>
+            <p:cNvPr id="8" name="圖片 7"/>
+            <p:cNvPicPr>
+              <a:picLocks noChangeAspect="1"/>
+            </p:cNvPicPr>
+            <p:nvPr/>
+          </p:nvPicPr>
+          <p:blipFill>
+            <a:blip r:embed="rId6" cstate="print">
+              <a:extLst>
+                <a:ext uri="{28A0092B-C50C-407E-A947-70E740481C1C}">
+                  <a14:useLocalDpi xmlns:a14="http://schemas.microsoft.com/office/drawing/2010/main" val="0"/>
+                </a:ext>
+              </a:extLst>
+            </a:blip>
+            <a:stretch>
+              <a:fillRect/>
+            </a:stretch>
+          </p:blipFill>
+          <p:spPr>
+            <a:xfrm>
+              <a:off x="4260677" y="884040"/>
+              <a:ext cx="216000" cy="216000"/>
+            </a:xfrm>
+            <a:prstGeom prst="rect">
+              <a:avLst/>
+            </a:prstGeom>
+          </p:spPr>
+        </p:pic>
+      </p:grpSp>
       <p:grpSp>
         <p:nvGrpSpPr>
           <p:cNvPr id="12" name="群組 11"/>
@@ -3135,1338 +4493,29 @@
         </p:nvGrpSpPr>
         <p:grpSpPr>
           <a:xfrm>
-            <a:off x="287338" y="2247900"/>
-            <a:ext cx="2620962" cy="1586132"/>
-            <a:chOff x="338138" y="2514600"/>
-            <a:chExt cx="2620962" cy="1586132"/>
+            <a:off x="541820" y="549868"/>
+            <a:ext cx="2012562" cy="932643"/>
+            <a:chOff x="562195" y="232280"/>
+            <a:chExt cx="2012562" cy="932643"/>
           </a:xfrm>
         </p:grpSpPr>
         <p:sp>
           <p:nvSpPr>
-            <p:cNvPr id="8" name="文字方塊 7"/>
-            <p:cNvSpPr txBox="1"/>
+            <p:cNvPr id="7" name="矩形 6"/>
+            <p:cNvSpPr/>
             <p:nvPr/>
           </p:nvSpPr>
           <p:spPr>
             <a:xfrm>
-              <a:off x="338138" y="2514600"/>
-              <a:ext cx="1282700" cy="338554"/>
+              <a:off x="562195" y="232280"/>
+              <a:ext cx="1844329" cy="450884"/>
             </a:xfrm>
             <a:prstGeom prst="rect">
               <a:avLst/>
             </a:prstGeom>
             <a:noFill/>
-          </p:spPr>
-          <p:txBody>
-            <a:bodyPr wrap="square" rtlCol="0">
-              <a:spAutoFit/>
-            </a:bodyPr>
-            <a:lstStyle/>
-            <a:p>
-              <a:pPr algn="dist"/>
-              <a:r>
-                <a:rPr lang="en-US" altLang="zh-TW" sz="1600" b="1" dirty="0" smtClean="0">
-                  <a:latin typeface="Arial" panose="020B0604020202020204" pitchFamily="34" charset="0"/>
-                  <a:cs typeface="Arial" panose="020B0604020202020204" pitchFamily="34" charset="0"/>
-                </a:rPr>
-                <a:t>DETAILS</a:t>
-              </a:r>
-              <a:endParaRPr lang="zh-TW" altLang="en-US" sz="1600" b="1" dirty="0">
-                <a:latin typeface="Arial" panose="020B0604020202020204" pitchFamily="34" charset="0"/>
-                <a:cs typeface="Arial" panose="020B0604020202020204" pitchFamily="34" charset="0"/>
-              </a:endParaRPr>
-            </a:p>
-          </p:txBody>
-        </p:sp>
-        <p:cxnSp>
-          <p:nvCxnSpPr>
-            <p:cNvPr id="10" name="直線接點 9"/>
-            <p:cNvCxnSpPr/>
-            <p:nvPr/>
-          </p:nvCxnSpPr>
-          <p:spPr>
-            <a:xfrm>
-              <a:off x="338138" y="2984500"/>
-              <a:ext cx="1757362" cy="0"/>
-            </a:xfrm>
-            <a:prstGeom prst="line">
-              <a:avLst/>
-            </a:prstGeom>
             <a:ln w="25400">
-              <a:solidFill>
-                <a:schemeClr val="tx1"/>
-              </a:solidFill>
-            </a:ln>
-          </p:spPr>
-          <p:style>
-            <a:lnRef idx="1">
-              <a:schemeClr val="accent1"/>
-            </a:lnRef>
-            <a:fillRef idx="0">
-              <a:schemeClr val="accent1"/>
-            </a:fillRef>
-            <a:effectRef idx="0">
-              <a:schemeClr val="accent1"/>
-            </a:effectRef>
-            <a:fontRef idx="minor">
-              <a:schemeClr val="tx1"/>
-            </a:fontRef>
-          </p:style>
-        </p:cxnSp>
-        <p:sp>
-          <p:nvSpPr>
-            <p:cNvPr id="11" name="文字方塊 10"/>
-            <p:cNvSpPr txBox="1"/>
-            <p:nvPr/>
-          </p:nvSpPr>
-          <p:spPr>
-            <a:xfrm>
-              <a:off x="338138" y="3085069"/>
-              <a:ext cx="2620962" cy="1015663"/>
-            </a:xfrm>
-            <a:prstGeom prst="rect">
-              <a:avLst/>
-            </a:prstGeom>
-            <a:noFill/>
-          </p:spPr>
-          <p:txBody>
-            <a:bodyPr wrap="square" rtlCol="0">
-              <a:spAutoFit/>
-            </a:bodyPr>
-            <a:lstStyle/>
-            <a:p>
-              <a:r>
-                <a:rPr lang="en-US" altLang="zh-TW" sz="1200" b="1" dirty="0" smtClean="0">
-                  <a:latin typeface="+mj-lt"/>
-                  <a:cs typeface="Arial" panose="020B0604020202020204" pitchFamily="34" charset="0"/>
-                </a:rPr>
-                <a:t>Phone</a:t>
-              </a:r>
-            </a:p>
-            <a:p>
-              <a:r>
-                <a:rPr lang="en-US" altLang="zh-TW" sz="1200" dirty="0" smtClean="0">
-                  <a:latin typeface="+mj-lt"/>
-                  <a:cs typeface="Arial" panose="020B0604020202020204" pitchFamily="34" charset="0"/>
-                </a:rPr>
-                <a:t>0932732142</a:t>
-              </a:r>
-            </a:p>
-            <a:p>
-              <a:endParaRPr lang="en-US" altLang="zh-TW" sz="1200" dirty="0">
-                <a:latin typeface="+mj-lt"/>
-                <a:cs typeface="Arial" panose="020B0604020202020204" pitchFamily="34" charset="0"/>
-              </a:endParaRPr>
-            </a:p>
-            <a:p>
-              <a:r>
-                <a:rPr lang="en-US" altLang="zh-TW" sz="1200" b="1" dirty="0" smtClean="0">
-                  <a:latin typeface="+mj-lt"/>
-                  <a:cs typeface="Arial" panose="020B0604020202020204" pitchFamily="34" charset="0"/>
-                </a:rPr>
-                <a:t>Email</a:t>
-              </a:r>
-            </a:p>
-            <a:p>
-              <a:r>
-                <a:rPr lang="en-US" altLang="zh-TW" sz="1200" dirty="0" smtClean="0">
-                  <a:latin typeface="+mj-lt"/>
-                  <a:cs typeface="Arial" panose="020B0604020202020204" pitchFamily="34" charset="0"/>
-                </a:rPr>
-                <a:t>pokaihuang.tw@gmail.com</a:t>
-              </a:r>
-              <a:endParaRPr lang="zh-TW" altLang="en-US" sz="1200" dirty="0">
-                <a:latin typeface="+mj-lt"/>
-                <a:cs typeface="Arial" panose="020B0604020202020204" pitchFamily="34" charset="0"/>
-              </a:endParaRPr>
-            </a:p>
-          </p:txBody>
-        </p:sp>
-      </p:grpSp>
-      <p:grpSp>
-        <p:nvGrpSpPr>
-          <p:cNvPr id="13" name="群組 12"/>
-          <p:cNvGrpSpPr/>
-          <p:nvPr/>
-        </p:nvGrpSpPr>
-        <p:grpSpPr>
-          <a:xfrm>
-            <a:off x="287338" y="4686300"/>
-            <a:ext cx="2925762" cy="1586132"/>
-            <a:chOff x="338138" y="2514600"/>
-            <a:chExt cx="2620962" cy="1586132"/>
-          </a:xfrm>
-        </p:grpSpPr>
-        <p:sp>
-          <p:nvSpPr>
-            <p:cNvPr id="14" name="文字方塊 13"/>
-            <p:cNvSpPr txBox="1"/>
-            <p:nvPr/>
-          </p:nvSpPr>
-          <p:spPr>
-            <a:xfrm>
-              <a:off x="338138" y="2514600"/>
-              <a:ext cx="1282700" cy="338554"/>
-            </a:xfrm>
-            <a:prstGeom prst="rect">
-              <a:avLst/>
-            </a:prstGeom>
-            <a:noFill/>
-          </p:spPr>
-          <p:txBody>
-            <a:bodyPr wrap="square" rtlCol="0">
-              <a:spAutoFit/>
-            </a:bodyPr>
-            <a:lstStyle/>
-            <a:p>
-              <a:pPr algn="dist"/>
-              <a:r>
-                <a:rPr lang="en-US" altLang="zh-TW" sz="1600" b="1" dirty="0" smtClean="0">
-                  <a:latin typeface="Arial" panose="020B0604020202020204" pitchFamily="34" charset="0"/>
-                  <a:cs typeface="Arial" panose="020B0604020202020204" pitchFamily="34" charset="0"/>
-                </a:rPr>
-                <a:t>LINKS</a:t>
-              </a:r>
-              <a:endParaRPr lang="zh-TW" altLang="en-US" sz="1600" b="1" dirty="0">
-                <a:latin typeface="Arial" panose="020B0604020202020204" pitchFamily="34" charset="0"/>
-                <a:cs typeface="Arial" panose="020B0604020202020204" pitchFamily="34" charset="0"/>
-              </a:endParaRPr>
-            </a:p>
-          </p:txBody>
-        </p:sp>
-        <p:cxnSp>
-          <p:nvCxnSpPr>
-            <p:cNvPr id="15" name="直線接點 14"/>
-            <p:cNvCxnSpPr/>
-            <p:nvPr/>
-          </p:nvCxnSpPr>
-          <p:spPr>
-            <a:xfrm>
-              <a:off x="338138" y="2984500"/>
-              <a:ext cx="1757362" cy="0"/>
-            </a:xfrm>
-            <a:prstGeom prst="line">
-              <a:avLst/>
-            </a:prstGeom>
-            <a:ln w="25400">
-              <a:solidFill>
-                <a:schemeClr val="tx1"/>
-              </a:solidFill>
-            </a:ln>
-          </p:spPr>
-          <p:style>
-            <a:lnRef idx="1">
-              <a:schemeClr val="accent1"/>
-            </a:lnRef>
-            <a:fillRef idx="0">
-              <a:schemeClr val="accent1"/>
-            </a:fillRef>
-            <a:effectRef idx="0">
-              <a:schemeClr val="accent1"/>
-            </a:effectRef>
-            <a:fontRef idx="minor">
-              <a:schemeClr val="tx1"/>
-            </a:fontRef>
-          </p:style>
-        </p:cxnSp>
-        <p:sp>
-          <p:nvSpPr>
-            <p:cNvPr id="16" name="文字方塊 15"/>
-            <p:cNvSpPr txBox="1"/>
-            <p:nvPr/>
-          </p:nvSpPr>
-          <p:spPr>
-            <a:xfrm>
-              <a:off x="338138" y="3085069"/>
-              <a:ext cx="2620962" cy="1015663"/>
-            </a:xfrm>
-            <a:prstGeom prst="rect">
-              <a:avLst/>
-            </a:prstGeom>
-            <a:noFill/>
-          </p:spPr>
-          <p:txBody>
-            <a:bodyPr wrap="square" rtlCol="0">
-              <a:spAutoFit/>
-            </a:bodyPr>
-            <a:lstStyle/>
-            <a:p>
-              <a:r>
-                <a:rPr lang="en-US" altLang="zh-TW" sz="1200" b="1" dirty="0" smtClean="0">
-                  <a:latin typeface="+mj-lt"/>
-                  <a:cs typeface="Arial" panose="020B0604020202020204" pitchFamily="34" charset="0"/>
-                </a:rPr>
-                <a:t>Personal Link</a:t>
-              </a:r>
-            </a:p>
-            <a:p>
-              <a:r>
-                <a:rPr lang="en-US" altLang="zh-TW" sz="1200" dirty="0">
-                  <a:latin typeface="+mj-lt"/>
-                </a:rPr>
-                <a:t>https://</a:t>
-              </a:r>
-              <a:r>
-                <a:rPr lang="en-US" altLang="zh-TW" sz="1200" dirty="0" smtClean="0">
-                  <a:latin typeface="+mj-lt"/>
-                </a:rPr>
-                <a:t>pkhuang-tw.github.io</a:t>
-              </a:r>
-            </a:p>
-            <a:p>
-              <a:endParaRPr lang="en-US" altLang="zh-TW" sz="1200" dirty="0">
-                <a:latin typeface="+mj-lt"/>
-                <a:cs typeface="Arial" panose="020B0604020202020204" pitchFamily="34" charset="0"/>
-              </a:endParaRPr>
-            </a:p>
-            <a:p>
-              <a:r>
-                <a:rPr lang="en-US" altLang="zh-TW" sz="1200" b="1" dirty="0" err="1" smtClean="0">
-                  <a:latin typeface="+mj-lt"/>
-                  <a:cs typeface="Arial" panose="020B0604020202020204" pitchFamily="34" charset="0"/>
-                </a:rPr>
-                <a:t>Github</a:t>
-              </a:r>
-              <a:endParaRPr lang="en-US" altLang="zh-TW" sz="1200" b="1" dirty="0" smtClean="0">
-                <a:latin typeface="+mj-lt"/>
-                <a:cs typeface="Arial" panose="020B0604020202020204" pitchFamily="34" charset="0"/>
-              </a:endParaRPr>
-            </a:p>
-            <a:p>
-              <a:r>
-                <a:rPr lang="en-US" altLang="zh-TW" sz="1200" dirty="0">
-                  <a:latin typeface="+mj-lt"/>
-                </a:rPr>
-                <a:t>https://github.com/PKhuang-TW</a:t>
-              </a:r>
-              <a:endParaRPr lang="zh-TW" altLang="en-US" sz="1050" dirty="0">
-                <a:latin typeface="+mj-lt"/>
-                <a:cs typeface="Arial" panose="020B0604020202020204" pitchFamily="34" charset="0"/>
-              </a:endParaRPr>
-            </a:p>
-          </p:txBody>
-        </p:sp>
-      </p:grpSp>
-      <p:grpSp>
-        <p:nvGrpSpPr>
-          <p:cNvPr id="17" name="群組 16"/>
-          <p:cNvGrpSpPr/>
-          <p:nvPr/>
-        </p:nvGrpSpPr>
-        <p:grpSpPr>
-          <a:xfrm>
-            <a:off x="287338" y="7124700"/>
-            <a:ext cx="2925762" cy="2694127"/>
-            <a:chOff x="338138" y="2514600"/>
-            <a:chExt cx="2620962" cy="2694127"/>
-          </a:xfrm>
-        </p:grpSpPr>
-        <p:sp>
-          <p:nvSpPr>
-            <p:cNvPr id="18" name="文字方塊 17"/>
-            <p:cNvSpPr txBox="1"/>
-            <p:nvPr/>
-          </p:nvSpPr>
-          <p:spPr>
-            <a:xfrm>
-              <a:off x="338138" y="2514600"/>
-              <a:ext cx="1282700" cy="338554"/>
-            </a:xfrm>
-            <a:prstGeom prst="rect">
-              <a:avLst/>
-            </a:prstGeom>
-            <a:noFill/>
-          </p:spPr>
-          <p:txBody>
-            <a:bodyPr wrap="square" rtlCol="0">
-              <a:spAutoFit/>
-            </a:bodyPr>
-            <a:lstStyle/>
-            <a:p>
-              <a:pPr algn="dist"/>
-              <a:r>
-                <a:rPr lang="en-US" altLang="zh-TW" sz="1600" b="1" dirty="0" smtClean="0">
-                  <a:latin typeface="Arial" panose="020B0604020202020204" pitchFamily="34" charset="0"/>
-                  <a:cs typeface="Arial" panose="020B0604020202020204" pitchFamily="34" charset="0"/>
-                </a:rPr>
-                <a:t>SKILLS</a:t>
-              </a:r>
-              <a:endParaRPr lang="zh-TW" altLang="en-US" sz="1600" b="1" dirty="0">
-                <a:latin typeface="Arial" panose="020B0604020202020204" pitchFamily="34" charset="0"/>
-                <a:cs typeface="Arial" panose="020B0604020202020204" pitchFamily="34" charset="0"/>
-              </a:endParaRPr>
-            </a:p>
-          </p:txBody>
-        </p:sp>
-        <p:cxnSp>
-          <p:nvCxnSpPr>
-            <p:cNvPr id="19" name="直線接點 18"/>
-            <p:cNvCxnSpPr/>
-            <p:nvPr/>
-          </p:nvCxnSpPr>
-          <p:spPr>
-            <a:xfrm>
-              <a:off x="338138" y="2984500"/>
-              <a:ext cx="1757362" cy="0"/>
-            </a:xfrm>
-            <a:prstGeom prst="line">
-              <a:avLst/>
-            </a:prstGeom>
-            <a:ln w="25400">
-              <a:solidFill>
-                <a:schemeClr val="tx1"/>
-              </a:solidFill>
-            </a:ln>
-          </p:spPr>
-          <p:style>
-            <a:lnRef idx="1">
-              <a:schemeClr val="accent1"/>
-            </a:lnRef>
-            <a:fillRef idx="0">
-              <a:schemeClr val="accent1"/>
-            </a:fillRef>
-            <a:effectRef idx="0">
-              <a:schemeClr val="accent1"/>
-            </a:effectRef>
-            <a:fontRef idx="minor">
-              <a:schemeClr val="tx1"/>
-            </a:fontRef>
-          </p:style>
-        </p:cxnSp>
-        <p:sp>
-          <p:nvSpPr>
-            <p:cNvPr id="20" name="文字方塊 19"/>
-            <p:cNvSpPr txBox="1"/>
-            <p:nvPr/>
-          </p:nvSpPr>
-          <p:spPr>
-            <a:xfrm>
-              <a:off x="338138" y="3085069"/>
-              <a:ext cx="2620962" cy="2123658"/>
-            </a:xfrm>
-            <a:prstGeom prst="rect">
-              <a:avLst/>
-            </a:prstGeom>
-            <a:noFill/>
-          </p:spPr>
-          <p:txBody>
-            <a:bodyPr wrap="square" rtlCol="0">
-              <a:spAutoFit/>
-            </a:bodyPr>
-            <a:lstStyle/>
-            <a:p>
-              <a:r>
-                <a:rPr lang="en-US" altLang="zh-TW" sz="1200" dirty="0" smtClean="0">
-                  <a:latin typeface="+mj-lt"/>
-                  <a:cs typeface="Arial" panose="020B0604020202020204" pitchFamily="34" charset="0"/>
-                </a:rPr>
-                <a:t>System Verilog</a:t>
-              </a:r>
-            </a:p>
-            <a:p>
-              <a:endParaRPr lang="en-US" altLang="zh-TW" sz="1200" dirty="0">
-                <a:latin typeface="+mj-lt"/>
-                <a:cs typeface="Arial" panose="020B0604020202020204" pitchFamily="34" charset="0"/>
-              </a:endParaRPr>
-            </a:p>
-            <a:p>
-              <a:r>
-                <a:rPr lang="en-US" altLang="zh-TW" sz="1200" dirty="0" smtClean="0">
-                  <a:latin typeface="+mj-lt"/>
-                  <a:cs typeface="Arial" panose="020B0604020202020204" pitchFamily="34" charset="0"/>
-                </a:rPr>
-                <a:t>UVM</a:t>
-              </a:r>
-            </a:p>
-            <a:p>
-              <a:endParaRPr lang="en-US" altLang="zh-TW" sz="1200" dirty="0">
-                <a:latin typeface="+mj-lt"/>
-                <a:cs typeface="Arial" panose="020B0604020202020204" pitchFamily="34" charset="0"/>
-              </a:endParaRPr>
-            </a:p>
-            <a:p>
-              <a:r>
-                <a:rPr lang="en-US" altLang="zh-TW" sz="1200" dirty="0" smtClean="0">
-                  <a:latin typeface="+mj-lt"/>
-                  <a:cs typeface="Arial" panose="020B0604020202020204" pitchFamily="34" charset="0"/>
-                </a:rPr>
-                <a:t>C</a:t>
-              </a:r>
-            </a:p>
-            <a:p>
-              <a:endParaRPr lang="en-US" altLang="zh-TW" sz="1200" dirty="0" smtClean="0">
-                <a:latin typeface="+mj-lt"/>
-                <a:cs typeface="Arial" panose="020B0604020202020204" pitchFamily="34" charset="0"/>
-              </a:endParaRPr>
-            </a:p>
-            <a:p>
-              <a:r>
-                <a:rPr lang="en-US" altLang="zh-TW" sz="1200" dirty="0" smtClean="0">
-                  <a:latin typeface="+mj-lt"/>
-                  <a:cs typeface="Arial" panose="020B0604020202020204" pitchFamily="34" charset="0"/>
-                </a:rPr>
-                <a:t>C++</a:t>
-              </a:r>
-            </a:p>
-            <a:p>
-              <a:endParaRPr lang="en-US" altLang="zh-TW" sz="1200" dirty="0" smtClean="0">
-                <a:latin typeface="+mj-lt"/>
-                <a:cs typeface="Arial" panose="020B0604020202020204" pitchFamily="34" charset="0"/>
-              </a:endParaRPr>
-            </a:p>
-            <a:p>
-              <a:r>
-                <a:rPr lang="en-US" altLang="zh-TW" sz="1200" dirty="0" smtClean="0">
-                  <a:latin typeface="+mj-lt"/>
-                  <a:cs typeface="Arial" panose="020B0604020202020204" pitchFamily="34" charset="0"/>
-                </a:rPr>
-                <a:t>Python</a:t>
-              </a:r>
-            </a:p>
-            <a:p>
-              <a:endParaRPr lang="en-US" altLang="zh-TW" sz="1200" dirty="0" smtClean="0">
-                <a:latin typeface="+mj-lt"/>
-                <a:cs typeface="Arial" panose="020B0604020202020204" pitchFamily="34" charset="0"/>
-              </a:endParaRPr>
-            </a:p>
-            <a:p>
-              <a:endParaRPr lang="en-US" altLang="zh-TW" sz="1200" dirty="0" smtClean="0">
-                <a:latin typeface="+mj-lt"/>
-                <a:cs typeface="Arial" panose="020B0604020202020204" pitchFamily="34" charset="0"/>
-              </a:endParaRPr>
-            </a:p>
-          </p:txBody>
-        </p:sp>
-      </p:grpSp>
-      <p:grpSp>
-        <p:nvGrpSpPr>
-          <p:cNvPr id="21" name="群組 20"/>
-          <p:cNvGrpSpPr/>
-          <p:nvPr/>
-        </p:nvGrpSpPr>
-        <p:grpSpPr>
-          <a:xfrm>
-            <a:off x="2950492" y="2129919"/>
-            <a:ext cx="3542048" cy="1704113"/>
-            <a:chOff x="338138" y="2514600"/>
-            <a:chExt cx="3370262" cy="1704113"/>
-          </a:xfrm>
-        </p:grpSpPr>
-        <p:sp>
-          <p:nvSpPr>
-            <p:cNvPr id="22" name="文字方塊 21"/>
-            <p:cNvSpPr txBox="1"/>
-            <p:nvPr/>
-          </p:nvSpPr>
-          <p:spPr>
-            <a:xfrm>
-              <a:off x="338138" y="2514600"/>
-              <a:ext cx="1414462" cy="338554"/>
-            </a:xfrm>
-            <a:prstGeom prst="rect">
-              <a:avLst/>
-            </a:prstGeom>
-            <a:noFill/>
-          </p:spPr>
-          <p:txBody>
-            <a:bodyPr wrap="square" rtlCol="0">
-              <a:spAutoFit/>
-            </a:bodyPr>
-            <a:lstStyle/>
-            <a:p>
-              <a:pPr algn="dist"/>
-              <a:r>
-                <a:rPr lang="en-US" altLang="zh-TW" sz="1600" b="1" dirty="0" smtClean="0">
-                  <a:latin typeface="Arial" panose="020B0604020202020204" pitchFamily="34" charset="0"/>
-                  <a:cs typeface="Arial" panose="020B0604020202020204" pitchFamily="34" charset="0"/>
-                </a:rPr>
-                <a:t>PROFILE</a:t>
-              </a:r>
-              <a:endParaRPr lang="zh-TW" altLang="en-US" sz="1600" b="1" dirty="0">
-                <a:latin typeface="Arial" panose="020B0604020202020204" pitchFamily="34" charset="0"/>
-                <a:cs typeface="Arial" panose="020B0604020202020204" pitchFamily="34" charset="0"/>
-              </a:endParaRPr>
-            </a:p>
-          </p:txBody>
-        </p:sp>
-        <p:cxnSp>
-          <p:nvCxnSpPr>
-            <p:cNvPr id="23" name="直線接點 22"/>
-            <p:cNvCxnSpPr/>
-            <p:nvPr/>
-          </p:nvCxnSpPr>
-          <p:spPr>
-            <a:xfrm>
-              <a:off x="338138" y="2984500"/>
-              <a:ext cx="3243262" cy="0"/>
-            </a:xfrm>
-            <a:prstGeom prst="line">
-              <a:avLst/>
-            </a:prstGeom>
-            <a:ln w="25400">
-              <a:solidFill>
-                <a:schemeClr val="tx1"/>
-              </a:solidFill>
-            </a:ln>
-          </p:spPr>
-          <p:style>
-            <a:lnRef idx="1">
-              <a:schemeClr val="accent1"/>
-            </a:lnRef>
-            <a:fillRef idx="0">
-              <a:schemeClr val="accent1"/>
-            </a:fillRef>
-            <a:effectRef idx="0">
-              <a:schemeClr val="accent1"/>
-            </a:effectRef>
-            <a:fontRef idx="minor">
-              <a:schemeClr val="tx1"/>
-            </a:fontRef>
-          </p:style>
-        </p:cxnSp>
-        <p:sp>
-          <p:nvSpPr>
-            <p:cNvPr id="24" name="文字方塊 23"/>
-            <p:cNvSpPr txBox="1"/>
-            <p:nvPr/>
-          </p:nvSpPr>
-          <p:spPr>
-            <a:xfrm>
-              <a:off x="338138" y="3085069"/>
-              <a:ext cx="3370262" cy="1133644"/>
-            </a:xfrm>
-            <a:prstGeom prst="rect">
-              <a:avLst/>
-            </a:prstGeom>
-            <a:noFill/>
-          </p:spPr>
-          <p:txBody>
-            <a:bodyPr wrap="square" rtlCol="0">
-              <a:spAutoFit/>
-            </a:bodyPr>
-            <a:lstStyle/>
-            <a:p>
-              <a:pPr>
-                <a:spcBef>
-                  <a:spcPts val="100"/>
-                </a:spcBef>
-              </a:pPr>
-              <a:r>
-                <a:rPr lang="en-US" altLang="zh-TW" sz="1200" dirty="0">
-                  <a:latin typeface="+mj-lt"/>
-                </a:rPr>
-                <a:t>I am a lively and enthusiastic person. </a:t>
-              </a:r>
-              <a:r>
-                <a:rPr lang="en-US" altLang="zh-TW" sz="1200" dirty="0" smtClean="0">
-                  <a:latin typeface="+mj-lt"/>
-                </a:rPr>
-                <a:t>I am familiar </a:t>
-              </a:r>
-              <a:r>
-                <a:rPr lang="en-US" altLang="zh-TW" sz="1200" dirty="0">
-                  <a:latin typeface="+mj-lt"/>
-                </a:rPr>
-                <a:t>with communicating with </a:t>
-              </a:r>
-              <a:r>
-                <a:rPr lang="en-US" altLang="zh-TW" sz="1200" dirty="0" smtClean="0">
-                  <a:latin typeface="+mj-lt"/>
-                </a:rPr>
-                <a:t>teams and </a:t>
-              </a:r>
-              <a:r>
-                <a:rPr lang="en-US" altLang="zh-TW" sz="1200" dirty="0">
-                  <a:latin typeface="+mj-lt"/>
-                </a:rPr>
-                <a:t>find </a:t>
-              </a:r>
-              <a:r>
-                <a:rPr lang="en-US" altLang="zh-TW" sz="1200" dirty="0" smtClean="0">
-                  <a:latin typeface="+mj-lt"/>
-                </a:rPr>
-                <a:t>compromises that everyone can agree on.</a:t>
-              </a:r>
-            </a:p>
-            <a:p>
-              <a:pPr>
-                <a:spcBef>
-                  <a:spcPts val="100"/>
-                </a:spcBef>
-              </a:pPr>
-              <a:endParaRPr lang="en-US" altLang="zh-TW" sz="600" dirty="0">
-                <a:latin typeface="+mj-lt"/>
-                <a:cs typeface="Arial" panose="020B0604020202020204" pitchFamily="34" charset="0"/>
-              </a:endParaRPr>
-            </a:p>
-            <a:p>
-              <a:pPr>
-                <a:spcBef>
-                  <a:spcPts val="100"/>
-                </a:spcBef>
-              </a:pPr>
-              <a:r>
-                <a:rPr lang="en-US" altLang="zh-TW" sz="1200" dirty="0" smtClean="0">
-                  <a:latin typeface="+mj-lt"/>
-                </a:rPr>
-                <a:t>I have learned System Verilog and UVM from online resources, and hope to be part of the DV team.</a:t>
-              </a:r>
-              <a:endParaRPr lang="zh-TW" altLang="en-US" sz="1200" dirty="0">
-                <a:latin typeface="+mj-lt"/>
-                <a:cs typeface="Arial" panose="020B0604020202020204" pitchFamily="34" charset="0"/>
-              </a:endParaRPr>
-            </a:p>
-          </p:txBody>
-        </p:sp>
-      </p:grpSp>
-      <p:grpSp>
-        <p:nvGrpSpPr>
-          <p:cNvPr id="26" name="群組 25"/>
-          <p:cNvGrpSpPr/>
-          <p:nvPr/>
-        </p:nvGrpSpPr>
-        <p:grpSpPr>
-          <a:xfrm>
-            <a:off x="2950492" y="4032795"/>
-            <a:ext cx="3812443" cy="3286597"/>
-            <a:chOff x="338138" y="2514600"/>
-            <a:chExt cx="3370262" cy="3286597"/>
-          </a:xfrm>
-        </p:grpSpPr>
-        <p:sp>
-          <p:nvSpPr>
-            <p:cNvPr id="27" name="文字方塊 26"/>
-            <p:cNvSpPr txBox="1"/>
-            <p:nvPr/>
-          </p:nvSpPr>
-          <p:spPr>
-            <a:xfrm>
-              <a:off x="338138" y="2514600"/>
-              <a:ext cx="2978150" cy="338554"/>
-            </a:xfrm>
-            <a:prstGeom prst="rect">
-              <a:avLst/>
-            </a:prstGeom>
-            <a:noFill/>
-          </p:spPr>
-          <p:txBody>
-            <a:bodyPr wrap="square" rtlCol="0">
-              <a:spAutoFit/>
-            </a:bodyPr>
-            <a:lstStyle/>
-            <a:p>
-              <a:pPr algn="dist"/>
-              <a:r>
-                <a:rPr lang="en-US" altLang="zh-TW" sz="1600" b="1" dirty="0" smtClean="0">
-                  <a:latin typeface="Arial" panose="020B0604020202020204" pitchFamily="34" charset="0"/>
-                  <a:cs typeface="Arial" panose="020B0604020202020204" pitchFamily="34" charset="0"/>
-                </a:rPr>
-                <a:t>EMPLOYMENT HISTORY</a:t>
-              </a:r>
-              <a:endParaRPr lang="zh-TW" altLang="en-US" sz="1600" b="1" dirty="0">
-                <a:latin typeface="Arial" panose="020B0604020202020204" pitchFamily="34" charset="0"/>
-                <a:cs typeface="Arial" panose="020B0604020202020204" pitchFamily="34" charset="0"/>
-              </a:endParaRPr>
-            </a:p>
-          </p:txBody>
-        </p:sp>
-        <p:cxnSp>
-          <p:nvCxnSpPr>
-            <p:cNvPr id="28" name="直線接點 27"/>
-            <p:cNvCxnSpPr/>
-            <p:nvPr/>
-          </p:nvCxnSpPr>
-          <p:spPr>
-            <a:xfrm>
-              <a:off x="338138" y="2984500"/>
-              <a:ext cx="3243262" cy="0"/>
-            </a:xfrm>
-            <a:prstGeom prst="line">
-              <a:avLst/>
-            </a:prstGeom>
-            <a:ln w="25400">
-              <a:solidFill>
-                <a:schemeClr val="tx1"/>
-              </a:solidFill>
-            </a:ln>
-          </p:spPr>
-          <p:style>
-            <a:lnRef idx="1">
-              <a:schemeClr val="accent1"/>
-            </a:lnRef>
-            <a:fillRef idx="0">
-              <a:schemeClr val="accent1"/>
-            </a:fillRef>
-            <a:effectRef idx="0">
-              <a:schemeClr val="accent1"/>
-            </a:effectRef>
-            <a:fontRef idx="minor">
-              <a:schemeClr val="tx1"/>
-            </a:fontRef>
-          </p:style>
-        </p:cxnSp>
-        <p:sp>
-          <p:nvSpPr>
-            <p:cNvPr id="29" name="文字方塊 28"/>
-            <p:cNvSpPr txBox="1"/>
-            <p:nvPr/>
-          </p:nvSpPr>
-          <p:spPr>
-            <a:xfrm>
-              <a:off x="338138" y="3085069"/>
-              <a:ext cx="3370262" cy="2716128"/>
-            </a:xfrm>
-            <a:prstGeom prst="rect">
-              <a:avLst/>
-            </a:prstGeom>
-            <a:noFill/>
-          </p:spPr>
-          <p:txBody>
-            <a:bodyPr wrap="square" rtlCol="0">
-              <a:spAutoFit/>
-            </a:bodyPr>
-            <a:lstStyle/>
-            <a:p>
-              <a:pPr>
-                <a:spcBef>
-                  <a:spcPts val="130"/>
-                </a:spcBef>
-              </a:pPr>
-              <a:r>
-                <a:rPr lang="en-US" altLang="zh-TW" sz="1200" b="1" dirty="0" smtClean="0">
-                  <a:latin typeface="+mj-lt"/>
-                  <a:cs typeface="Arial" panose="020B0604020202020204" pitchFamily="34" charset="0"/>
-                </a:rPr>
-                <a:t>Firmware Engineer, Silicon Motion</a:t>
-              </a:r>
-            </a:p>
-            <a:p>
-              <a:pPr>
-                <a:spcBef>
-                  <a:spcPts val="130"/>
-                </a:spcBef>
-                <a:spcAft>
-                  <a:spcPts val="150"/>
-                </a:spcAft>
-              </a:pPr>
-              <a:r>
-                <a:rPr lang="en-US" altLang="zh-TW" sz="1200" dirty="0" smtClean="0">
-                  <a:latin typeface="+mj-lt"/>
-                  <a:cs typeface="Arial" panose="020B0604020202020204" pitchFamily="34" charset="0"/>
-                </a:rPr>
-                <a:t>Jan 2021 – Present</a:t>
-              </a:r>
-            </a:p>
-            <a:p>
-              <a:pPr marL="171450" indent="-171450">
-                <a:lnSpc>
-                  <a:spcPct val="150000"/>
-                </a:lnSpc>
-                <a:buFontTx/>
-                <a:buChar char="-"/>
-              </a:pPr>
-              <a:r>
-                <a:rPr lang="en-US" altLang="zh-TW" sz="1200" dirty="0" smtClean="0">
-                  <a:latin typeface="+mj-lt"/>
-                  <a:cs typeface="Arial" panose="020B0604020202020204" pitchFamily="34" charset="0"/>
-                </a:rPr>
-                <a:t>Develop TCG Security features</a:t>
-              </a:r>
-            </a:p>
-            <a:p>
-              <a:pPr marL="171450" indent="-171450">
-                <a:lnSpc>
-                  <a:spcPct val="150000"/>
-                </a:lnSpc>
-                <a:buFontTx/>
-                <a:buChar char="-"/>
-              </a:pPr>
-              <a:r>
-                <a:rPr lang="en-US" altLang="zh-TW" sz="1200" dirty="0" smtClean="0">
-                  <a:latin typeface="+mj-lt"/>
-                  <a:cs typeface="Arial" panose="020B0604020202020204" pitchFamily="34" charset="0"/>
-                </a:rPr>
-                <a:t>Design verification flow and develop verification scripts</a:t>
-              </a:r>
-            </a:p>
-            <a:p>
-              <a:pPr marL="171450" indent="-171450">
-                <a:lnSpc>
-                  <a:spcPct val="150000"/>
-                </a:lnSpc>
-                <a:buFontTx/>
-                <a:buChar char="-"/>
-              </a:pPr>
-              <a:r>
-                <a:rPr lang="en-US" altLang="zh-TW" sz="1200" dirty="0">
-                  <a:latin typeface="+mj-lt"/>
-                </a:rPr>
-                <a:t>Secure Boot Authentication</a:t>
-              </a:r>
-            </a:p>
-            <a:p>
-              <a:pPr marL="171450" indent="-171450">
-                <a:lnSpc>
-                  <a:spcPct val="150000"/>
-                </a:lnSpc>
-                <a:buFontTx/>
-                <a:buChar char="-"/>
-              </a:pPr>
-              <a:r>
-                <a:rPr lang="en-US" altLang="zh-TW" sz="1200" dirty="0">
-                  <a:latin typeface="+mj-lt"/>
-                </a:rPr>
-                <a:t>Firmware Update Verification</a:t>
-              </a:r>
-            </a:p>
-            <a:p>
-              <a:pPr marL="171450" indent="-171450">
-                <a:lnSpc>
-                  <a:spcPct val="150000"/>
-                </a:lnSpc>
-                <a:buFontTx/>
-                <a:buChar char="-"/>
-              </a:pPr>
-              <a:r>
-                <a:rPr lang="en-US" altLang="zh-TW" sz="1200" dirty="0">
-                  <a:latin typeface="+mj-lt"/>
-                </a:rPr>
-                <a:t>Threat Analysis and Risk </a:t>
-              </a:r>
-              <a:r>
-                <a:rPr lang="en-US" altLang="zh-TW" sz="1200" dirty="0" smtClean="0">
-                  <a:latin typeface="+mj-lt"/>
-                </a:rPr>
-                <a:t>Assessment</a:t>
-              </a:r>
-              <a:endParaRPr lang="en-US" altLang="zh-TW" sz="1200" dirty="0" smtClean="0">
-                <a:latin typeface="+mj-lt"/>
-                <a:cs typeface="Arial" panose="020B0604020202020204" pitchFamily="34" charset="0"/>
-              </a:endParaRPr>
-            </a:p>
-            <a:p>
-              <a:pPr marL="171450" indent="-171450">
-                <a:lnSpc>
-                  <a:spcPct val="150000"/>
-                </a:lnSpc>
-                <a:buFontTx/>
-                <a:buChar char="-"/>
-              </a:pPr>
-              <a:r>
-                <a:rPr lang="en-US" altLang="zh-TW" sz="1200" dirty="0" smtClean="0">
-                  <a:latin typeface="+mj-lt"/>
-                  <a:cs typeface="Arial" panose="020B0604020202020204" pitchFamily="34" charset="0"/>
-                </a:rPr>
-                <a:t>Modularize </a:t>
-              </a:r>
-              <a:r>
-                <a:rPr lang="en-US" altLang="zh-TW" sz="1200" dirty="0">
-                  <a:latin typeface="+mj-lt"/>
-                  <a:cs typeface="Arial" panose="020B0604020202020204" pitchFamily="34" charset="0"/>
-                </a:rPr>
-                <a:t>features into </a:t>
-              </a:r>
-              <a:r>
-                <a:rPr lang="en-US" altLang="zh-TW" sz="1200" dirty="0" smtClean="0">
-                  <a:latin typeface="+mj-lt"/>
-                  <a:cs typeface="Arial" panose="020B0604020202020204" pitchFamily="34" charset="0"/>
-                </a:rPr>
-                <a:t>Libraries</a:t>
-              </a:r>
-            </a:p>
-            <a:p>
-              <a:pPr marL="171450" indent="-171450">
-                <a:lnSpc>
-                  <a:spcPct val="150000"/>
-                </a:lnSpc>
-                <a:buFontTx/>
-                <a:buChar char="-"/>
-              </a:pPr>
-              <a:r>
-                <a:rPr lang="en-US" altLang="zh-TW" sz="1200" dirty="0" smtClean="0">
-                  <a:latin typeface="+mj-lt"/>
-                  <a:cs typeface="Arial" panose="020B0604020202020204" pitchFamily="34" charset="0"/>
-                </a:rPr>
-                <a:t>Develop </a:t>
-              </a:r>
-              <a:r>
-                <a:rPr lang="en-US" altLang="zh-TW" sz="1200" dirty="0">
-                  <a:latin typeface="+mj-lt"/>
-                  <a:cs typeface="Arial" panose="020B0604020202020204" pitchFamily="34" charset="0"/>
-                </a:rPr>
-                <a:t>automation scripts to improve </a:t>
-              </a:r>
-              <a:r>
-                <a:rPr lang="en-US" altLang="zh-TW" sz="1200" dirty="0" smtClean="0">
-                  <a:latin typeface="+mj-lt"/>
-                  <a:cs typeface="Arial" panose="020B0604020202020204" pitchFamily="34" charset="0"/>
-                </a:rPr>
-                <a:t>efficiency</a:t>
-              </a:r>
-              <a:endParaRPr lang="en-US" altLang="zh-TW" sz="1200" dirty="0">
-                <a:latin typeface="+mj-lt"/>
-                <a:cs typeface="Arial" panose="020B0604020202020204" pitchFamily="34" charset="0"/>
-              </a:endParaRPr>
-            </a:p>
-          </p:txBody>
-        </p:sp>
-      </p:grpSp>
-      <p:grpSp>
-        <p:nvGrpSpPr>
-          <p:cNvPr id="30" name="群組 29"/>
-          <p:cNvGrpSpPr/>
-          <p:nvPr/>
-        </p:nvGrpSpPr>
-        <p:grpSpPr>
-          <a:xfrm>
-            <a:off x="2950492" y="7209713"/>
-            <a:ext cx="3542048" cy="2565887"/>
-            <a:chOff x="338138" y="2514600"/>
-            <a:chExt cx="3370262" cy="2565887"/>
-          </a:xfrm>
-        </p:grpSpPr>
-        <p:sp>
-          <p:nvSpPr>
-            <p:cNvPr id="31" name="文字方塊 30"/>
-            <p:cNvSpPr txBox="1"/>
-            <p:nvPr/>
-          </p:nvSpPr>
-          <p:spPr>
-            <a:xfrm>
-              <a:off x="338138" y="2514600"/>
-              <a:ext cx="1821530" cy="338554"/>
-            </a:xfrm>
-            <a:prstGeom prst="rect">
-              <a:avLst/>
-            </a:prstGeom>
-            <a:noFill/>
-          </p:spPr>
-          <p:txBody>
-            <a:bodyPr wrap="square" rtlCol="0">
-              <a:spAutoFit/>
-            </a:bodyPr>
-            <a:lstStyle/>
-            <a:p>
-              <a:pPr algn="dist"/>
-              <a:r>
-                <a:rPr lang="en-US" altLang="zh-TW" sz="1600" b="1" dirty="0" smtClean="0">
-                  <a:latin typeface="Arial" panose="020B0604020202020204" pitchFamily="34" charset="0"/>
-                  <a:cs typeface="Arial" panose="020B0604020202020204" pitchFamily="34" charset="0"/>
-                </a:rPr>
-                <a:t>EDUCATION</a:t>
-              </a:r>
-              <a:endParaRPr lang="zh-TW" altLang="en-US" sz="1600" b="1" dirty="0">
-                <a:latin typeface="Arial" panose="020B0604020202020204" pitchFamily="34" charset="0"/>
-                <a:cs typeface="Arial" panose="020B0604020202020204" pitchFamily="34" charset="0"/>
-              </a:endParaRPr>
-            </a:p>
-          </p:txBody>
-        </p:sp>
-        <p:cxnSp>
-          <p:nvCxnSpPr>
-            <p:cNvPr id="32" name="直線接點 31"/>
-            <p:cNvCxnSpPr/>
-            <p:nvPr/>
-          </p:nvCxnSpPr>
-          <p:spPr>
-            <a:xfrm>
-              <a:off x="338138" y="2984500"/>
-              <a:ext cx="3243262" cy="0"/>
-            </a:xfrm>
-            <a:prstGeom prst="line">
-              <a:avLst/>
-            </a:prstGeom>
-            <a:ln w="25400">
-              <a:solidFill>
-                <a:schemeClr val="tx1"/>
-              </a:solidFill>
-            </a:ln>
-          </p:spPr>
-          <p:style>
-            <a:lnRef idx="1">
-              <a:schemeClr val="accent1"/>
-            </a:lnRef>
-            <a:fillRef idx="0">
-              <a:schemeClr val="accent1"/>
-            </a:fillRef>
-            <a:effectRef idx="0">
-              <a:schemeClr val="accent1"/>
-            </a:effectRef>
-            <a:fontRef idx="minor">
-              <a:schemeClr val="tx1"/>
-            </a:fontRef>
-          </p:style>
-        </p:cxnSp>
-        <p:sp>
-          <p:nvSpPr>
-            <p:cNvPr id="33" name="文字方塊 32"/>
-            <p:cNvSpPr txBox="1"/>
-            <p:nvPr/>
-          </p:nvSpPr>
-          <p:spPr>
-            <a:xfrm>
-              <a:off x="338138" y="3085069"/>
-              <a:ext cx="3370262" cy="1995418"/>
-            </a:xfrm>
-            <a:prstGeom prst="rect">
-              <a:avLst/>
-            </a:prstGeom>
-            <a:noFill/>
-          </p:spPr>
-          <p:txBody>
-            <a:bodyPr wrap="square" rtlCol="0">
-              <a:spAutoFit/>
-            </a:bodyPr>
-            <a:lstStyle/>
-            <a:p>
-              <a:pPr>
-                <a:spcBef>
-                  <a:spcPts val="130"/>
-                </a:spcBef>
-              </a:pPr>
-              <a:r>
-                <a:rPr lang="en-US" altLang="zh-TW" sz="1200" b="1" dirty="0" smtClean="0">
-                  <a:latin typeface="+mj-lt"/>
-                  <a:cs typeface="Arial" panose="020B0604020202020204" pitchFamily="34" charset="0"/>
-                </a:rPr>
-                <a:t>Master, </a:t>
-              </a:r>
-              <a:r>
-                <a:rPr lang="en-US" altLang="zh-TW" sz="1200" b="1" dirty="0">
-                  <a:latin typeface="+mj-lt"/>
-                </a:rPr>
-                <a:t>Computer </a:t>
-              </a:r>
-              <a:r>
-                <a:rPr lang="en-US" altLang="zh-TW" sz="1200" b="1" dirty="0" smtClean="0">
-                  <a:latin typeface="+mj-lt"/>
-                </a:rPr>
-                <a:t>Science</a:t>
-              </a:r>
-              <a:endParaRPr lang="en-US" altLang="zh-TW" sz="1200" b="1" dirty="0">
-                <a:latin typeface="+mj-lt"/>
-              </a:endParaRPr>
-            </a:p>
-            <a:p>
-              <a:pPr>
-                <a:spcBef>
-                  <a:spcPts val="130"/>
-                </a:spcBef>
-              </a:pPr>
-              <a:r>
-                <a:rPr lang="en-US" altLang="zh-TW" sz="1200" b="1" dirty="0" smtClean="0">
-                  <a:latin typeface="+mj-lt"/>
-                  <a:cs typeface="Arial" panose="020B0604020202020204" pitchFamily="34" charset="0"/>
-                </a:rPr>
-                <a:t>National </a:t>
-              </a:r>
-              <a:r>
-                <a:rPr lang="en-US" altLang="zh-TW" sz="1200" b="1" dirty="0" err="1" smtClean="0">
-                  <a:latin typeface="+mj-lt"/>
-                  <a:cs typeface="Arial" panose="020B0604020202020204" pitchFamily="34" charset="0"/>
-                </a:rPr>
-                <a:t>Chiao</a:t>
-              </a:r>
-              <a:r>
-                <a:rPr lang="en-US" altLang="zh-TW" sz="1200" b="1" dirty="0" smtClean="0">
-                  <a:latin typeface="+mj-lt"/>
-                  <a:cs typeface="Arial" panose="020B0604020202020204" pitchFamily="34" charset="0"/>
-                </a:rPr>
-                <a:t> Tung University</a:t>
-              </a:r>
-              <a:r>
-                <a:rPr lang="zh-TW" altLang="en-US" sz="1200" dirty="0" smtClean="0">
-                  <a:latin typeface="+mj-lt"/>
-                  <a:cs typeface="Arial" panose="020B0604020202020204" pitchFamily="34" charset="0"/>
-                </a:rPr>
-                <a:t> </a:t>
-              </a:r>
-              <a:r>
-                <a:rPr lang="en-US" altLang="zh-TW" sz="1200" dirty="0" smtClean="0">
-                  <a:latin typeface="+mj-lt"/>
-                  <a:cs typeface="Arial" panose="020B0604020202020204" pitchFamily="34" charset="0"/>
-                </a:rPr>
-                <a:t>(Sep 2018 – Aug 2020)</a:t>
-              </a:r>
-              <a:endParaRPr lang="en-US" altLang="zh-TW" sz="1200" dirty="0">
-                <a:latin typeface="+mj-lt"/>
-                <a:cs typeface="Arial" panose="020B0604020202020204" pitchFamily="34" charset="0"/>
-              </a:endParaRPr>
-            </a:p>
-            <a:p>
-              <a:pPr marL="171450" indent="-171450">
-                <a:spcBef>
-                  <a:spcPts val="130"/>
-                </a:spcBef>
-                <a:buFontTx/>
-                <a:buChar char="-"/>
-              </a:pPr>
-              <a:r>
-                <a:rPr lang="en-US" altLang="zh-TW" sz="1200" dirty="0" smtClean="0">
-                  <a:latin typeface="+mj-lt"/>
-                </a:rPr>
-                <a:t>Machine Learning</a:t>
-              </a:r>
-            </a:p>
-            <a:p>
-              <a:pPr marL="171450" indent="-171450">
-                <a:spcBef>
-                  <a:spcPts val="130"/>
-                </a:spcBef>
-                <a:buFontTx/>
-                <a:buChar char="-"/>
-              </a:pPr>
-              <a:r>
-                <a:rPr lang="en-US" altLang="zh-TW" sz="1200" dirty="0" smtClean="0">
-                  <a:latin typeface="+mj-lt"/>
-                </a:rPr>
-                <a:t>Deep Learning</a:t>
-              </a:r>
-            </a:p>
-            <a:p>
-              <a:pPr marL="171450" indent="-171450">
-                <a:spcBef>
-                  <a:spcPts val="130"/>
-                </a:spcBef>
-                <a:buFontTx/>
-                <a:buChar char="-"/>
-              </a:pPr>
-              <a:r>
-                <a:rPr lang="en-US" altLang="zh-TW" sz="1200" dirty="0" smtClean="0">
-                  <a:latin typeface="+mj-lt"/>
-                </a:rPr>
-                <a:t>Computer Vision</a:t>
-              </a:r>
-            </a:p>
-            <a:p>
-              <a:pPr marL="171450" indent="-171450">
-                <a:spcBef>
-                  <a:spcPts val="130"/>
-                </a:spcBef>
-                <a:buFontTx/>
-                <a:buChar char="-"/>
-              </a:pPr>
-              <a:r>
-                <a:rPr lang="en-US" altLang="zh-TW" sz="1200" dirty="0" smtClean="0">
-                  <a:latin typeface="+mj-lt"/>
-                </a:rPr>
-                <a:t>VR </a:t>
-              </a:r>
-              <a:r>
-                <a:rPr lang="en-US" altLang="zh-TW" sz="1200" dirty="0">
-                  <a:latin typeface="+mj-lt"/>
-                </a:rPr>
-                <a:t>and </a:t>
-              </a:r>
-              <a:r>
-                <a:rPr lang="en-US" altLang="zh-TW" sz="1200" dirty="0" smtClean="0">
-                  <a:latin typeface="+mj-lt"/>
-                </a:rPr>
-                <a:t>AR</a:t>
-              </a:r>
-            </a:p>
-            <a:p>
-              <a:pPr marL="171450" indent="-171450">
-                <a:spcBef>
-                  <a:spcPts val="130"/>
-                </a:spcBef>
-                <a:buFontTx/>
-                <a:buChar char="-"/>
-              </a:pPr>
-              <a:r>
-                <a:rPr lang="en-US" altLang="zh-TW" sz="1200" dirty="0">
-                  <a:latin typeface="+mj-lt"/>
-                </a:rPr>
-                <a:t>User Center Interaction Design</a:t>
-              </a:r>
-            </a:p>
-            <a:p>
-              <a:pPr>
-                <a:lnSpc>
-                  <a:spcPct val="150000"/>
-                </a:lnSpc>
-              </a:pPr>
-              <a:endParaRPr lang="en-US" altLang="zh-TW" sz="600" dirty="0" smtClean="0">
-                <a:latin typeface="+mj-lt"/>
-              </a:endParaRPr>
-            </a:p>
-            <a:p>
-              <a:pPr>
-                <a:spcBef>
-                  <a:spcPts val="130"/>
-                </a:spcBef>
-              </a:pPr>
-              <a:r>
-                <a:rPr lang="en-US" altLang="zh-TW" sz="1200" b="1" dirty="0" smtClean="0">
-                  <a:latin typeface="+mj-lt"/>
-                  <a:cs typeface="Arial" panose="020B0604020202020204" pitchFamily="34" charset="0"/>
-                </a:rPr>
-                <a:t>Bachelor, Communication Engineering</a:t>
-              </a:r>
-            </a:p>
-            <a:p>
-              <a:pPr>
-                <a:spcBef>
-                  <a:spcPts val="130"/>
-                </a:spcBef>
-              </a:pPr>
-              <a:r>
-                <a:rPr lang="en-US" altLang="zh-TW" sz="1200" b="1" dirty="0" smtClean="0">
-                  <a:latin typeface="+mj-lt"/>
-                  <a:cs typeface="Arial" panose="020B0604020202020204" pitchFamily="34" charset="0"/>
-                </a:rPr>
-                <a:t>National Central University </a:t>
-              </a:r>
-              <a:r>
-                <a:rPr lang="en-US" altLang="zh-TW" sz="1200" dirty="0" smtClean="0">
-                  <a:latin typeface="+mj-lt"/>
-                  <a:cs typeface="Arial" panose="020B0604020202020204" pitchFamily="34" charset="0"/>
-                </a:rPr>
-                <a:t>(Sep 2013 – Jun 2017)</a:t>
-              </a:r>
-              <a:endParaRPr lang="en-US" altLang="zh-TW" sz="1200" dirty="0">
-                <a:latin typeface="+mj-lt"/>
-                <a:cs typeface="Arial" panose="020B0604020202020204" pitchFamily="34" charset="0"/>
-              </a:endParaRPr>
-            </a:p>
-          </p:txBody>
-        </p:sp>
-      </p:grpSp>
-      <p:grpSp>
-        <p:nvGrpSpPr>
-          <p:cNvPr id="47" name="群組 46"/>
-          <p:cNvGrpSpPr/>
-          <p:nvPr/>
-        </p:nvGrpSpPr>
-        <p:grpSpPr>
-          <a:xfrm>
-            <a:off x="2705741" y="1530016"/>
-            <a:ext cx="1062618" cy="276999"/>
-            <a:chOff x="2750525" y="1390134"/>
-            <a:chExt cx="1062618" cy="276999"/>
-          </a:xfrm>
-        </p:grpSpPr>
-        <p:sp>
-          <p:nvSpPr>
-            <p:cNvPr id="34" name="四角星形 33"/>
-            <p:cNvSpPr/>
-            <p:nvPr/>
-          </p:nvSpPr>
-          <p:spPr>
-            <a:xfrm>
-              <a:off x="2750525" y="1463331"/>
-              <a:ext cx="133168" cy="130607"/>
-            </a:xfrm>
-            <a:prstGeom prst="star4">
-              <a:avLst/>
-            </a:prstGeom>
-            <a:solidFill>
-              <a:schemeClr val="bg1"/>
-            </a:solidFill>
-            <a:ln>
-              <a:solidFill>
-                <a:schemeClr val="tx1"/>
-              </a:solidFill>
+              <a:noFill/>
             </a:ln>
           </p:spPr>
           <p:style>
@@ -4489,115 +4538,50 @@
             <a:bodyPr rtlCol="0" anchor="ctr"/>
             <a:lstStyle/>
             <a:p>
-              <a:pPr algn="ctr"/>
-              <a:endParaRPr lang="zh-TW" altLang="en-US"/>
-            </a:p>
-          </p:txBody>
-        </p:sp>
-        <p:sp>
-          <p:nvSpPr>
-            <p:cNvPr id="35" name="文字方塊 34"/>
-            <p:cNvSpPr txBox="1"/>
-            <p:nvPr/>
-          </p:nvSpPr>
-          <p:spPr>
-            <a:xfrm>
-              <a:off x="2858384" y="1390134"/>
-              <a:ext cx="954759" cy="276999"/>
-            </a:xfrm>
-            <a:prstGeom prst="rect">
-              <a:avLst/>
-            </a:prstGeom>
-            <a:noFill/>
-          </p:spPr>
-          <p:txBody>
-            <a:bodyPr wrap="square" rtlCol="0">
-              <a:spAutoFit/>
-            </a:bodyPr>
-            <a:lstStyle/>
-            <a:p>
+              <a:pPr algn="dist"/>
               <a:r>
-                <a:rPr lang="en-US" altLang="zh-TW" sz="1200" dirty="0" smtClean="0">
-                  <a:latin typeface="+mj-lt"/>
+                <a:rPr lang="en-US" altLang="zh-TW" sz="3200" b="1" dirty="0" smtClean="0">
+                  <a:solidFill>
+                    <a:schemeClr val="tx1">
+                      <a:lumMod val="85000"/>
+                      <a:lumOff val="15000"/>
+                    </a:schemeClr>
+                  </a:solidFill>
+                  <a:latin typeface="Arial Black" panose="020B0A04020102020204" pitchFamily="34" charset="0"/>
+                  <a:ea typeface="微軟正黑體" panose="020B0604030504040204" pitchFamily="34" charset="-120"/>
                 </a:rPr>
-                <a:t>Fast Learner</a:t>
+                <a:t>POKAI</a:t>
               </a:r>
-              <a:endParaRPr lang="zh-TW" altLang="en-US" sz="1200" dirty="0">
-                <a:latin typeface="+mj-lt"/>
-              </a:endParaRPr>
-            </a:p>
-          </p:txBody>
-        </p:sp>
-      </p:grpSp>
-      <p:grpSp>
-        <p:nvGrpSpPr>
-          <p:cNvPr id="46" name="群組 45"/>
-          <p:cNvGrpSpPr/>
-          <p:nvPr/>
-        </p:nvGrpSpPr>
-        <p:grpSpPr>
-          <a:xfrm>
-            <a:off x="3986944" y="1530016"/>
-            <a:ext cx="1211038" cy="276999"/>
-            <a:chOff x="3956188" y="1400797"/>
-            <a:chExt cx="1211038" cy="276999"/>
-          </a:xfrm>
-        </p:grpSpPr>
-        <p:sp>
-          <p:nvSpPr>
-            <p:cNvPr id="41" name="文字方塊 40"/>
-            <p:cNvSpPr txBox="1"/>
-            <p:nvPr/>
-          </p:nvSpPr>
-          <p:spPr>
-            <a:xfrm>
-              <a:off x="4053739" y="1400797"/>
-              <a:ext cx="1113487" cy="276999"/>
-            </a:xfrm>
-            <a:prstGeom prst="rect">
-              <a:avLst/>
-            </a:prstGeom>
-            <a:noFill/>
-          </p:spPr>
-          <p:txBody>
-            <a:bodyPr wrap="square" rtlCol="0">
-              <a:spAutoFit/>
-            </a:bodyPr>
-            <a:lstStyle/>
-            <a:p>
-              <a:r>
-                <a:rPr lang="en-US" altLang="zh-TW" sz="1200" dirty="0" smtClean="0">
-                  <a:latin typeface="+mj-lt"/>
-                </a:rPr>
-                <a:t>Communicate</a:t>
-              </a:r>
-              <a:endParaRPr lang="zh-TW" altLang="en-US" sz="1200" dirty="0">
-                <a:latin typeface="+mj-lt"/>
+              <a:endParaRPr lang="en-US" altLang="zh-TW" sz="3200" b="1" dirty="0" smtClean="0">
+                <a:solidFill>
+                  <a:schemeClr val="tx1">
+                    <a:lumMod val="85000"/>
+                    <a:lumOff val="15000"/>
+                  </a:schemeClr>
+                </a:solidFill>
+                <a:latin typeface="Arial Black" panose="020B0A04020102020204" pitchFamily="34" charset="0"/>
+                <a:ea typeface="微軟正黑體" panose="020B0604030504040204" pitchFamily="34" charset="-120"/>
               </a:endParaRPr>
             </a:p>
           </p:txBody>
         </p:sp>
         <p:sp>
           <p:nvSpPr>
-            <p:cNvPr id="43" name="四角星形 42"/>
+            <p:cNvPr id="42" name="矩形 41"/>
             <p:cNvSpPr/>
             <p:nvPr/>
           </p:nvSpPr>
           <p:spPr>
             <a:xfrm>
-              <a:off x="3956188" y="1470118"/>
-              <a:ext cx="133168" cy="130607"/>
+              <a:off x="562195" y="714039"/>
+              <a:ext cx="2012562" cy="450884"/>
             </a:xfrm>
-            <a:prstGeom prst="star4">
+            <a:prstGeom prst="rect">
               <a:avLst/>
             </a:prstGeom>
-            <a:solidFill>
-              <a:schemeClr val="bg1"/>
-            </a:solidFill>
-            <a:ln>
-              <a:solidFill>
-                <a:schemeClr val="tx1"/>
-              </a:solidFill>
+            <a:noFill/>
+            <a:ln w="25400">
+              <a:noFill/>
             </a:ln>
           </p:spPr>
           <p:style>
@@ -4620,36 +4604,58 @@
             <a:bodyPr rtlCol="0" anchor="ctr"/>
             <a:lstStyle/>
             <a:p>
-              <a:pPr algn="ctr"/>
-              <a:endParaRPr lang="zh-TW" altLang="en-US"/>
+              <a:pPr algn="dist"/>
+              <a:r>
+                <a:rPr lang="en-US" altLang="zh-TW" sz="3200" b="1" dirty="0" smtClean="0">
+                  <a:solidFill>
+                    <a:schemeClr val="tx1">
+                      <a:lumMod val="85000"/>
+                      <a:lumOff val="15000"/>
+                    </a:schemeClr>
+                  </a:solidFill>
+                  <a:latin typeface="Arial Black" panose="020B0A04020102020204" pitchFamily="34" charset="0"/>
+                  <a:ea typeface="微軟正黑體" panose="020B0604030504040204" pitchFamily="34" charset="-120"/>
+                </a:rPr>
+                <a:t>HUANG</a:t>
+              </a:r>
+              <a:endParaRPr lang="en-US" altLang="zh-TW" sz="3200" b="1" dirty="0" smtClean="0">
+                <a:solidFill>
+                  <a:schemeClr val="tx1">
+                    <a:lumMod val="85000"/>
+                    <a:lumOff val="15000"/>
+                  </a:schemeClr>
+                </a:solidFill>
+                <a:latin typeface="Arial Black" panose="020B0A04020102020204" pitchFamily="34" charset="0"/>
+                <a:ea typeface="微軟正黑體" panose="020B0604030504040204" pitchFamily="34" charset="-120"/>
+              </a:endParaRPr>
             </a:p>
           </p:txBody>
         </p:sp>
       </p:grpSp>
       <p:grpSp>
         <p:nvGrpSpPr>
-          <p:cNvPr id="45" name="群組 44"/>
+          <p:cNvPr id="27" name="群組 26"/>
           <p:cNvGrpSpPr/>
           <p:nvPr/>
         </p:nvGrpSpPr>
         <p:grpSpPr>
           <a:xfrm>
-            <a:off x="5295332" y="1530016"/>
-            <a:ext cx="1090622" cy="276999"/>
-            <a:chOff x="5384938" y="1850163"/>
-            <a:chExt cx="1090622" cy="276999"/>
+            <a:off x="4143054" y="914016"/>
+            <a:ext cx="2139925" cy="253916"/>
+            <a:chOff x="4260677" y="1654234"/>
+            <a:chExt cx="2139925" cy="253916"/>
           </a:xfrm>
         </p:grpSpPr>
         <p:sp>
           <p:nvSpPr>
-            <p:cNvPr id="42" name="文字方塊 41"/>
+            <p:cNvPr id="43" name="文字方塊 42"/>
             <p:cNvSpPr txBox="1"/>
             <p:nvPr/>
           </p:nvSpPr>
           <p:spPr>
             <a:xfrm>
-              <a:off x="5506173" y="1850163"/>
-              <a:ext cx="969387" cy="276999"/>
+              <a:off x="4476677" y="1654234"/>
+              <a:ext cx="1923925" cy="253916"/>
             </a:xfrm>
             <a:prstGeom prst="rect">
               <a:avLst/>
@@ -4657,68 +4663,158 @@
             <a:noFill/>
           </p:spPr>
           <p:txBody>
-            <a:bodyPr wrap="square" rtlCol="0">
+            <a:bodyPr wrap="none" rtlCol="0">
               <a:spAutoFit/>
             </a:bodyPr>
             <a:lstStyle/>
             <a:p>
               <a:r>
-                <a:rPr lang="en-US" altLang="zh-TW" sz="1200" dirty="0" smtClean="0">
-                  <a:latin typeface="+mj-lt"/>
+                <a:rPr lang="en-US" altLang="zh-TW" sz="1050" dirty="0" smtClean="0">
+                  <a:solidFill>
+                    <a:schemeClr val="tx1">
+                      <a:lumMod val="85000"/>
+                      <a:lumOff val="15000"/>
+                    </a:schemeClr>
+                  </a:solidFill>
+                  <a:latin typeface="微軟正黑體" panose="020B0604030504040204" pitchFamily="34" charset="-120"/>
+                  <a:ea typeface="微軟正黑體" panose="020B0604030504040204" pitchFamily="34" charset="-120"/>
+                  <a:hlinkClick r:id="rId7"/>
                 </a:rPr>
-                <a:t>Enthusiastic</a:t>
+                <a:t>pokaihuang.tw@gmail.com</a:t>
               </a:r>
-              <a:endParaRPr lang="zh-TW" altLang="en-US" sz="1200" dirty="0">
-                <a:latin typeface="+mj-lt"/>
+              <a:endParaRPr lang="en-US" altLang="zh-TW" sz="1050" dirty="0" smtClean="0">
+                <a:solidFill>
+                  <a:schemeClr val="tx1">
+                    <a:lumMod val="85000"/>
+                    <a:lumOff val="15000"/>
+                  </a:schemeClr>
+                </a:solidFill>
+                <a:latin typeface="微軟正黑體" panose="020B0604030504040204" pitchFamily="34" charset="-120"/>
+                <a:ea typeface="微軟正黑體" panose="020B0604030504040204" pitchFamily="34" charset="-120"/>
               </a:endParaRPr>
             </a:p>
           </p:txBody>
         </p:sp>
+        <p:pic>
+          <p:nvPicPr>
+            <p:cNvPr id="14" name="圖片 13"/>
+            <p:cNvPicPr>
+              <a:picLocks noChangeAspect="1"/>
+            </p:cNvPicPr>
+            <p:nvPr/>
+          </p:nvPicPr>
+          <p:blipFill>
+            <a:blip r:embed="rId8" cstate="print">
+              <a:extLst>
+                <a:ext uri="{28A0092B-C50C-407E-A947-70E740481C1C}">
+                  <a14:useLocalDpi xmlns:a14="http://schemas.microsoft.com/office/drawing/2010/main" val="0"/>
+                </a:ext>
+              </a:extLst>
+            </a:blip>
+            <a:stretch>
+              <a:fillRect/>
+            </a:stretch>
+          </p:blipFill>
+          <p:spPr>
+            <a:xfrm>
+              <a:off x="4260677" y="1673192"/>
+              <a:ext cx="216000" cy="216000"/>
+            </a:xfrm>
+            <a:prstGeom prst="rect">
+              <a:avLst/>
+            </a:prstGeom>
+          </p:spPr>
+        </p:pic>
+      </p:grpSp>
+      <p:grpSp>
+        <p:nvGrpSpPr>
+          <p:cNvPr id="16" name="群組 15"/>
+          <p:cNvGrpSpPr/>
+          <p:nvPr/>
+        </p:nvGrpSpPr>
+        <p:grpSpPr>
+          <a:xfrm>
+            <a:off x="4143054" y="549868"/>
+            <a:ext cx="1186137" cy="253916"/>
+            <a:chOff x="4260677" y="1351241"/>
+            <a:chExt cx="1186137" cy="253916"/>
+          </a:xfrm>
+        </p:grpSpPr>
+        <p:pic>
+          <p:nvPicPr>
+            <p:cNvPr id="15" name="圖片 14"/>
+            <p:cNvPicPr>
+              <a:picLocks noChangeAspect="1"/>
+            </p:cNvPicPr>
+            <p:nvPr/>
+          </p:nvPicPr>
+          <p:blipFill>
+            <a:blip r:embed="rId9" cstate="print">
+              <a:extLst>
+                <a:ext uri="{28A0092B-C50C-407E-A947-70E740481C1C}">
+                  <a14:useLocalDpi xmlns:a14="http://schemas.microsoft.com/office/drawing/2010/main" val="0"/>
+                </a:ext>
+              </a:extLst>
+            </a:blip>
+            <a:stretch>
+              <a:fillRect/>
+            </a:stretch>
+          </p:blipFill>
+          <p:spPr>
+            <a:xfrm>
+              <a:off x="4260677" y="1370199"/>
+              <a:ext cx="216000" cy="216000"/>
+            </a:xfrm>
+            <a:prstGeom prst="rect">
+              <a:avLst/>
+            </a:prstGeom>
+          </p:spPr>
+        </p:pic>
         <p:sp>
           <p:nvSpPr>
-            <p:cNvPr id="44" name="四角星形 43"/>
-            <p:cNvSpPr/>
+            <p:cNvPr id="44" name="文字方塊 43"/>
+            <p:cNvSpPr txBox="1"/>
             <p:nvPr/>
           </p:nvSpPr>
           <p:spPr>
             <a:xfrm>
-              <a:off x="5384938" y="1923360"/>
-              <a:ext cx="133168" cy="130607"/>
+              <a:off x="4476677" y="1351241"/>
+              <a:ext cx="970137" cy="253916"/>
             </a:xfrm>
-            <a:prstGeom prst="star4">
+            <a:prstGeom prst="rect">
               <a:avLst/>
             </a:prstGeom>
-            <a:solidFill>
-              <a:schemeClr val="bg1"/>
-            </a:solidFill>
-            <a:ln>
-              <a:solidFill>
-                <a:schemeClr val="tx1"/>
-              </a:solidFill>
-            </a:ln>
+            <a:noFill/>
           </p:spPr>
-          <p:style>
-            <a:lnRef idx="2">
-              <a:schemeClr val="accent1">
-                <a:shade val="50000"/>
-              </a:schemeClr>
-            </a:lnRef>
-            <a:fillRef idx="1">
-              <a:schemeClr val="accent1"/>
-            </a:fillRef>
-            <a:effectRef idx="0">
-              <a:schemeClr val="accent1"/>
-            </a:effectRef>
-            <a:fontRef idx="minor">
-              <a:schemeClr val="lt1"/>
-            </a:fontRef>
-          </p:style>
           <p:txBody>
-            <a:bodyPr rtlCol="0" anchor="ctr"/>
+            <a:bodyPr wrap="none" rtlCol="0">
+              <a:spAutoFit/>
+            </a:bodyPr>
             <a:lstStyle/>
             <a:p>
-              <a:pPr algn="ctr"/>
-              <a:endParaRPr lang="zh-TW" altLang="en-US"/>
+              <a:r>
+                <a:rPr lang="en-US" altLang="zh-TW" sz="1050" dirty="0">
+                  <a:solidFill>
+                    <a:schemeClr val="tx1">
+                      <a:lumMod val="85000"/>
+                      <a:lumOff val="15000"/>
+                    </a:schemeClr>
+                  </a:solidFill>
+                  <a:latin typeface="微軟正黑體" panose="020B0604030504040204" pitchFamily="34" charset="-120"/>
+                  <a:ea typeface="微軟正黑體" panose="020B0604030504040204" pitchFamily="34" charset="-120"/>
+                </a:rPr>
+                <a:t>0932732142</a:t>
+              </a:r>
+              <a:endParaRPr lang="en-US" altLang="zh-TW" sz="1050" dirty="0" smtClean="0">
+                <a:solidFill>
+                  <a:schemeClr val="tx1">
+                    <a:lumMod val="85000"/>
+                    <a:lumOff val="15000"/>
+                  </a:schemeClr>
+                </a:solidFill>
+                <a:latin typeface="微軟正黑體" panose="020B0604030504040204" pitchFamily="34" charset="-120"/>
+                <a:ea typeface="微軟正黑體" panose="020B0604030504040204" pitchFamily="34" charset="-120"/>
+              </a:endParaRPr>
             </a:p>
           </p:txBody>
         </p:sp>
@@ -4726,7 +4822,7 @@
     </p:spTree>
     <p:extLst>
       <p:ext uri="{BB962C8B-B14F-4D97-AF65-F5344CB8AC3E}">
-        <p14:creationId xmlns:p14="http://schemas.microsoft.com/office/powerpoint/2010/main" val="1557103100"/>
+        <p14:creationId xmlns:p14="http://schemas.microsoft.com/office/powerpoint/2010/main" val="1918949798"/>
       </p:ext>
     </p:extLst>
   </p:cSld>

</xml_diff>

<commit_message>
Site updated: 2025-06-15 23:53:50
</commit_message>
<xml_diff>
--- a/attaches/PKHuang_Resume.pptx
+++ b/attaches/PKHuang_Resume.pptx
@@ -3088,18 +3088,7 @@
                   </a:schemeClr>
                 </a:solidFill>
               </a:rPr>
-              <a:t>Experienced engineer with 1 year in design verification and 3.5 years in firmware development. Skilled in collaborating with clients to define test plans and design test vectors, and experienced in working closely with in-house designers for efficient debugging. Proficient in FPV and using SVA to verify submodule behaviors. Highly self-motivated, dedicating personal time to mastering UVM library internals and building UVM VIPs to strengthen practical and theoretical understanding</a:t>
-            </a:r>
-            <a:r>
-              <a:rPr lang="en-US" altLang="zh-TW" sz="1400" dirty="0" smtClean="0">
-                <a:solidFill>
-                  <a:schemeClr val="tx1">
-                    <a:lumMod val="85000"/>
-                    <a:lumOff val="15000"/>
-                  </a:schemeClr>
-                </a:solidFill>
-              </a:rPr>
-              <a:t>. </a:t>
+              <a:t>Experienced engineer with 1 year in design verification and 3.5 years in firmware development. Skilled in collaborating with clients to define test plans and design test vectors, and experienced in working closely with in-house designers for efficient debugging. Familiar with FPV and using SVA to verify submodule behaviors. Highly self-motivated, dedicating personal time to mastering UVM library internals and building UVM VIPs to strengthen practical and theoretical understanding.</a:t>
             </a:r>
             <a:endParaRPr lang="zh-TW" altLang="en-US" sz="1100" dirty="0">
               <a:solidFill>
@@ -4552,16 +4541,6 @@
                 </a:rPr>
                 <a:t>POKAI</a:t>
               </a:r>
-              <a:endParaRPr lang="en-US" altLang="zh-TW" sz="3200" b="1" dirty="0" smtClean="0">
-                <a:solidFill>
-                  <a:schemeClr val="tx1">
-                    <a:lumMod val="85000"/>
-                    <a:lumOff val="15000"/>
-                  </a:schemeClr>
-                </a:solidFill>
-                <a:latin typeface="Arial Black" panose="020B0A04020102020204" pitchFamily="34" charset="0"/>
-                <a:ea typeface="微軟正黑體" panose="020B0604030504040204" pitchFamily="34" charset="-120"/>
-              </a:endParaRPr>
             </a:p>
           </p:txBody>
         </p:sp>
@@ -4618,16 +4597,6 @@
                 </a:rPr>
                 <a:t>HUANG</a:t>
               </a:r>
-              <a:endParaRPr lang="en-US" altLang="zh-TW" sz="3200" b="1" dirty="0" smtClean="0">
-                <a:solidFill>
-                  <a:schemeClr val="tx1">
-                    <a:lumMod val="85000"/>
-                    <a:lumOff val="15000"/>
-                  </a:schemeClr>
-                </a:solidFill>
-                <a:latin typeface="Arial Black" panose="020B0A04020102020204" pitchFamily="34" charset="0"/>
-                <a:ea typeface="微軟正黑體" panose="020B0604030504040204" pitchFamily="34" charset="-120"/>
-              </a:endParaRPr>
             </a:p>
           </p:txBody>
         </p:sp>

</xml_diff>

<commit_message>
Site updated: 2025-06-23 22:31:26
</commit_message>
<xml_diff>
--- a/attaches/PKHuang_Resume.pptx
+++ b/attaches/PKHuang_Resume.pptx
@@ -243,7 +243,7 @@
           <a:p>
             <a:fld id="{090B76F5-00DB-4EFF-A778-474511B35808}" type="datetimeFigureOut">
               <a:rPr lang="zh-TW" altLang="en-US" smtClean="0"/>
-              <a:t>2025/6/14</a:t>
+              <a:t>2025/6/23</a:t>
             </a:fld>
             <a:endParaRPr lang="zh-TW" altLang="en-US"/>
           </a:p>
@@ -413,7 +413,7 @@
           <a:p>
             <a:fld id="{090B76F5-00DB-4EFF-A778-474511B35808}" type="datetimeFigureOut">
               <a:rPr lang="zh-TW" altLang="en-US" smtClean="0"/>
-              <a:t>2025/6/14</a:t>
+              <a:t>2025/6/23</a:t>
             </a:fld>
             <a:endParaRPr lang="zh-TW" altLang="en-US"/>
           </a:p>
@@ -593,7 +593,7 @@
           <a:p>
             <a:fld id="{090B76F5-00DB-4EFF-A778-474511B35808}" type="datetimeFigureOut">
               <a:rPr lang="zh-TW" altLang="en-US" smtClean="0"/>
-              <a:t>2025/6/14</a:t>
+              <a:t>2025/6/23</a:t>
             </a:fld>
             <a:endParaRPr lang="zh-TW" altLang="en-US"/>
           </a:p>
@@ -763,7 +763,7 @@
           <a:p>
             <a:fld id="{090B76F5-00DB-4EFF-A778-474511B35808}" type="datetimeFigureOut">
               <a:rPr lang="zh-TW" altLang="en-US" smtClean="0"/>
-              <a:t>2025/6/14</a:t>
+              <a:t>2025/6/23</a:t>
             </a:fld>
             <a:endParaRPr lang="zh-TW" altLang="en-US"/>
           </a:p>
@@ -1007,7 +1007,7 @@
           <a:p>
             <a:fld id="{090B76F5-00DB-4EFF-A778-474511B35808}" type="datetimeFigureOut">
               <a:rPr lang="zh-TW" altLang="en-US" smtClean="0"/>
-              <a:t>2025/6/14</a:t>
+              <a:t>2025/6/23</a:t>
             </a:fld>
             <a:endParaRPr lang="zh-TW" altLang="en-US"/>
           </a:p>
@@ -1239,7 +1239,7 @@
           <a:p>
             <a:fld id="{090B76F5-00DB-4EFF-A778-474511B35808}" type="datetimeFigureOut">
               <a:rPr lang="zh-TW" altLang="en-US" smtClean="0"/>
-              <a:t>2025/6/14</a:t>
+              <a:t>2025/6/23</a:t>
             </a:fld>
             <a:endParaRPr lang="zh-TW" altLang="en-US"/>
           </a:p>
@@ -1606,7 +1606,7 @@
           <a:p>
             <a:fld id="{090B76F5-00DB-4EFF-A778-474511B35808}" type="datetimeFigureOut">
               <a:rPr lang="zh-TW" altLang="en-US" smtClean="0"/>
-              <a:t>2025/6/14</a:t>
+              <a:t>2025/6/23</a:t>
             </a:fld>
             <a:endParaRPr lang="zh-TW" altLang="en-US"/>
           </a:p>
@@ -1724,7 +1724,7 @@
           <a:p>
             <a:fld id="{090B76F5-00DB-4EFF-A778-474511B35808}" type="datetimeFigureOut">
               <a:rPr lang="zh-TW" altLang="en-US" smtClean="0"/>
-              <a:t>2025/6/14</a:t>
+              <a:t>2025/6/23</a:t>
             </a:fld>
             <a:endParaRPr lang="zh-TW" altLang="en-US"/>
           </a:p>
@@ -1819,7 +1819,7 @@
           <a:p>
             <a:fld id="{090B76F5-00DB-4EFF-A778-474511B35808}" type="datetimeFigureOut">
               <a:rPr lang="zh-TW" altLang="en-US" smtClean="0"/>
-              <a:t>2025/6/14</a:t>
+              <a:t>2025/6/23</a:t>
             </a:fld>
             <a:endParaRPr lang="zh-TW" altLang="en-US"/>
           </a:p>
@@ -2096,7 +2096,7 @@
           <a:p>
             <a:fld id="{090B76F5-00DB-4EFF-A778-474511B35808}" type="datetimeFigureOut">
               <a:rPr lang="zh-TW" altLang="en-US" smtClean="0"/>
-              <a:t>2025/6/14</a:t>
+              <a:t>2025/6/23</a:t>
             </a:fld>
             <a:endParaRPr lang="zh-TW" altLang="en-US"/>
           </a:p>
@@ -2353,7 +2353,7 @@
           <a:p>
             <a:fld id="{090B76F5-00DB-4EFF-A778-474511B35808}" type="datetimeFigureOut">
               <a:rPr lang="zh-TW" altLang="en-US" smtClean="0"/>
-              <a:t>2025/6/14</a:t>
+              <a:t>2025/6/23</a:t>
             </a:fld>
             <a:endParaRPr lang="zh-TW" altLang="en-US"/>
           </a:p>
@@ -2566,7 +2566,7 @@
           <a:p>
             <a:fld id="{090B76F5-00DB-4EFF-A778-474511B35808}" type="datetimeFigureOut">
               <a:rPr lang="zh-TW" altLang="en-US" smtClean="0"/>
-              <a:t>2025/6/14</a:t>
+              <a:t>2025/6/23</a:t>
             </a:fld>
             <a:endParaRPr lang="zh-TW" altLang="en-US"/>
           </a:p>
@@ -3585,7 +3585,30 @@
                   </a:schemeClr>
                 </a:solidFill>
               </a:rPr>
-              <a:t>Develop Security features according to TCG specification</a:t>
+              <a:t>Develop Security features according to </a:t>
+            </a:r>
+            <a:r>
+              <a:rPr lang="en-US" altLang="zh-TW" sz="1400" dirty="0">
+                <a:solidFill>
+                  <a:schemeClr val="tx1">
+                    <a:lumMod val="85000"/>
+                    <a:lumOff val="15000"/>
+                  </a:schemeClr>
+                </a:solidFill>
+                <a:hlinkClick r:id="rId3"/>
+              </a:rPr>
+              <a:t>TCG</a:t>
+            </a:r>
+            <a:r>
+              <a:rPr lang="en-US" altLang="zh-TW" sz="1400" dirty="0">
+                <a:solidFill>
+                  <a:schemeClr val="tx1">
+                    <a:lumMod val="85000"/>
+                    <a:lumOff val="15000"/>
+                  </a:schemeClr>
+                </a:solidFill>
+              </a:rPr>
+              <a:t> specification</a:t>
             </a:r>
           </a:p>
           <a:p>
@@ -4318,7 +4341,7 @@
                   </a:solidFill>
                   <a:latin typeface="微軟正黑體" panose="020B0604030504040204" pitchFamily="34" charset="-120"/>
                   <a:ea typeface="微軟正黑體" panose="020B0604030504040204" pitchFamily="34" charset="-120"/>
-                  <a:hlinkClick r:id="rId3"/>
+                  <a:hlinkClick r:id="rId4"/>
                 </a:rPr>
                 <a:t>https://pkhuang-tw.github.io</a:t>
               </a:r>
@@ -4332,7 +4355,7 @@
                   </a:solidFill>
                   <a:latin typeface="微軟正黑體" panose="020B0604030504040204" pitchFamily="34" charset="-120"/>
                   <a:ea typeface="微軟正黑體" panose="020B0604030504040204" pitchFamily="34" charset="-120"/>
-                  <a:hlinkClick r:id="rId3"/>
+                  <a:hlinkClick r:id="rId4"/>
                 </a:rPr>
                 <a:t>/</a:t>
               </a:r>
@@ -4358,7 +4381,7 @@
             <p:nvPr/>
           </p:nvPicPr>
           <p:blipFill>
-            <a:blip r:embed="rId4" cstate="print">
+            <a:blip r:embed="rId5" cstate="print">
               <a:extLst>
                 <a:ext uri="{28A0092B-C50C-407E-A947-70E740481C1C}">
                   <a14:useLocalDpi xmlns:a14="http://schemas.microsoft.com/office/drawing/2010/main" val="0"/>
@@ -4426,7 +4449,7 @@
                   </a:solidFill>
                   <a:latin typeface="微軟正黑體" panose="020B0604030504040204" pitchFamily="34" charset="-120"/>
                   <a:ea typeface="微軟正黑體" panose="020B0604030504040204" pitchFamily="34" charset="-120"/>
-                  <a:hlinkClick r:id="rId5"/>
+                  <a:hlinkClick r:id="rId6"/>
                 </a:rPr>
                 <a:t>https://github.com/PKhuang-TW</a:t>
               </a:r>
@@ -4452,7 +4475,7 @@
             <p:nvPr/>
           </p:nvPicPr>
           <p:blipFill>
-            <a:blip r:embed="rId6" cstate="print">
+            <a:blip r:embed="rId7" cstate="print">
               <a:extLst>
                 <a:ext uri="{28A0092B-C50C-407E-A947-70E740481C1C}">
                   <a14:useLocalDpi xmlns:a14="http://schemas.microsoft.com/office/drawing/2010/main" val="0"/>
@@ -4647,7 +4670,7 @@
                   </a:solidFill>
                   <a:latin typeface="微軟正黑體" panose="020B0604030504040204" pitchFamily="34" charset="-120"/>
                   <a:ea typeface="微軟正黑體" panose="020B0604030504040204" pitchFamily="34" charset="-120"/>
-                  <a:hlinkClick r:id="rId7"/>
+                  <a:hlinkClick r:id="rId8"/>
                 </a:rPr>
                 <a:t>pokaihuang.tw@gmail.com</a:t>
               </a:r>
@@ -4673,7 +4696,7 @@
             <p:nvPr/>
           </p:nvPicPr>
           <p:blipFill>
-            <a:blip r:embed="rId8" cstate="print">
+            <a:blip r:embed="rId9" cstate="print">
               <a:extLst>
                 <a:ext uri="{28A0092B-C50C-407E-A947-70E740481C1C}">
                   <a14:useLocalDpi xmlns:a14="http://schemas.microsoft.com/office/drawing/2010/main" val="0"/>
@@ -4718,7 +4741,7 @@
             <p:nvPr/>
           </p:nvPicPr>
           <p:blipFill>
-            <a:blip r:embed="rId9" cstate="print">
+            <a:blip r:embed="rId10" cstate="print">
               <a:extLst>
                 <a:ext uri="{28A0092B-C50C-407E-A947-70E740481C1C}">
                   <a14:useLocalDpi xmlns:a14="http://schemas.microsoft.com/office/drawing/2010/main" val="0"/>

</xml_diff>